<commit_message>
update slides for part 1
</commit_message>
<xml_diff>
--- a/connect2016/developer/01/01.pptx
+++ b/connect2016/developer/01/01.pptx
@@ -6,21 +6,26 @@
     <p:sldMasterId id="2147483684" r:id="rId2"/>
   </p:sldMasterIdLst>
   <p:notesMasterIdLst>
-    <p:notesMasterId r:id="rId12"/>
+    <p:notesMasterId r:id="rId17"/>
   </p:notesMasterIdLst>
   <p:handoutMasterIdLst>
-    <p:handoutMasterId r:id="rId13"/>
+    <p:handoutMasterId r:id="rId18"/>
   </p:handoutMasterIdLst>
   <p:sldIdLst>
     <p:sldId id="444" r:id="rId3"/>
     <p:sldId id="445" r:id="rId4"/>
     <p:sldId id="472" r:id="rId5"/>
-    <p:sldId id="483" r:id="rId6"/>
-    <p:sldId id="482" r:id="rId7"/>
-    <p:sldId id="485" r:id="rId8"/>
-    <p:sldId id="486" r:id="rId9"/>
-    <p:sldId id="487" r:id="rId10"/>
-    <p:sldId id="484" r:id="rId11"/>
+    <p:sldId id="485" r:id="rId6"/>
+    <p:sldId id="486" r:id="rId7"/>
+    <p:sldId id="487" r:id="rId8"/>
+    <p:sldId id="488" r:id="rId9"/>
+    <p:sldId id="489" r:id="rId10"/>
+    <p:sldId id="490" r:id="rId11"/>
+    <p:sldId id="491" r:id="rId12"/>
+    <p:sldId id="492" r:id="rId13"/>
+    <p:sldId id="493" r:id="rId14"/>
+    <p:sldId id="494" r:id="rId15"/>
+    <p:sldId id="484" r:id="rId16"/>
   </p:sldIdLst>
   <p:sldSz cx="9144000" cy="5143500" type="screen16x9"/>
   <p:notesSz cx="6858000" cy="9144000"/>
@@ -127,11 +132,16 @@
             <p14:sldId id="444"/>
             <p14:sldId id="445"/>
             <p14:sldId id="472"/>
-            <p14:sldId id="483"/>
-            <p14:sldId id="482"/>
             <p14:sldId id="485"/>
             <p14:sldId id="486"/>
             <p14:sldId id="487"/>
+            <p14:sldId id="488"/>
+            <p14:sldId id="489"/>
+            <p14:sldId id="490"/>
+            <p14:sldId id="491"/>
+            <p14:sldId id="492"/>
+            <p14:sldId id="493"/>
+            <p14:sldId id="494"/>
             <p14:sldId id="484"/>
           </p14:sldIdLst>
         </p14:section>
@@ -261,7 +271,7 @@
           <a:p>
             <a:fld id="{B5389E1E-C654-E943-9883-792E99AD7287}" type="datetimeFigureOut">
               <a:rPr lang="en-US" smtClean="0"/>
-              <a:t>8/29/2016</a:t>
+              <a:t>9/20/2016</a:t>
             </a:fld>
             <a:endParaRPr lang="en-US"/>
           </a:p>
@@ -427,7 +437,7 @@
           <a:p>
             <a:fld id="{9920D99B-2862-464A-984E-65BFC5FC0BBC}" type="datetimeFigureOut">
               <a:rPr lang="en-US" smtClean="0"/>
-              <a:t>8/29/2016</a:t>
+              <a:t>9/20/2016</a:t>
             </a:fld>
             <a:endParaRPr lang="en-US"/>
           </a:p>
@@ -749,6 +759,84 @@
               <a:buFont typeface="Arial"/>
               <a:buNone/>
             </a:pPr>
+            <a:r>
+              <a:rPr lang="en-US" sz="1200" dirty="0">
+                <a:latin typeface="+mn-lt"/>
+              </a:rPr>
+              <a:t>Doesn’t work on Ubuntu 16</a:t>
+            </a:r>
+          </a:p>
+          <a:p>
+            <a:pPr marL="0" indent="0">
+              <a:lnSpc>
+                <a:spcPct val="140000"/>
+              </a:lnSpc>
+              <a:buClr>
+                <a:schemeClr val="accent2"/>
+              </a:buClr>
+              <a:buFont typeface="Arial"/>
+              <a:buNone/>
+            </a:pPr>
+            <a:r>
+              <a:rPr lang="en-US" sz="1200" dirty="0">
+                <a:latin typeface="+mn-lt"/>
+              </a:rPr>
+              <a:t>Doesn’t work on Windows 10 AU</a:t>
+            </a:r>
+          </a:p>
+          <a:p>
+            <a:pPr marL="0" indent="0">
+              <a:lnSpc>
+                <a:spcPct val="140000"/>
+              </a:lnSpc>
+              <a:buClr>
+                <a:schemeClr val="accent2"/>
+              </a:buClr>
+              <a:buFont typeface="Arial"/>
+              <a:buNone/>
+            </a:pPr>
+            <a:r>
+              <a:rPr lang="en-US" sz="1200" dirty="0">
+                <a:latin typeface="+mn-lt"/>
+              </a:rPr>
+              <a:t>Doesn’t work on Mac</a:t>
+            </a:r>
+            <a:r>
+              <a:rPr lang="en-US" sz="1200" baseline="0" dirty="0">
+                <a:latin typeface="+mn-lt"/>
+              </a:rPr>
+              <a:t> OS X “Sierra”</a:t>
+            </a:r>
+          </a:p>
+          <a:p>
+            <a:pPr marL="0" indent="0">
+              <a:lnSpc>
+                <a:spcPct val="140000"/>
+              </a:lnSpc>
+              <a:buClr>
+                <a:schemeClr val="accent2"/>
+              </a:buClr>
+              <a:buFont typeface="Arial"/>
+              <a:buNone/>
+            </a:pPr>
+            <a:r>
+              <a:rPr lang="en-US" sz="1200" baseline="0" dirty="0">
+                <a:latin typeface="+mn-lt"/>
+              </a:rPr>
+              <a:t>If you don’t have those, you can use a cloud instance, or </a:t>
+            </a:r>
+            <a:r>
+              <a:rPr lang="en-US" sz="1200" baseline="0" dirty="0" err="1">
+                <a:latin typeface="+mn-lt"/>
+              </a:rPr>
+              <a:t>docker</a:t>
+            </a:r>
+            <a:r>
+              <a:rPr lang="en-US" sz="1200" baseline="0" dirty="0">
+                <a:latin typeface="+mn-lt"/>
+              </a:rPr>
+              <a:t>, or a VM</a:t>
+            </a:r>
             <a:endParaRPr lang="en-US" sz="1200" dirty="0">
               <a:latin typeface="+mn-lt"/>
             </a:endParaRPr>
@@ -835,19 +923,7 @@
           <a:bodyPr/>
           <a:lstStyle/>
           <a:p>
-            <a:pPr marL="0" indent="0">
-              <a:lnSpc>
-                <a:spcPct val="140000"/>
-              </a:lnSpc>
-              <a:buClr>
-                <a:schemeClr val="accent2"/>
-              </a:buClr>
-              <a:buFont typeface="Arial"/>
-              <a:buNone/>
-            </a:pPr>
-            <a:endParaRPr lang="en-US" sz="1200" dirty="0">
-              <a:latin typeface="+mn-lt"/>
-            </a:endParaRPr>
+            <a:endParaRPr lang="en-US" dirty="0"/>
           </a:p>
         </p:txBody>
       </p:sp>
@@ -869,186 +945,6 @@
             <a:fld id="{F39351FC-18D6-4741-8EEB-9FDB1F020AAC}" type="slidenum">
               <a:rPr lang="en-US" smtClean="0"/>
               <a:t>4</a:t>
-            </a:fld>
-            <a:endParaRPr lang="en-US"/>
-          </a:p>
-        </p:txBody>
-      </p:sp>
-    </p:spTree>
-    <p:extLst>
-      <p:ext uri="{BB962C8B-B14F-4D97-AF65-F5344CB8AC3E}">
-        <p14:creationId xmlns:p14="http://schemas.microsoft.com/office/powerpoint/2010/main" val="866634633"/>
-      </p:ext>
-    </p:extLst>
-  </p:cSld>
-  <p:clrMapOvr>
-    <a:masterClrMapping/>
-  </p:clrMapOvr>
-</p:notes>
-</file>
-
-<file path=ppt/notesSlides/notesSlide3.xml><?xml version="1.0" encoding="utf-8"?>
-<p:notes xmlns:a="http://schemas.openxmlformats.org/drawingml/2006/main" xmlns:r="http://schemas.openxmlformats.org/officeDocument/2006/relationships" xmlns:p="http://schemas.openxmlformats.org/presentationml/2006/main">
-  <p:cSld>
-    <p:spTree>
-      <p:nvGrpSpPr>
-        <p:cNvPr id="1" name=""/>
-        <p:cNvGrpSpPr/>
-        <p:nvPr/>
-      </p:nvGrpSpPr>
-      <p:grpSpPr>
-        <a:xfrm>
-          <a:off x="0" y="0"/>
-          <a:ext cx="0" cy="0"/>
-          <a:chOff x="0" y="0"/>
-          <a:chExt cx="0" cy="0"/>
-        </a:xfrm>
-      </p:grpSpPr>
-      <p:sp>
-        <p:nvSpPr>
-          <p:cNvPr id="2" name="Slide Image Placeholder 1"/>
-          <p:cNvSpPr>
-            <a:spLocks noGrp="1" noRot="1" noChangeAspect="1"/>
-          </p:cNvSpPr>
-          <p:nvPr>
-            <p:ph type="sldImg"/>
-          </p:nvPr>
-        </p:nvSpPr>
-        <p:spPr/>
-      </p:sp>
-      <p:sp>
-        <p:nvSpPr>
-          <p:cNvPr id="3" name="Notes Placeholder 2"/>
-          <p:cNvSpPr>
-            <a:spLocks noGrp="1"/>
-          </p:cNvSpPr>
-          <p:nvPr>
-            <p:ph type="body" idx="1"/>
-          </p:nvPr>
-        </p:nvSpPr>
-        <p:spPr/>
-        <p:txBody>
-          <a:bodyPr/>
-          <a:lstStyle/>
-          <a:p>
-            <a:pPr marL="0" indent="0">
-              <a:lnSpc>
-                <a:spcPct val="140000"/>
-              </a:lnSpc>
-              <a:buClr>
-                <a:schemeClr val="accent2"/>
-              </a:buClr>
-              <a:buFont typeface="Arial"/>
-              <a:buNone/>
-            </a:pPr>
-            <a:endParaRPr lang="en-US" sz="1200" dirty="0">
-              <a:latin typeface="+mn-lt"/>
-            </a:endParaRPr>
-          </a:p>
-        </p:txBody>
-      </p:sp>
-      <p:sp>
-        <p:nvSpPr>
-          <p:cNvPr id="4" name="Slide Number Placeholder 3"/>
-          <p:cNvSpPr>
-            <a:spLocks noGrp="1"/>
-          </p:cNvSpPr>
-          <p:nvPr>
-            <p:ph type="sldNum" sz="quarter" idx="10"/>
-          </p:nvPr>
-        </p:nvSpPr>
-        <p:spPr/>
-        <p:txBody>
-          <a:bodyPr/>
-          <a:lstStyle/>
-          <a:p>
-            <a:fld id="{F39351FC-18D6-4741-8EEB-9FDB1F020AAC}" type="slidenum">
-              <a:rPr lang="en-US" smtClean="0"/>
-              <a:t>5</a:t>
-            </a:fld>
-            <a:endParaRPr lang="en-US"/>
-          </a:p>
-        </p:txBody>
-      </p:sp>
-    </p:spTree>
-    <p:extLst>
-      <p:ext uri="{BB962C8B-B14F-4D97-AF65-F5344CB8AC3E}">
-        <p14:creationId xmlns:p14="http://schemas.microsoft.com/office/powerpoint/2010/main" val="2375218482"/>
-      </p:ext>
-    </p:extLst>
-  </p:cSld>
-  <p:clrMapOvr>
-    <a:masterClrMapping/>
-  </p:clrMapOvr>
-</p:notes>
-</file>
-
-<file path=ppt/notesSlides/notesSlide4.xml><?xml version="1.0" encoding="utf-8"?>
-<p:notes xmlns:a="http://schemas.openxmlformats.org/drawingml/2006/main" xmlns:r="http://schemas.openxmlformats.org/officeDocument/2006/relationships" xmlns:p="http://schemas.openxmlformats.org/presentationml/2006/main">
-  <p:cSld>
-    <p:spTree>
-      <p:nvGrpSpPr>
-        <p:cNvPr id="1" name=""/>
-        <p:cNvGrpSpPr/>
-        <p:nvPr/>
-      </p:nvGrpSpPr>
-      <p:grpSpPr>
-        <a:xfrm>
-          <a:off x="0" y="0"/>
-          <a:ext cx="0" cy="0"/>
-          <a:chOff x="0" y="0"/>
-          <a:chExt cx="0" cy="0"/>
-        </a:xfrm>
-      </p:grpSpPr>
-      <p:sp>
-        <p:nvSpPr>
-          <p:cNvPr id="2" name="Slide Image Placeholder 1"/>
-          <p:cNvSpPr>
-            <a:spLocks noGrp="1" noRot="1" noChangeAspect="1"/>
-          </p:cNvSpPr>
-          <p:nvPr>
-            <p:ph type="sldImg"/>
-          </p:nvPr>
-        </p:nvSpPr>
-        <p:spPr/>
-      </p:sp>
-      <p:sp>
-        <p:nvSpPr>
-          <p:cNvPr id="3" name="Notes Placeholder 2"/>
-          <p:cNvSpPr>
-            <a:spLocks noGrp="1"/>
-          </p:cNvSpPr>
-          <p:nvPr>
-            <p:ph type="body" idx="1"/>
-          </p:nvPr>
-        </p:nvSpPr>
-        <p:spPr/>
-        <p:txBody>
-          <a:bodyPr/>
-          <a:lstStyle/>
-          <a:p>
-            <a:endParaRPr lang="en-US" dirty="0"/>
-          </a:p>
-        </p:txBody>
-      </p:sp>
-      <p:sp>
-        <p:nvSpPr>
-          <p:cNvPr id="4" name="Slide Number Placeholder 3"/>
-          <p:cNvSpPr>
-            <a:spLocks noGrp="1"/>
-          </p:cNvSpPr>
-          <p:nvPr>
-            <p:ph type="sldNum" sz="quarter" idx="10"/>
-          </p:nvPr>
-        </p:nvSpPr>
-        <p:spPr/>
-        <p:txBody>
-          <a:bodyPr/>
-          <a:lstStyle/>
-          <a:p>
-            <a:fld id="{F39351FC-18D6-4741-8EEB-9FDB1F020AAC}" type="slidenum">
-              <a:rPr lang="en-US" smtClean="0"/>
-              <a:t>6</a:t>
             </a:fld>
             <a:endParaRPr lang="en-US"/>
           </a:p>
@@ -6952,6 +6848,418 @@
 </p:sld>
 </file>
 
+<file path=ppt/slides/slide10.xml><?xml version="1.0" encoding="utf-8"?>
+<p:sld xmlns:a="http://schemas.openxmlformats.org/drawingml/2006/main" xmlns:r="http://schemas.openxmlformats.org/officeDocument/2006/relationships" xmlns:p="http://schemas.openxmlformats.org/presentationml/2006/main">
+  <p:cSld>
+    <p:spTree>
+      <p:nvGrpSpPr>
+        <p:cNvPr id="1" name=""/>
+        <p:cNvGrpSpPr/>
+        <p:nvPr/>
+      </p:nvGrpSpPr>
+      <p:grpSpPr>
+        <a:xfrm>
+          <a:off x="0" y="0"/>
+          <a:ext cx="0" cy="0"/>
+          <a:chOff x="0" y="0"/>
+          <a:chExt cx="0" cy="0"/>
+        </a:xfrm>
+      </p:grpSpPr>
+      <p:sp>
+        <p:nvSpPr>
+          <p:cNvPr id="2" name="Title 1"/>
+          <p:cNvSpPr>
+            <a:spLocks noGrp="1"/>
+          </p:cNvSpPr>
+          <p:nvPr>
+            <p:ph type="title"/>
+          </p:nvPr>
+        </p:nvSpPr>
+        <p:spPr/>
+        <p:txBody>
+          <a:bodyPr/>
+          <a:lstStyle/>
+          <a:p>
+            <a:r>
+              <a:rPr lang="en-US" dirty="0"/>
+              <a:t>Configuration</a:t>
+            </a:r>
+          </a:p>
+        </p:txBody>
+      </p:sp>
+      <p:pic>
+        <p:nvPicPr>
+          <p:cNvPr id="4098" name="Picture 2" descr="Couchbase Server Setup Wizard Sample Buckets"/>
+          <p:cNvPicPr>
+            <a:picLocks noChangeAspect="1" noChangeArrowheads="1"/>
+          </p:cNvPicPr>
+          <p:nvPr/>
+        </p:nvPicPr>
+        <p:blipFill>
+          <a:blip r:embed="rId2">
+            <a:extLst>
+              <a:ext uri="{28A0092B-C50C-407E-A947-70E740481C1C}">
+                <a14:useLocalDpi xmlns:a14="http://schemas.microsoft.com/office/drawing/2010/main" val="0"/>
+              </a:ext>
+            </a:extLst>
+          </a:blip>
+          <a:srcRect/>
+          <a:stretch>
+            <a:fillRect/>
+          </a:stretch>
+        </p:blipFill>
+        <p:spPr bwMode="auto">
+          <a:xfrm>
+            <a:off x="1257300" y="1012009"/>
+            <a:ext cx="6819900" cy="3588566"/>
+          </a:xfrm>
+          <a:prstGeom prst="rect">
+            <a:avLst/>
+          </a:prstGeom>
+          <a:noFill/>
+          <a:extLst>
+            <a:ext uri="{909E8E84-426E-40DD-AFC4-6F175D3DCCD1}">
+              <a14:hiddenFill xmlns:a14="http://schemas.microsoft.com/office/drawing/2010/main">
+                <a:solidFill>
+                  <a:srgbClr val="FFFFFF"/>
+                </a:solidFill>
+              </a14:hiddenFill>
+            </a:ext>
+          </a:extLst>
+        </p:spPr>
+      </p:pic>
+    </p:spTree>
+    <p:extLst>
+      <p:ext uri="{BB962C8B-B14F-4D97-AF65-F5344CB8AC3E}">
+        <p14:creationId xmlns:p14="http://schemas.microsoft.com/office/powerpoint/2010/main" val="3171604176"/>
+      </p:ext>
+    </p:extLst>
+  </p:cSld>
+  <p:clrMapOvr>
+    <a:masterClrMapping/>
+  </p:clrMapOvr>
+</p:sld>
+</file>
+
+<file path=ppt/slides/slide11.xml><?xml version="1.0" encoding="utf-8"?>
+<p:sld xmlns:a="http://schemas.openxmlformats.org/drawingml/2006/main" xmlns:r="http://schemas.openxmlformats.org/officeDocument/2006/relationships" xmlns:p="http://schemas.openxmlformats.org/presentationml/2006/main">
+  <p:cSld>
+    <p:spTree>
+      <p:nvGrpSpPr>
+        <p:cNvPr id="1" name=""/>
+        <p:cNvGrpSpPr/>
+        <p:nvPr/>
+      </p:nvGrpSpPr>
+      <p:grpSpPr>
+        <a:xfrm>
+          <a:off x="0" y="0"/>
+          <a:ext cx="0" cy="0"/>
+          <a:chOff x="0" y="0"/>
+          <a:chExt cx="0" cy="0"/>
+        </a:xfrm>
+      </p:grpSpPr>
+      <p:sp>
+        <p:nvSpPr>
+          <p:cNvPr id="2" name="Title 1"/>
+          <p:cNvSpPr>
+            <a:spLocks noGrp="1"/>
+          </p:cNvSpPr>
+          <p:nvPr>
+            <p:ph type="title"/>
+          </p:nvPr>
+        </p:nvSpPr>
+        <p:spPr/>
+        <p:txBody>
+          <a:bodyPr/>
+          <a:lstStyle/>
+          <a:p>
+            <a:r>
+              <a:rPr lang="en-US" dirty="0"/>
+              <a:t>Configuration</a:t>
+            </a:r>
+          </a:p>
+        </p:txBody>
+      </p:sp>
+      <p:pic>
+        <p:nvPicPr>
+          <p:cNvPr id="5122" name="Picture 2" descr="Couchbase Server Setup Wizard Default Bucket"/>
+          <p:cNvPicPr>
+            <a:picLocks noChangeAspect="1" noChangeArrowheads="1"/>
+          </p:cNvPicPr>
+          <p:nvPr/>
+        </p:nvPicPr>
+        <p:blipFill>
+          <a:blip r:embed="rId2">
+            <a:extLst>
+              <a:ext uri="{28A0092B-C50C-407E-A947-70E740481C1C}">
+                <a14:useLocalDpi xmlns:a14="http://schemas.microsoft.com/office/drawing/2010/main" val="0"/>
+              </a:ext>
+            </a:extLst>
+          </a:blip>
+          <a:srcRect/>
+          <a:stretch>
+            <a:fillRect/>
+          </a:stretch>
+        </p:blipFill>
+        <p:spPr bwMode="auto">
+          <a:xfrm>
+            <a:off x="998992" y="1000125"/>
+            <a:ext cx="7197760" cy="3586163"/>
+          </a:xfrm>
+          <a:prstGeom prst="rect">
+            <a:avLst/>
+          </a:prstGeom>
+          <a:noFill/>
+          <a:extLst>
+            <a:ext uri="{909E8E84-426E-40DD-AFC4-6F175D3DCCD1}">
+              <a14:hiddenFill xmlns:a14="http://schemas.microsoft.com/office/drawing/2010/main">
+                <a:solidFill>
+                  <a:srgbClr val="FFFFFF"/>
+                </a:solidFill>
+              </a14:hiddenFill>
+            </a:ext>
+          </a:extLst>
+        </p:spPr>
+      </p:pic>
+    </p:spTree>
+    <p:extLst>
+      <p:ext uri="{BB962C8B-B14F-4D97-AF65-F5344CB8AC3E}">
+        <p14:creationId xmlns:p14="http://schemas.microsoft.com/office/powerpoint/2010/main" val="1983472153"/>
+      </p:ext>
+    </p:extLst>
+  </p:cSld>
+  <p:clrMapOvr>
+    <a:masterClrMapping/>
+  </p:clrMapOvr>
+</p:sld>
+</file>
+
+<file path=ppt/slides/slide12.xml><?xml version="1.0" encoding="utf-8"?>
+<p:sld xmlns:a="http://schemas.openxmlformats.org/drawingml/2006/main" xmlns:r="http://schemas.openxmlformats.org/officeDocument/2006/relationships" xmlns:p="http://schemas.openxmlformats.org/presentationml/2006/main">
+  <p:cSld>
+    <p:spTree>
+      <p:nvGrpSpPr>
+        <p:cNvPr id="1" name=""/>
+        <p:cNvGrpSpPr/>
+        <p:nvPr/>
+      </p:nvGrpSpPr>
+      <p:grpSpPr>
+        <a:xfrm>
+          <a:off x="0" y="0"/>
+          <a:ext cx="0" cy="0"/>
+          <a:chOff x="0" y="0"/>
+          <a:chExt cx="0" cy="0"/>
+        </a:xfrm>
+      </p:grpSpPr>
+      <p:sp>
+        <p:nvSpPr>
+          <p:cNvPr id="2" name="Title 1"/>
+          <p:cNvSpPr>
+            <a:spLocks noGrp="1"/>
+          </p:cNvSpPr>
+          <p:nvPr>
+            <p:ph type="title"/>
+          </p:nvPr>
+        </p:nvSpPr>
+        <p:spPr/>
+        <p:txBody>
+          <a:bodyPr/>
+          <a:lstStyle/>
+          <a:p>
+            <a:r>
+              <a:rPr lang="en-US" dirty="0"/>
+              <a:t>Configuration</a:t>
+            </a:r>
+          </a:p>
+        </p:txBody>
+      </p:sp>
+      <p:pic>
+        <p:nvPicPr>
+          <p:cNvPr id="6146" name="Picture 2" descr="Couchbase Server Setup Wizard Admin Credentials"/>
+          <p:cNvPicPr>
+            <a:picLocks noChangeAspect="1" noChangeArrowheads="1"/>
+          </p:cNvPicPr>
+          <p:nvPr/>
+        </p:nvPicPr>
+        <p:blipFill>
+          <a:blip r:embed="rId2">
+            <a:extLst>
+              <a:ext uri="{28A0092B-C50C-407E-A947-70E740481C1C}">
+                <a14:useLocalDpi xmlns:a14="http://schemas.microsoft.com/office/drawing/2010/main" val="0"/>
+              </a:ext>
+            </a:extLst>
+          </a:blip>
+          <a:srcRect/>
+          <a:stretch>
+            <a:fillRect/>
+          </a:stretch>
+        </p:blipFill>
+        <p:spPr bwMode="auto">
+          <a:xfrm>
+            <a:off x="852489" y="943485"/>
+            <a:ext cx="7110412" cy="3728528"/>
+          </a:xfrm>
+          <a:prstGeom prst="rect">
+            <a:avLst/>
+          </a:prstGeom>
+          <a:noFill/>
+          <a:extLst>
+            <a:ext uri="{909E8E84-426E-40DD-AFC4-6F175D3DCCD1}">
+              <a14:hiddenFill xmlns:a14="http://schemas.microsoft.com/office/drawing/2010/main">
+                <a:solidFill>
+                  <a:srgbClr val="FFFFFF"/>
+                </a:solidFill>
+              </a14:hiddenFill>
+            </a:ext>
+          </a:extLst>
+        </p:spPr>
+      </p:pic>
+    </p:spTree>
+    <p:extLst>
+      <p:ext uri="{BB962C8B-B14F-4D97-AF65-F5344CB8AC3E}">
+        <p14:creationId xmlns:p14="http://schemas.microsoft.com/office/powerpoint/2010/main" val="4101536371"/>
+      </p:ext>
+    </p:extLst>
+  </p:cSld>
+  <p:clrMapOvr>
+    <a:masterClrMapping/>
+  </p:clrMapOvr>
+</p:sld>
+</file>
+
+<file path=ppt/slides/slide13.xml><?xml version="1.0" encoding="utf-8"?>
+<p:sld xmlns:a="http://schemas.openxmlformats.org/drawingml/2006/main" xmlns:r="http://schemas.openxmlformats.org/officeDocument/2006/relationships" xmlns:p="http://schemas.openxmlformats.org/presentationml/2006/main">
+  <p:cSld>
+    <p:spTree>
+      <p:nvGrpSpPr>
+        <p:cNvPr id="1" name=""/>
+        <p:cNvGrpSpPr/>
+        <p:nvPr/>
+      </p:nvGrpSpPr>
+      <p:grpSpPr>
+        <a:xfrm>
+          <a:off x="0" y="0"/>
+          <a:ext cx="0" cy="0"/>
+          <a:chOff x="0" y="0"/>
+          <a:chExt cx="0" cy="0"/>
+        </a:xfrm>
+      </p:grpSpPr>
+      <p:sp>
+        <p:nvSpPr>
+          <p:cNvPr id="2" name="Title 1"/>
+          <p:cNvSpPr>
+            <a:spLocks noGrp="1"/>
+          </p:cNvSpPr>
+          <p:nvPr>
+            <p:ph type="title"/>
+          </p:nvPr>
+        </p:nvSpPr>
+        <p:spPr/>
+        <p:txBody>
+          <a:bodyPr/>
+          <a:lstStyle/>
+          <a:p>
+            <a:r>
+              <a:rPr lang="en-US" dirty="0"/>
+              <a:t>Configuration</a:t>
+            </a:r>
+          </a:p>
+        </p:txBody>
+      </p:sp>
+      <p:pic>
+        <p:nvPicPr>
+          <p:cNvPr id="3" name="Picture 2"/>
+          <p:cNvPicPr>
+            <a:picLocks noChangeAspect="1"/>
+          </p:cNvPicPr>
+          <p:nvPr/>
+        </p:nvPicPr>
+        <p:blipFill>
+          <a:blip r:embed="rId2"/>
+          <a:stretch>
+            <a:fillRect/>
+          </a:stretch>
+        </p:blipFill>
+        <p:spPr>
+          <a:xfrm>
+            <a:off x="2009764" y="666634"/>
+            <a:ext cx="4991111" cy="4305416"/>
+          </a:xfrm>
+          <a:prstGeom prst="rect">
+            <a:avLst/>
+          </a:prstGeom>
+        </p:spPr>
+      </p:pic>
+    </p:spTree>
+    <p:extLst>
+      <p:ext uri="{BB962C8B-B14F-4D97-AF65-F5344CB8AC3E}">
+        <p14:creationId xmlns:p14="http://schemas.microsoft.com/office/powerpoint/2010/main" val="4099160036"/>
+      </p:ext>
+    </p:extLst>
+  </p:cSld>
+  <p:clrMapOvr>
+    <a:masterClrMapping/>
+  </p:clrMapOvr>
+</p:sld>
+</file>
+
+<file path=ppt/slides/slide14.xml><?xml version="1.0" encoding="utf-8"?>
+<p:sld xmlns:a="http://schemas.openxmlformats.org/drawingml/2006/main" xmlns:r="http://schemas.openxmlformats.org/officeDocument/2006/relationships" xmlns:p="http://schemas.openxmlformats.org/presentationml/2006/main">
+  <p:cSld>
+    <p:spTree>
+      <p:nvGrpSpPr>
+        <p:cNvPr id="1" name=""/>
+        <p:cNvGrpSpPr/>
+        <p:nvPr/>
+      </p:nvGrpSpPr>
+      <p:grpSpPr>
+        <a:xfrm>
+          <a:off x="0" y="0"/>
+          <a:ext cx="0" cy="0"/>
+          <a:chOff x="0" y="0"/>
+          <a:chExt cx="0" cy="0"/>
+        </a:xfrm>
+      </p:grpSpPr>
+      <p:sp>
+        <p:nvSpPr>
+          <p:cNvPr id="2" name="Title 1"/>
+          <p:cNvSpPr>
+            <a:spLocks noGrp="1"/>
+          </p:cNvSpPr>
+          <p:nvPr>
+            <p:ph type="ctrTitle"/>
+          </p:nvPr>
+        </p:nvSpPr>
+        <p:spPr>
+          <a:xfrm>
+            <a:off x="685800" y="925974"/>
+            <a:ext cx="7772400" cy="2338001"/>
+          </a:xfrm>
+        </p:spPr>
+        <p:txBody>
+          <a:bodyPr/>
+          <a:lstStyle/>
+          <a:p>
+            <a:r>
+              <a:rPr lang="en-US" sz="3600" dirty="0"/>
+              <a:t>Questions</a:t>
+            </a:r>
+          </a:p>
+        </p:txBody>
+      </p:sp>
+    </p:spTree>
+    <p:extLst>
+      <p:ext uri="{BB962C8B-B14F-4D97-AF65-F5344CB8AC3E}">
+        <p14:creationId xmlns:p14="http://schemas.microsoft.com/office/powerpoint/2010/main" val="3620921753"/>
+      </p:ext>
+    </p:extLst>
+  </p:cSld>
+  <p:clrMapOvr>
+    <a:masterClrMapping/>
+  </p:clrMapOvr>
+</p:sld>
+</file>
+
 <file path=ppt/slides/slide2.xml><?xml version="1.0" encoding="utf-8"?>
 <p:sld xmlns:a="http://schemas.openxmlformats.org/drawingml/2006/main" xmlns:r="http://schemas.openxmlformats.org/officeDocument/2006/relationships" xmlns:p="http://schemas.openxmlformats.org/presentationml/2006/main">
   <p:cSld>
@@ -7126,7 +7434,7 @@
           <a:p>
             <a:r>
               <a:rPr lang="en-US" dirty="0"/>
-              <a:t>Install Locally: Windows</a:t>
+              <a:t>Install Locally: Windows/Mac/Ubuntu</a:t>
             </a:r>
           </a:p>
         </p:txBody>
@@ -7308,9 +7616,12 @@
               <a:buChar char="•"/>
             </a:pPr>
             <a:r>
-              <a:rPr lang="en-US" dirty="0"/>
-              <a:t>[insert link to download]</a:t>
-            </a:r>
+              <a:rPr lang="en-US" dirty="0">
+                <a:hlinkClick r:id="rId3"/>
+              </a:rPr>
+              <a:t>http://couchbase.com/nosql-databases/downloads</a:t>
+            </a:r>
+            <a:endParaRPr lang="en-US" dirty="0"/>
           </a:p>
           <a:p>
             <a:pPr marL="342900" indent="-342900">
@@ -7334,6 +7645,30 @@
           </a:p>
         </p:txBody>
       </p:sp>
+      <p:pic>
+        <p:nvPicPr>
+          <p:cNvPr id="3" name="Picture 2"/>
+          <p:cNvPicPr>
+            <a:picLocks noChangeAspect="1"/>
+          </p:cNvPicPr>
+          <p:nvPr/>
+        </p:nvPicPr>
+        <p:blipFill>
+          <a:blip r:embed="rId4"/>
+          <a:stretch>
+            <a:fillRect/>
+          </a:stretch>
+        </p:blipFill>
+        <p:spPr>
+          <a:xfrm>
+            <a:off x="1881328" y="1463024"/>
+            <a:ext cx="5596739" cy="3585226"/>
+          </a:xfrm>
+          <a:prstGeom prst="rect">
+            <a:avLst/>
+          </a:prstGeom>
+        </p:spPr>
+      </p:pic>
     </p:spTree>
     <p:extLst>
       <p:ext uri="{BB962C8B-B14F-4D97-AF65-F5344CB8AC3E}">
@@ -7389,14 +7724,14 @@
           <a:p>
             <a:r>
               <a:rPr lang="en-US" dirty="0"/>
-              <a:t>Install Locally: Linux</a:t>
+              <a:t>Install on Cloud: Azure</a:t>
             </a:r>
           </a:p>
         </p:txBody>
       </p:sp>
       <p:sp>
         <p:nvSpPr>
-          <p:cNvPr id="3" name="Content Placeholder 2"/>
+          <p:cNvPr id="4" name="Content Placeholder 2"/>
           <p:cNvSpPr txBox="1">
             <a:spLocks/>
           </p:cNvSpPr>
@@ -7404,8 +7739,8 @@
         </p:nvSpPr>
         <p:spPr>
           <a:xfrm>
-            <a:off x="457200" y="685800"/>
-            <a:ext cx="8007739" cy="3394472"/>
+            <a:off x="198158" y="685800"/>
+            <a:ext cx="8307668" cy="1295400"/>
           </a:xfrm>
           <a:prstGeom prst="rect">
             <a:avLst/>
@@ -7571,9 +7906,12 @@
               <a:buChar char="•"/>
             </a:pPr>
             <a:r>
-              <a:rPr lang="en-US" dirty="0"/>
-              <a:t>[insert link to download]</a:t>
-            </a:r>
+              <a:rPr lang="en-US" sz="2000" dirty="0">
+                <a:hlinkClick r:id="rId3"/>
+              </a:rPr>
+              <a:t>https://azure.microsoft.com/en-us/marketplace/partners/couchbase/</a:t>
+            </a:r>
+            <a:endParaRPr lang="en-US" sz="2000" dirty="0"/>
           </a:p>
           <a:p>
             <a:pPr marL="342900" indent="-342900">
@@ -7581,9 +7919,19 @@
               <a:buChar char="•"/>
             </a:pPr>
             <a:r>
-              <a:rPr lang="en-US" dirty="0"/>
-              <a:t>USB thumb drives are available</a:t>
-            </a:r>
+              <a:rPr lang="en-US" sz="2000" dirty="0">
+                <a:hlinkClick r:id="rId4"/>
+              </a:rPr>
+              <a:t>https://portal.azure.com</a:t>
+            </a:r>
+            <a:endParaRPr lang="en-US" sz="2000" dirty="0"/>
+          </a:p>
+          <a:p>
+            <a:pPr marL="342900" indent="-342900">
+              <a:buFont typeface="Arial" charset="0"/>
+              <a:buChar char="•"/>
+            </a:pPr>
+            <a:endParaRPr lang="en-US" sz="2000" dirty="0"/>
           </a:p>
           <a:p>
             <a:pPr marL="342900" indent="-342900">
@@ -7597,24 +7945,40 @@
           </a:p>
         </p:txBody>
       </p:sp>
+      <p:pic>
+        <p:nvPicPr>
+          <p:cNvPr id="3" name="Picture 2"/>
+          <p:cNvPicPr>
+            <a:picLocks noChangeAspect="1"/>
+          </p:cNvPicPr>
+          <p:nvPr/>
+        </p:nvPicPr>
+        <p:blipFill>
+          <a:blip r:embed="rId5"/>
+          <a:stretch>
+            <a:fillRect/>
+          </a:stretch>
+        </p:blipFill>
+        <p:spPr>
+          <a:xfrm>
+            <a:off x="198158" y="1793001"/>
+            <a:ext cx="8469593" cy="2561566"/>
+          </a:xfrm>
+          <a:prstGeom prst="rect">
+            <a:avLst/>
+          </a:prstGeom>
+        </p:spPr>
+      </p:pic>
     </p:spTree>
     <p:extLst>
       <p:ext uri="{BB962C8B-B14F-4D97-AF65-F5344CB8AC3E}">
-        <p14:creationId xmlns:p14="http://schemas.microsoft.com/office/powerpoint/2010/main" val="2553968753"/>
+        <p14:creationId xmlns:p14="http://schemas.microsoft.com/office/powerpoint/2010/main" val="1148363434"/>
       </p:ext>
     </p:extLst>
   </p:cSld>
   <p:clrMapOvr>
     <a:masterClrMapping/>
   </p:clrMapOvr>
-  <mc:AlternateContent xmlns:mc="http://schemas.openxmlformats.org/markup-compatibility/2006" xmlns:p14="http://schemas.microsoft.com/office/powerpoint/2010/main">
-    <mc:Choice Requires="p14">
-      <p:transition p14:dur="10"/>
-    </mc:Choice>
-    <mc:Fallback xmlns="">
-      <p:transition/>
-    </mc:Fallback>
-  </mc:AlternateContent>
 </p:sld>
 </file>
 
@@ -7652,14 +8016,14 @@
           <a:p>
             <a:r>
               <a:rPr lang="en-US" dirty="0"/>
-              <a:t>Install Locally: OS X</a:t>
+              <a:t>Install on Cloud: Amazon</a:t>
             </a:r>
           </a:p>
         </p:txBody>
       </p:sp>
       <p:sp>
         <p:nvSpPr>
-          <p:cNvPr id="3" name="Content Placeholder 2"/>
+          <p:cNvPr id="4" name="Content Placeholder 2"/>
           <p:cNvSpPr txBox="1">
             <a:spLocks/>
           </p:cNvSpPr>
@@ -7833,20 +8197,210 @@
               <a:buFont typeface="Arial" charset="0"/>
               <a:buChar char="•"/>
             </a:pPr>
-            <a:r>
-              <a:rPr lang="en-US" dirty="0"/>
-              <a:t>[insert link to download]</a:t>
-            </a:r>
-          </a:p>
+            <a:endParaRPr lang="en-US" dirty="0"/>
+          </a:p>
+          <a:p>
+            <a:endParaRPr lang="en-US" dirty="0"/>
+          </a:p>
+        </p:txBody>
+      </p:sp>
+      <p:sp>
+        <p:nvSpPr>
+          <p:cNvPr id="5" name="Content Placeholder 2"/>
+          <p:cNvSpPr txBox="1">
+            <a:spLocks/>
+          </p:cNvSpPr>
+          <p:nvPr/>
+        </p:nvSpPr>
+        <p:spPr>
+          <a:xfrm>
+            <a:off x="198158" y="685800"/>
+            <a:ext cx="8307668" cy="1295400"/>
+          </a:xfrm>
+          <a:prstGeom prst="rect">
+            <a:avLst/>
+          </a:prstGeom>
+        </p:spPr>
+        <p:txBody>
+          <a:bodyPr/>
+          <a:lstStyle>
+            <a:lvl1pPr marL="228600" indent="-228600" algn="l" defTabSz="457200" rtl="0" eaLnBrk="1" latinLnBrk="0" hangingPunct="1">
+              <a:spcBef>
+                <a:spcPts val="0"/>
+              </a:spcBef>
+              <a:buClr>
+                <a:schemeClr val="accent1"/>
+              </a:buClr>
+              <a:buFont typeface="Wingdings" charset="2"/>
+              <a:buChar char="§"/>
+              <a:defRPr sz="2400" kern="1200">
+                <a:solidFill>
+                  <a:schemeClr val="tx1"/>
+                </a:solidFill>
+                <a:latin typeface="+mn-lt"/>
+                <a:ea typeface="+mn-ea"/>
+                <a:cs typeface="+mn-cs"/>
+              </a:defRPr>
+            </a:lvl1pPr>
+            <a:lvl2pPr marL="455613" indent="-227013" algn="l" defTabSz="457200" rtl="0" eaLnBrk="1" latinLnBrk="0" hangingPunct="1">
+              <a:spcBef>
+                <a:spcPts val="0"/>
+              </a:spcBef>
+              <a:buClr>
+                <a:srgbClr val="262626"/>
+              </a:buClr>
+              <a:buFont typeface="Wingdings" charset="2"/>
+              <a:buChar char="§"/>
+              <a:defRPr sz="2000" kern="1200">
+                <a:solidFill>
+                  <a:schemeClr val="tx1"/>
+                </a:solidFill>
+                <a:latin typeface="+mn-lt"/>
+                <a:ea typeface="+mn-ea"/>
+                <a:cs typeface="+mn-cs"/>
+              </a:defRPr>
+            </a:lvl2pPr>
+            <a:lvl3pPr marL="455613" indent="-228600" algn="l" defTabSz="457200" rtl="0" eaLnBrk="1" latinLnBrk="0" hangingPunct="1">
+              <a:spcBef>
+                <a:spcPts val="0"/>
+              </a:spcBef>
+              <a:buClr>
+                <a:srgbClr val="262626"/>
+              </a:buClr>
+              <a:buFont typeface="Wingdings" charset="2"/>
+              <a:buChar char="§"/>
+              <a:defRPr sz="2000" kern="1200">
+                <a:solidFill>
+                  <a:schemeClr val="tx1"/>
+                </a:solidFill>
+                <a:latin typeface="+mn-lt"/>
+                <a:ea typeface="+mn-ea"/>
+                <a:cs typeface="+mn-cs"/>
+              </a:defRPr>
+            </a:lvl3pPr>
+            <a:lvl4pPr marL="455613" indent="-228600" algn="l" defTabSz="457200" rtl="0" eaLnBrk="1" latinLnBrk="0" hangingPunct="1">
+              <a:spcBef>
+                <a:spcPts val="0"/>
+              </a:spcBef>
+              <a:buClr>
+                <a:srgbClr val="262626"/>
+              </a:buClr>
+              <a:buFont typeface="Wingdings" charset="2"/>
+              <a:buChar char="§"/>
+              <a:defRPr sz="2000" kern="1200">
+                <a:solidFill>
+                  <a:schemeClr val="tx1"/>
+                </a:solidFill>
+                <a:latin typeface="+mn-lt"/>
+                <a:ea typeface="+mn-ea"/>
+                <a:cs typeface="+mn-cs"/>
+              </a:defRPr>
+            </a:lvl4pPr>
+            <a:lvl5pPr marL="455613" indent="-228600" algn="l" defTabSz="457200" rtl="0" eaLnBrk="1" latinLnBrk="0" hangingPunct="1">
+              <a:spcBef>
+                <a:spcPts val="200"/>
+              </a:spcBef>
+              <a:buClr>
+                <a:srgbClr val="262626"/>
+              </a:buClr>
+              <a:buFont typeface="Wingdings" charset="2"/>
+              <a:buChar char="§"/>
+              <a:defRPr sz="2000" kern="1200">
+                <a:solidFill>
+                  <a:schemeClr val="tx1"/>
+                </a:solidFill>
+                <a:latin typeface="+mn-lt"/>
+                <a:ea typeface="+mn-ea"/>
+                <a:cs typeface="+mn-cs"/>
+              </a:defRPr>
+            </a:lvl5pPr>
+            <a:lvl6pPr marL="2514600" indent="-228600" algn="l" defTabSz="457200" rtl="0" eaLnBrk="1" latinLnBrk="0" hangingPunct="1">
+              <a:spcBef>
+                <a:spcPct val="20000"/>
+              </a:spcBef>
+              <a:buFont typeface="Arial"/>
+              <a:buChar char="•"/>
+              <a:defRPr sz="2000" kern="1200">
+                <a:solidFill>
+                  <a:schemeClr val="tx1"/>
+                </a:solidFill>
+                <a:latin typeface="+mn-lt"/>
+                <a:ea typeface="+mn-ea"/>
+                <a:cs typeface="+mn-cs"/>
+              </a:defRPr>
+            </a:lvl6pPr>
+            <a:lvl7pPr marL="2971800" indent="-228600" algn="l" defTabSz="457200" rtl="0" eaLnBrk="1" latinLnBrk="0" hangingPunct="1">
+              <a:spcBef>
+                <a:spcPct val="20000"/>
+              </a:spcBef>
+              <a:buFont typeface="Arial"/>
+              <a:buChar char="•"/>
+              <a:defRPr sz="2000" kern="1200">
+                <a:solidFill>
+                  <a:schemeClr val="tx1"/>
+                </a:solidFill>
+                <a:latin typeface="+mn-lt"/>
+                <a:ea typeface="+mn-ea"/>
+                <a:cs typeface="+mn-cs"/>
+              </a:defRPr>
+            </a:lvl7pPr>
+            <a:lvl8pPr marL="3429000" indent="-228600" algn="l" defTabSz="457200" rtl="0" eaLnBrk="1" latinLnBrk="0" hangingPunct="1">
+              <a:spcBef>
+                <a:spcPct val="20000"/>
+              </a:spcBef>
+              <a:buFont typeface="Arial"/>
+              <a:buChar char="•"/>
+              <a:defRPr sz="2000" kern="1200">
+                <a:solidFill>
+                  <a:schemeClr val="tx1"/>
+                </a:solidFill>
+                <a:latin typeface="+mn-lt"/>
+                <a:ea typeface="+mn-ea"/>
+                <a:cs typeface="+mn-cs"/>
+              </a:defRPr>
+            </a:lvl8pPr>
+            <a:lvl9pPr marL="3886200" indent="-228600" algn="l" defTabSz="457200" rtl="0" eaLnBrk="1" latinLnBrk="0" hangingPunct="1">
+              <a:spcBef>
+                <a:spcPct val="20000"/>
+              </a:spcBef>
+              <a:buFont typeface="Arial"/>
+              <a:buChar char="•"/>
+              <a:defRPr sz="2000" kern="1200">
+                <a:solidFill>
+                  <a:schemeClr val="tx1"/>
+                </a:solidFill>
+                <a:latin typeface="+mn-lt"/>
+                <a:ea typeface="+mn-ea"/>
+                <a:cs typeface="+mn-cs"/>
+              </a:defRPr>
+            </a:lvl9pPr>
+          </a:lstStyle>
           <a:p>
             <a:pPr marL="342900" indent="-342900">
               <a:buFont typeface="Arial" charset="0"/>
               <a:buChar char="•"/>
             </a:pPr>
             <a:r>
-              <a:rPr lang="en-US" dirty="0"/>
-              <a:t>USB thumb drives are available</a:t>
-            </a:r>
+              <a:rPr lang="en-US" sz="2000" dirty="0">
+                <a:hlinkClick r:id="rId2"/>
+              </a:rPr>
+              <a:t>https://aws.amazon.com/marketplace</a:t>
+            </a:r>
+            <a:endParaRPr lang="en-US" sz="2000" dirty="0"/>
+          </a:p>
+          <a:p>
+            <a:pPr marL="342900" indent="-342900">
+              <a:buFont typeface="Arial" charset="0"/>
+              <a:buChar char="•"/>
+            </a:pPr>
+            <a:endParaRPr lang="en-US" sz="2000" dirty="0"/>
+          </a:p>
+          <a:p>
+            <a:pPr marL="342900" indent="-342900">
+              <a:buFont typeface="Arial" charset="0"/>
+              <a:buChar char="•"/>
+            </a:pPr>
+            <a:endParaRPr lang="en-US" sz="2000" dirty="0"/>
           </a:p>
           <a:p>
             <a:pPr marL="342900" indent="-342900">
@@ -7863,21 +8417,13 @@
     </p:spTree>
     <p:extLst>
       <p:ext uri="{BB962C8B-B14F-4D97-AF65-F5344CB8AC3E}">
-        <p14:creationId xmlns:p14="http://schemas.microsoft.com/office/powerpoint/2010/main" val="253274308"/>
+        <p14:creationId xmlns:p14="http://schemas.microsoft.com/office/powerpoint/2010/main" val="84375709"/>
       </p:ext>
     </p:extLst>
   </p:cSld>
   <p:clrMapOvr>
     <a:masterClrMapping/>
   </p:clrMapOvr>
-  <mc:AlternateContent xmlns:mc="http://schemas.openxmlformats.org/markup-compatibility/2006" xmlns:p14="http://schemas.microsoft.com/office/powerpoint/2010/main">
-    <mc:Choice Requires="p14">
-      <p:transition p14:dur="10"/>
-    </mc:Choice>
-    <mc:Fallback xmlns="">
-      <p:transition/>
-    </mc:Fallback>
-  </mc:AlternateContent>
 </p:sld>
 </file>
 
@@ -7915,14 +8461,14 @@
           <a:p>
             <a:r>
               <a:rPr lang="en-US" dirty="0"/>
-              <a:t>Install on Cloud: Azure</a:t>
+              <a:t>Install with Docker</a:t>
             </a:r>
           </a:p>
         </p:txBody>
       </p:sp>
       <p:sp>
         <p:nvSpPr>
-          <p:cNvPr id="4" name="Content Placeholder 2"/>
+          <p:cNvPr id="3" name="Content Placeholder 2"/>
           <p:cNvSpPr txBox="1">
             <a:spLocks/>
           </p:cNvSpPr>
@@ -8098,11 +8644,79 @@
             </a:pPr>
             <a:r>
               <a:rPr lang="en-US" dirty="0">
-                <a:hlinkClick r:id="rId3"/>
+                <a:hlinkClick r:id="rId2"/>
               </a:rPr>
-              <a:t>https://azure.microsoft.com/en-us/marketplace/partners/couchbase/</a:t>
+              <a:t>https://hub.docker.com/_/couchbase/</a:t>
             </a:r>
             <a:endParaRPr lang="en-US" dirty="0"/>
+          </a:p>
+          <a:p>
+            <a:pPr marL="342900" indent="-342900">
+              <a:buFont typeface="Arial" charset="0"/>
+              <a:buChar char="•"/>
+            </a:pPr>
+            <a:r>
+              <a:rPr lang="en-US" dirty="0"/>
+              <a:t>enterprise-4.5.0</a:t>
+            </a:r>
+          </a:p>
+          <a:p>
+            <a:pPr marL="342900" indent="-342900">
+              <a:buFont typeface="Arial" charset="0"/>
+              <a:buChar char="•"/>
+            </a:pPr>
+            <a:r>
+              <a:rPr lang="en-US" dirty="0" err="1">
+                <a:latin typeface="Courier New" panose="02070309020205020404" pitchFamily="49" charset="0"/>
+                <a:cs typeface="Courier New" panose="02070309020205020404" pitchFamily="49" charset="0"/>
+              </a:rPr>
+              <a:t>docker</a:t>
+            </a:r>
+            <a:r>
+              <a:rPr lang="en-US" dirty="0">
+                <a:latin typeface="Courier New" panose="02070309020205020404" pitchFamily="49" charset="0"/>
+                <a:cs typeface="Courier New" panose="02070309020205020404" pitchFamily="49" charset="0"/>
+              </a:rPr>
+              <a:t> run -d −−name </a:t>
+            </a:r>
+            <a:r>
+              <a:rPr lang="en-US" dirty="0" err="1">
+                <a:latin typeface="Courier New" panose="02070309020205020404" pitchFamily="49" charset="0"/>
+                <a:cs typeface="Courier New" panose="02070309020205020404" pitchFamily="49" charset="0"/>
+              </a:rPr>
+              <a:t>db</a:t>
+            </a:r>
+            <a:r>
+              <a:rPr lang="en-US" dirty="0">
+                <a:latin typeface="Courier New" panose="02070309020205020404" pitchFamily="49" charset="0"/>
+                <a:cs typeface="Courier New" panose="02070309020205020404" pitchFamily="49" charset="0"/>
+              </a:rPr>
+              <a:t> -p 8091-8094:8091-8094 -p 11207:11207 -p 11210-11211:11210-11211 -p 18091-18093:</a:t>
+            </a:r>
+            <a:br>
+              <a:rPr lang="en-US" dirty="0">
+                <a:latin typeface="Courier New" panose="02070309020205020404" pitchFamily="49" charset="0"/>
+                <a:cs typeface="Courier New" panose="02070309020205020404" pitchFamily="49" charset="0"/>
+              </a:rPr>
+            </a:br>
+            <a:r>
+              <a:rPr lang="en-US" dirty="0">
+                <a:latin typeface="Courier New" panose="02070309020205020404" pitchFamily="49" charset="0"/>
+                <a:cs typeface="Courier New" panose="02070309020205020404" pitchFamily="49" charset="0"/>
+              </a:rPr>
+              <a:t>18091-18093 </a:t>
+            </a:r>
+            <a:r>
+              <a:rPr lang="en-US" dirty="0" err="1">
+                <a:latin typeface="Courier New" panose="02070309020205020404" pitchFamily="49" charset="0"/>
+                <a:cs typeface="Courier New" panose="02070309020205020404" pitchFamily="49" charset="0"/>
+              </a:rPr>
+              <a:t>couchbase</a:t>
+            </a:r>
+            <a:endParaRPr lang="en-US" dirty="0">
+              <a:latin typeface="Courier New" panose="02070309020205020404" pitchFamily="49" charset="0"/>
+              <a:cs typeface="Courier New" panose="02070309020205020404" pitchFamily="49" charset="0"/>
+            </a:endParaRPr>
           </a:p>
           <a:p>
             <a:pPr marL="342900" indent="-342900">
@@ -8116,10 +8730,34 @@
           </a:p>
         </p:txBody>
       </p:sp>
+      <p:pic>
+        <p:nvPicPr>
+          <p:cNvPr id="4" name="Picture 3"/>
+          <p:cNvPicPr>
+            <a:picLocks noChangeAspect="1"/>
+          </p:cNvPicPr>
+          <p:nvPr/>
+        </p:nvPicPr>
+        <p:blipFill>
+          <a:blip r:embed="rId3"/>
+          <a:stretch>
+            <a:fillRect/>
+          </a:stretch>
+        </p:blipFill>
+        <p:spPr>
+          <a:xfrm>
+            <a:off x="198157" y="3423692"/>
+            <a:ext cx="8658225" cy="988025"/>
+          </a:xfrm>
+          <a:prstGeom prst="rect">
+            <a:avLst/>
+          </a:prstGeom>
+        </p:spPr>
+      </p:pic>
     </p:spTree>
     <p:extLst>
       <p:ext uri="{BB962C8B-B14F-4D97-AF65-F5344CB8AC3E}">
-        <p14:creationId xmlns:p14="http://schemas.microsoft.com/office/powerpoint/2010/main" val="1148363434"/>
+        <p14:creationId xmlns:p14="http://schemas.microsoft.com/office/powerpoint/2010/main" val="66688450"/>
       </p:ext>
     </p:extLst>
   </p:cSld>
@@ -8163,198 +8801,56 @@
           <a:p>
             <a:r>
               <a:rPr lang="en-US" dirty="0"/>
-              <a:t>Install on Cloud: Amazon</a:t>
+              <a:t>Install</a:t>
             </a:r>
           </a:p>
         </p:txBody>
       </p:sp>
-      <p:sp>
-        <p:nvSpPr>
-          <p:cNvPr id="4" name="Content Placeholder 2"/>
-          <p:cNvSpPr txBox="1">
-            <a:spLocks/>
-          </p:cNvSpPr>
+      <p:pic>
+        <p:nvPicPr>
+          <p:cNvPr id="1026" name="Picture 2" descr="Couchbase Server Install Wizard 1"/>
+          <p:cNvPicPr>
+            <a:picLocks noChangeAspect="1" noChangeArrowheads="1"/>
+          </p:cNvPicPr>
           <p:nvPr/>
-        </p:nvSpPr>
-        <p:spPr>
+        </p:nvPicPr>
+        <p:blipFill>
+          <a:blip r:embed="rId2">
+            <a:extLst>
+              <a:ext uri="{28A0092B-C50C-407E-A947-70E740481C1C}">
+                <a14:useLocalDpi xmlns:a14="http://schemas.microsoft.com/office/drawing/2010/main" val="0"/>
+              </a:ext>
+            </a:extLst>
+          </a:blip>
+          <a:srcRect/>
+          <a:stretch>
+            <a:fillRect/>
+          </a:stretch>
+        </p:blipFill>
+        <p:spPr bwMode="auto">
           <a:xfrm>
-            <a:off x="457200" y="685800"/>
-            <a:ext cx="8007739" cy="3394472"/>
+            <a:off x="2195513" y="762000"/>
+            <a:ext cx="4752975" cy="3619500"/>
           </a:xfrm>
           <a:prstGeom prst="rect">
             <a:avLst/>
           </a:prstGeom>
+          <a:noFill/>
+          <a:extLst>
+            <a:ext uri="{909E8E84-426E-40DD-AFC4-6F175D3DCCD1}">
+              <a14:hiddenFill xmlns:a14="http://schemas.microsoft.com/office/drawing/2010/main">
+                <a:solidFill>
+                  <a:srgbClr val="FFFFFF"/>
+                </a:solidFill>
+              </a14:hiddenFill>
+            </a:ext>
+          </a:extLst>
         </p:spPr>
-        <p:txBody>
-          <a:bodyPr/>
-          <a:lstStyle>
-            <a:lvl1pPr marL="228600" indent="-228600" algn="l" defTabSz="457200" rtl="0" eaLnBrk="1" latinLnBrk="0" hangingPunct="1">
-              <a:spcBef>
-                <a:spcPts val="0"/>
-              </a:spcBef>
-              <a:buClr>
-                <a:schemeClr val="accent1"/>
-              </a:buClr>
-              <a:buFont typeface="Wingdings" charset="2"/>
-              <a:buChar char="§"/>
-              <a:defRPr sz="2400" kern="1200">
-                <a:solidFill>
-                  <a:schemeClr val="tx1"/>
-                </a:solidFill>
-                <a:latin typeface="+mn-lt"/>
-                <a:ea typeface="+mn-ea"/>
-                <a:cs typeface="+mn-cs"/>
-              </a:defRPr>
-            </a:lvl1pPr>
-            <a:lvl2pPr marL="455613" indent="-227013" algn="l" defTabSz="457200" rtl="0" eaLnBrk="1" latinLnBrk="0" hangingPunct="1">
-              <a:spcBef>
-                <a:spcPts val="0"/>
-              </a:spcBef>
-              <a:buClr>
-                <a:srgbClr val="262626"/>
-              </a:buClr>
-              <a:buFont typeface="Wingdings" charset="2"/>
-              <a:buChar char="§"/>
-              <a:defRPr sz="2000" kern="1200">
-                <a:solidFill>
-                  <a:schemeClr val="tx1"/>
-                </a:solidFill>
-                <a:latin typeface="+mn-lt"/>
-                <a:ea typeface="+mn-ea"/>
-                <a:cs typeface="+mn-cs"/>
-              </a:defRPr>
-            </a:lvl2pPr>
-            <a:lvl3pPr marL="455613" indent="-228600" algn="l" defTabSz="457200" rtl="0" eaLnBrk="1" latinLnBrk="0" hangingPunct="1">
-              <a:spcBef>
-                <a:spcPts val="0"/>
-              </a:spcBef>
-              <a:buClr>
-                <a:srgbClr val="262626"/>
-              </a:buClr>
-              <a:buFont typeface="Wingdings" charset="2"/>
-              <a:buChar char="§"/>
-              <a:defRPr sz="2000" kern="1200">
-                <a:solidFill>
-                  <a:schemeClr val="tx1"/>
-                </a:solidFill>
-                <a:latin typeface="+mn-lt"/>
-                <a:ea typeface="+mn-ea"/>
-                <a:cs typeface="+mn-cs"/>
-              </a:defRPr>
-            </a:lvl3pPr>
-            <a:lvl4pPr marL="455613" indent="-228600" algn="l" defTabSz="457200" rtl="0" eaLnBrk="1" latinLnBrk="0" hangingPunct="1">
-              <a:spcBef>
-                <a:spcPts val="0"/>
-              </a:spcBef>
-              <a:buClr>
-                <a:srgbClr val="262626"/>
-              </a:buClr>
-              <a:buFont typeface="Wingdings" charset="2"/>
-              <a:buChar char="§"/>
-              <a:defRPr sz="2000" kern="1200">
-                <a:solidFill>
-                  <a:schemeClr val="tx1"/>
-                </a:solidFill>
-                <a:latin typeface="+mn-lt"/>
-                <a:ea typeface="+mn-ea"/>
-                <a:cs typeface="+mn-cs"/>
-              </a:defRPr>
-            </a:lvl4pPr>
-            <a:lvl5pPr marL="455613" indent="-228600" algn="l" defTabSz="457200" rtl="0" eaLnBrk="1" latinLnBrk="0" hangingPunct="1">
-              <a:spcBef>
-                <a:spcPts val="200"/>
-              </a:spcBef>
-              <a:buClr>
-                <a:srgbClr val="262626"/>
-              </a:buClr>
-              <a:buFont typeface="Wingdings" charset="2"/>
-              <a:buChar char="§"/>
-              <a:defRPr sz="2000" kern="1200">
-                <a:solidFill>
-                  <a:schemeClr val="tx1"/>
-                </a:solidFill>
-                <a:latin typeface="+mn-lt"/>
-                <a:ea typeface="+mn-ea"/>
-                <a:cs typeface="+mn-cs"/>
-              </a:defRPr>
-            </a:lvl5pPr>
-            <a:lvl6pPr marL="2514600" indent="-228600" algn="l" defTabSz="457200" rtl="0" eaLnBrk="1" latinLnBrk="0" hangingPunct="1">
-              <a:spcBef>
-                <a:spcPct val="20000"/>
-              </a:spcBef>
-              <a:buFont typeface="Arial"/>
-              <a:buChar char="•"/>
-              <a:defRPr sz="2000" kern="1200">
-                <a:solidFill>
-                  <a:schemeClr val="tx1"/>
-                </a:solidFill>
-                <a:latin typeface="+mn-lt"/>
-                <a:ea typeface="+mn-ea"/>
-                <a:cs typeface="+mn-cs"/>
-              </a:defRPr>
-            </a:lvl6pPr>
-            <a:lvl7pPr marL="2971800" indent="-228600" algn="l" defTabSz="457200" rtl="0" eaLnBrk="1" latinLnBrk="0" hangingPunct="1">
-              <a:spcBef>
-                <a:spcPct val="20000"/>
-              </a:spcBef>
-              <a:buFont typeface="Arial"/>
-              <a:buChar char="•"/>
-              <a:defRPr sz="2000" kern="1200">
-                <a:solidFill>
-                  <a:schemeClr val="tx1"/>
-                </a:solidFill>
-                <a:latin typeface="+mn-lt"/>
-                <a:ea typeface="+mn-ea"/>
-                <a:cs typeface="+mn-cs"/>
-              </a:defRPr>
-            </a:lvl7pPr>
-            <a:lvl8pPr marL="3429000" indent="-228600" algn="l" defTabSz="457200" rtl="0" eaLnBrk="1" latinLnBrk="0" hangingPunct="1">
-              <a:spcBef>
-                <a:spcPct val="20000"/>
-              </a:spcBef>
-              <a:buFont typeface="Arial"/>
-              <a:buChar char="•"/>
-              <a:defRPr sz="2000" kern="1200">
-                <a:solidFill>
-                  <a:schemeClr val="tx1"/>
-                </a:solidFill>
-                <a:latin typeface="+mn-lt"/>
-                <a:ea typeface="+mn-ea"/>
-                <a:cs typeface="+mn-cs"/>
-              </a:defRPr>
-            </a:lvl8pPr>
-            <a:lvl9pPr marL="3886200" indent="-228600" algn="l" defTabSz="457200" rtl="0" eaLnBrk="1" latinLnBrk="0" hangingPunct="1">
-              <a:spcBef>
-                <a:spcPct val="20000"/>
-              </a:spcBef>
-              <a:buFont typeface="Arial"/>
-              <a:buChar char="•"/>
-              <a:defRPr sz="2000" kern="1200">
-                <a:solidFill>
-                  <a:schemeClr val="tx1"/>
-                </a:solidFill>
-                <a:latin typeface="+mn-lt"/>
-                <a:ea typeface="+mn-ea"/>
-                <a:cs typeface="+mn-cs"/>
-              </a:defRPr>
-            </a:lvl9pPr>
-          </a:lstStyle>
-          <a:p>
-            <a:pPr marL="342900" indent="-342900">
-              <a:buFont typeface="Arial" charset="0"/>
-              <a:buChar char="•"/>
-            </a:pPr>
-            <a:endParaRPr lang="en-US" dirty="0"/>
-          </a:p>
-          <a:p>
-            <a:endParaRPr lang="en-US" dirty="0"/>
-          </a:p>
-        </p:txBody>
-      </p:sp>
+      </p:pic>
     </p:spTree>
     <p:extLst>
       <p:ext uri="{BB962C8B-B14F-4D97-AF65-F5344CB8AC3E}">
-        <p14:creationId xmlns:p14="http://schemas.microsoft.com/office/powerpoint/2010/main" val="84375709"/>
+        <p14:creationId xmlns:p14="http://schemas.microsoft.com/office/powerpoint/2010/main" val="2934162958"/>
       </p:ext>
     </p:extLst>
   </p:cSld>
@@ -8398,182 +8894,72 @@
           <a:p>
             <a:r>
               <a:rPr lang="en-US" dirty="0"/>
-              <a:t>Install with Docker</a:t>
+              <a:t>Configuration</a:t>
             </a:r>
           </a:p>
         </p:txBody>
       </p:sp>
+      <p:pic>
+        <p:nvPicPr>
+          <p:cNvPr id="2050" name="Picture 2" descr="Couchbase Server Console"/>
+          <p:cNvPicPr>
+            <a:picLocks noChangeAspect="1" noChangeArrowheads="1"/>
+          </p:cNvPicPr>
+          <p:nvPr/>
+        </p:nvPicPr>
+        <p:blipFill>
+          <a:blip r:embed="rId2">
+            <a:extLst>
+              <a:ext uri="{28A0092B-C50C-407E-A947-70E740481C1C}">
+                <a14:useLocalDpi xmlns:a14="http://schemas.microsoft.com/office/drawing/2010/main" val="0"/>
+              </a:ext>
+            </a:extLst>
+          </a:blip>
+          <a:srcRect/>
+          <a:stretch>
+            <a:fillRect/>
+          </a:stretch>
+        </p:blipFill>
+        <p:spPr bwMode="auto">
+          <a:xfrm>
+            <a:off x="2390775" y="1019483"/>
+            <a:ext cx="4505325" cy="3923992"/>
+          </a:xfrm>
+          <a:prstGeom prst="rect">
+            <a:avLst/>
+          </a:prstGeom>
+          <a:noFill/>
+          <a:extLst>
+            <a:ext uri="{909E8E84-426E-40DD-AFC4-6F175D3DCCD1}">
+              <a14:hiddenFill xmlns:a14="http://schemas.microsoft.com/office/drawing/2010/main">
+                <a:solidFill>
+                  <a:srgbClr val="FFFFFF"/>
+                </a:solidFill>
+              </a14:hiddenFill>
+            </a:ext>
+          </a:extLst>
+        </p:spPr>
+      </p:pic>
       <p:sp>
         <p:nvSpPr>
-          <p:cNvPr id="3" name="Content Placeholder 2"/>
-          <p:cNvSpPr txBox="1">
-            <a:spLocks/>
-          </p:cNvSpPr>
+          <p:cNvPr id="3" name="Rectangle 2"/>
+          <p:cNvSpPr/>
           <p:nvPr/>
         </p:nvSpPr>
         <p:spPr>
           <a:xfrm>
-            <a:off x="457200" y="685800"/>
-            <a:ext cx="8007739" cy="3394472"/>
+            <a:off x="275812" y="600030"/>
+            <a:ext cx="2513830" cy="646331"/>
           </a:xfrm>
           <a:prstGeom prst="rect">
             <a:avLst/>
           </a:prstGeom>
         </p:spPr>
         <p:txBody>
-          <a:bodyPr/>
-          <a:lstStyle>
-            <a:lvl1pPr marL="228600" indent="-228600" algn="l" defTabSz="457200" rtl="0" eaLnBrk="1" latinLnBrk="0" hangingPunct="1">
-              <a:spcBef>
-                <a:spcPts val="0"/>
-              </a:spcBef>
-              <a:buClr>
-                <a:schemeClr val="accent1"/>
-              </a:buClr>
-              <a:buFont typeface="Wingdings" charset="2"/>
-              <a:buChar char="§"/>
-              <a:defRPr sz="2400" kern="1200">
-                <a:solidFill>
-                  <a:schemeClr val="tx1"/>
-                </a:solidFill>
-                <a:latin typeface="+mn-lt"/>
-                <a:ea typeface="+mn-ea"/>
-                <a:cs typeface="+mn-cs"/>
-              </a:defRPr>
-            </a:lvl1pPr>
-            <a:lvl2pPr marL="455613" indent="-227013" algn="l" defTabSz="457200" rtl="0" eaLnBrk="1" latinLnBrk="0" hangingPunct="1">
-              <a:spcBef>
-                <a:spcPts val="0"/>
-              </a:spcBef>
-              <a:buClr>
-                <a:srgbClr val="262626"/>
-              </a:buClr>
-              <a:buFont typeface="Wingdings" charset="2"/>
-              <a:buChar char="§"/>
-              <a:defRPr sz="2000" kern="1200">
-                <a:solidFill>
-                  <a:schemeClr val="tx1"/>
-                </a:solidFill>
-                <a:latin typeface="+mn-lt"/>
-                <a:ea typeface="+mn-ea"/>
-                <a:cs typeface="+mn-cs"/>
-              </a:defRPr>
-            </a:lvl2pPr>
-            <a:lvl3pPr marL="455613" indent="-228600" algn="l" defTabSz="457200" rtl="0" eaLnBrk="1" latinLnBrk="0" hangingPunct="1">
-              <a:spcBef>
-                <a:spcPts val="0"/>
-              </a:spcBef>
-              <a:buClr>
-                <a:srgbClr val="262626"/>
-              </a:buClr>
-              <a:buFont typeface="Wingdings" charset="2"/>
-              <a:buChar char="§"/>
-              <a:defRPr sz="2000" kern="1200">
-                <a:solidFill>
-                  <a:schemeClr val="tx1"/>
-                </a:solidFill>
-                <a:latin typeface="+mn-lt"/>
-                <a:ea typeface="+mn-ea"/>
-                <a:cs typeface="+mn-cs"/>
-              </a:defRPr>
-            </a:lvl3pPr>
-            <a:lvl4pPr marL="455613" indent="-228600" algn="l" defTabSz="457200" rtl="0" eaLnBrk="1" latinLnBrk="0" hangingPunct="1">
-              <a:spcBef>
-                <a:spcPts val="0"/>
-              </a:spcBef>
-              <a:buClr>
-                <a:srgbClr val="262626"/>
-              </a:buClr>
-              <a:buFont typeface="Wingdings" charset="2"/>
-              <a:buChar char="§"/>
-              <a:defRPr sz="2000" kern="1200">
-                <a:solidFill>
-                  <a:schemeClr val="tx1"/>
-                </a:solidFill>
-                <a:latin typeface="+mn-lt"/>
-                <a:ea typeface="+mn-ea"/>
-                <a:cs typeface="+mn-cs"/>
-              </a:defRPr>
-            </a:lvl4pPr>
-            <a:lvl5pPr marL="455613" indent="-228600" algn="l" defTabSz="457200" rtl="0" eaLnBrk="1" latinLnBrk="0" hangingPunct="1">
-              <a:spcBef>
-                <a:spcPts val="200"/>
-              </a:spcBef>
-              <a:buClr>
-                <a:srgbClr val="262626"/>
-              </a:buClr>
-              <a:buFont typeface="Wingdings" charset="2"/>
-              <a:buChar char="§"/>
-              <a:defRPr sz="2000" kern="1200">
-                <a:solidFill>
-                  <a:schemeClr val="tx1"/>
-                </a:solidFill>
-                <a:latin typeface="+mn-lt"/>
-                <a:ea typeface="+mn-ea"/>
-                <a:cs typeface="+mn-cs"/>
-              </a:defRPr>
-            </a:lvl5pPr>
-            <a:lvl6pPr marL="2514600" indent="-228600" algn="l" defTabSz="457200" rtl="0" eaLnBrk="1" latinLnBrk="0" hangingPunct="1">
-              <a:spcBef>
-                <a:spcPct val="20000"/>
-              </a:spcBef>
-              <a:buFont typeface="Arial"/>
-              <a:buChar char="•"/>
-              <a:defRPr sz="2000" kern="1200">
-                <a:solidFill>
-                  <a:schemeClr val="tx1"/>
-                </a:solidFill>
-                <a:latin typeface="+mn-lt"/>
-                <a:ea typeface="+mn-ea"/>
-                <a:cs typeface="+mn-cs"/>
-              </a:defRPr>
-            </a:lvl6pPr>
-            <a:lvl7pPr marL="2971800" indent="-228600" algn="l" defTabSz="457200" rtl="0" eaLnBrk="1" latinLnBrk="0" hangingPunct="1">
-              <a:spcBef>
-                <a:spcPct val="20000"/>
-              </a:spcBef>
-              <a:buFont typeface="Arial"/>
-              <a:buChar char="•"/>
-              <a:defRPr sz="2000" kern="1200">
-                <a:solidFill>
-                  <a:schemeClr val="tx1"/>
-                </a:solidFill>
-                <a:latin typeface="+mn-lt"/>
-                <a:ea typeface="+mn-ea"/>
-                <a:cs typeface="+mn-cs"/>
-              </a:defRPr>
-            </a:lvl7pPr>
-            <a:lvl8pPr marL="3429000" indent="-228600" algn="l" defTabSz="457200" rtl="0" eaLnBrk="1" latinLnBrk="0" hangingPunct="1">
-              <a:spcBef>
-                <a:spcPct val="20000"/>
-              </a:spcBef>
-              <a:buFont typeface="Arial"/>
-              <a:buChar char="•"/>
-              <a:defRPr sz="2000" kern="1200">
-                <a:solidFill>
-                  <a:schemeClr val="tx1"/>
-                </a:solidFill>
-                <a:latin typeface="+mn-lt"/>
-                <a:ea typeface="+mn-ea"/>
-                <a:cs typeface="+mn-cs"/>
-              </a:defRPr>
-            </a:lvl8pPr>
-            <a:lvl9pPr marL="3886200" indent="-228600" algn="l" defTabSz="457200" rtl="0" eaLnBrk="1" latinLnBrk="0" hangingPunct="1">
-              <a:spcBef>
-                <a:spcPct val="20000"/>
-              </a:spcBef>
-              <a:buFont typeface="Arial"/>
-              <a:buChar char="•"/>
-              <a:defRPr sz="2000" kern="1200">
-                <a:solidFill>
-                  <a:schemeClr val="tx1"/>
-                </a:solidFill>
-                <a:latin typeface="+mn-lt"/>
-                <a:ea typeface="+mn-ea"/>
-                <a:cs typeface="+mn-cs"/>
-              </a:defRPr>
-            </a:lvl9pPr>
-          </a:lstStyle>
+          <a:bodyPr wrap="none">
+            <a:spAutoFit/>
+          </a:bodyPr>
+          <a:lstStyle/>
           <a:p>
             <a:pPr marL="342900" indent="-342900">
               <a:buFont typeface="Arial" charset="0"/>
@@ -8581,21 +8967,11 @@
             </a:pPr>
             <a:r>
               <a:rPr lang="en-US" dirty="0">
-                <a:hlinkClick r:id="rId2"/>
+                <a:hlinkClick r:id="rId3"/>
               </a:rPr>
-              <a:t>https://hub.docker.com/_/couchbase/</a:t>
+              <a:t>http://localhost:8091</a:t>
             </a:r>
             <a:endParaRPr lang="en-US" dirty="0"/>
-          </a:p>
-          <a:p>
-            <a:pPr marL="342900" indent="-342900">
-              <a:buFont typeface="Arial" charset="0"/>
-              <a:buChar char="•"/>
-            </a:pPr>
-            <a:r>
-              <a:rPr lang="en-US" dirty="0"/>
-              <a:t>enterprise-4.5.0</a:t>
-            </a:r>
           </a:p>
           <a:p>
             <a:pPr marL="342900" indent="-342900">
@@ -8604,15 +8980,12 @@
             </a:pPr>
             <a:endParaRPr lang="en-US" dirty="0"/>
           </a:p>
-          <a:p>
-            <a:endParaRPr lang="en-US" dirty="0"/>
-          </a:p>
         </p:txBody>
       </p:sp>
     </p:spTree>
     <p:extLst>
       <p:ext uri="{BB962C8B-B14F-4D97-AF65-F5344CB8AC3E}">
-        <p14:creationId xmlns:p14="http://schemas.microsoft.com/office/powerpoint/2010/main" val="66688450"/>
+        <p14:creationId xmlns:p14="http://schemas.microsoft.com/office/powerpoint/2010/main" val="4082690878"/>
       </p:ext>
     </p:extLst>
   </p:cSld>
@@ -8646,30 +9019,66 @@
             <a:spLocks noGrp="1"/>
           </p:cNvSpPr>
           <p:nvPr>
-            <p:ph type="ctrTitle"/>
+            <p:ph type="title"/>
           </p:nvPr>
         </p:nvSpPr>
-        <p:spPr>
-          <a:xfrm>
-            <a:off x="685800" y="925974"/>
-            <a:ext cx="7772400" cy="2338001"/>
-          </a:xfrm>
-        </p:spPr>
+        <p:spPr/>
         <p:txBody>
           <a:bodyPr/>
           <a:lstStyle/>
           <a:p>
             <a:r>
-              <a:rPr lang="en-US" sz="3600" dirty="0"/>
-              <a:t>Questions</a:t>
+              <a:rPr lang="en-US" dirty="0"/>
+              <a:t>Configuration</a:t>
             </a:r>
           </a:p>
         </p:txBody>
       </p:sp>
+      <p:pic>
+        <p:nvPicPr>
+          <p:cNvPr id="3074" name="Picture 2" descr="Couchbase Server Setup Wizard"/>
+          <p:cNvPicPr>
+            <a:picLocks noChangeAspect="1" noChangeArrowheads="1"/>
+          </p:cNvPicPr>
+          <p:nvPr/>
+        </p:nvPicPr>
+        <p:blipFill>
+          <a:blip r:embed="rId2">
+            <a:extLst>
+              <a:ext uri="{28A0092B-C50C-407E-A947-70E740481C1C}">
+                <a14:useLocalDpi xmlns:a14="http://schemas.microsoft.com/office/drawing/2010/main" val="0"/>
+              </a:ext>
+            </a:extLst>
+          </a:blip>
+          <a:srcRect/>
+          <a:stretch>
+            <a:fillRect/>
+          </a:stretch>
+        </p:blipFill>
+        <p:spPr bwMode="auto">
+          <a:xfrm>
+            <a:off x="1343025" y="1385888"/>
+            <a:ext cx="6457950" cy="2371725"/>
+          </a:xfrm>
+          <a:prstGeom prst="rect">
+            <a:avLst/>
+          </a:prstGeom>
+          <a:noFill/>
+          <a:extLst>
+            <a:ext uri="{909E8E84-426E-40DD-AFC4-6F175D3DCCD1}">
+              <a14:hiddenFill xmlns:a14="http://schemas.microsoft.com/office/drawing/2010/main">
+                <a:solidFill>
+                  <a:srgbClr val="FFFFFF"/>
+                </a:solidFill>
+              </a14:hiddenFill>
+            </a:ext>
+          </a:extLst>
+        </p:spPr>
+      </p:pic>
     </p:spTree>
     <p:extLst>
       <p:ext uri="{BB962C8B-B14F-4D97-AF65-F5344CB8AC3E}">
-        <p14:creationId xmlns:p14="http://schemas.microsoft.com/office/powerpoint/2010/main" val="3620921753"/>
+        <p14:creationId xmlns:p14="http://schemas.microsoft.com/office/powerpoint/2010/main" val="2210796310"/>
       </p:ext>
     </p:extLst>
   </p:cSld>

</xml_diff>

<commit_message>
updates to part 1 slides
</commit_message>
<xml_diff>
--- a/connect2016/developer/01/01.pptx
+++ b/connect2016/developer/01/01.pptx
@@ -6,26 +6,31 @@
     <p:sldMasterId id="2147483684" r:id="rId2"/>
   </p:sldMasterIdLst>
   <p:notesMasterIdLst>
-    <p:notesMasterId r:id="rId17"/>
+    <p:notesMasterId r:id="rId22"/>
   </p:notesMasterIdLst>
   <p:handoutMasterIdLst>
-    <p:handoutMasterId r:id="rId18"/>
+    <p:handoutMasterId r:id="rId23"/>
   </p:handoutMasterIdLst>
   <p:sldIdLst>
     <p:sldId id="444" r:id="rId3"/>
     <p:sldId id="445" r:id="rId4"/>
-    <p:sldId id="472" r:id="rId5"/>
-    <p:sldId id="485" r:id="rId6"/>
-    <p:sldId id="486" r:id="rId7"/>
-    <p:sldId id="487" r:id="rId8"/>
-    <p:sldId id="488" r:id="rId9"/>
-    <p:sldId id="489" r:id="rId10"/>
-    <p:sldId id="490" r:id="rId11"/>
-    <p:sldId id="491" r:id="rId12"/>
-    <p:sldId id="492" r:id="rId13"/>
-    <p:sldId id="493" r:id="rId14"/>
-    <p:sldId id="494" r:id="rId15"/>
-    <p:sldId id="484" r:id="rId16"/>
+    <p:sldId id="497" r:id="rId5"/>
+    <p:sldId id="472" r:id="rId6"/>
+    <p:sldId id="488" r:id="rId7"/>
+    <p:sldId id="485" r:id="rId8"/>
+    <p:sldId id="495" r:id="rId9"/>
+    <p:sldId id="486" r:id="rId10"/>
+    <p:sldId id="496" r:id="rId11"/>
+    <p:sldId id="487" r:id="rId12"/>
+    <p:sldId id="489" r:id="rId13"/>
+    <p:sldId id="498" r:id="rId14"/>
+    <p:sldId id="499" r:id="rId15"/>
+    <p:sldId id="490" r:id="rId16"/>
+    <p:sldId id="491" r:id="rId17"/>
+    <p:sldId id="492" r:id="rId18"/>
+    <p:sldId id="493" r:id="rId19"/>
+    <p:sldId id="494" r:id="rId20"/>
+    <p:sldId id="484" r:id="rId21"/>
   </p:sldIdLst>
   <p:sldSz cx="9144000" cy="5143500" type="screen16x9"/>
   <p:notesSz cx="6858000" cy="9144000"/>
@@ -131,12 +136,17 @@
           <p14:sldIdLst>
             <p14:sldId id="444"/>
             <p14:sldId id="445"/>
+            <p14:sldId id="497"/>
             <p14:sldId id="472"/>
+            <p14:sldId id="488"/>
             <p14:sldId id="485"/>
+            <p14:sldId id="495"/>
             <p14:sldId id="486"/>
+            <p14:sldId id="496"/>
             <p14:sldId id="487"/>
-            <p14:sldId id="488"/>
             <p14:sldId id="489"/>
+            <p14:sldId id="498"/>
+            <p14:sldId id="499"/>
             <p14:sldId id="490"/>
             <p14:sldId id="491"/>
             <p14:sldId id="492"/>
@@ -271,7 +281,7 @@
           <a:p>
             <a:fld id="{B5389E1E-C654-E943-9883-792E99AD7287}" type="datetimeFigureOut">
               <a:rPr lang="en-US" smtClean="0"/>
-              <a:t>9/20/2016</a:t>
+              <a:t>10/5/2016</a:t>
             </a:fld>
             <a:endParaRPr lang="en-US"/>
           </a:p>
@@ -437,7 +447,7 @@
           <a:p>
             <a:fld id="{9920D99B-2862-464A-984E-65BFC5FC0BBC}" type="datetimeFigureOut">
               <a:rPr lang="en-US" smtClean="0"/>
-              <a:t>9/20/2016</a:t>
+              <a:t>10/5/2016</a:t>
             </a:fld>
             <a:endParaRPr lang="en-US"/>
           </a:p>
@@ -860,7 +870,7 @@
           <a:p>
             <a:fld id="{F39351FC-18D6-4741-8EEB-9FDB1F020AAC}" type="slidenum">
               <a:rPr lang="en-US" smtClean="0"/>
-              <a:t>3</a:t>
+              <a:t>4</a:t>
             </a:fld>
             <a:endParaRPr lang="en-US"/>
           </a:p>
@@ -944,7 +954,7 @@
           <a:p>
             <a:fld id="{F39351FC-18D6-4741-8EEB-9FDB1F020AAC}" type="slidenum">
               <a:rPr lang="en-US" smtClean="0"/>
-              <a:t>4</a:t>
+              <a:t>6</a:t>
             </a:fld>
             <a:endParaRPr lang="en-US"/>
           </a:p>
@@ -954,6 +964,242 @@
     <p:extLst>
       <p:ext uri="{BB962C8B-B14F-4D97-AF65-F5344CB8AC3E}">
         <p14:creationId xmlns:p14="http://schemas.microsoft.com/office/powerpoint/2010/main" val="1716529998"/>
+      </p:ext>
+    </p:extLst>
+  </p:cSld>
+  <p:clrMapOvr>
+    <a:masterClrMapping/>
+  </p:clrMapOvr>
+</p:notes>
+</file>
+
+<file path=ppt/notesSlides/notesSlide3.xml><?xml version="1.0" encoding="utf-8"?>
+<p:notes xmlns:a="http://schemas.openxmlformats.org/drawingml/2006/main" xmlns:r="http://schemas.openxmlformats.org/officeDocument/2006/relationships" xmlns:p="http://schemas.openxmlformats.org/presentationml/2006/main">
+  <p:cSld>
+    <p:spTree>
+      <p:nvGrpSpPr>
+        <p:cNvPr id="1" name=""/>
+        <p:cNvGrpSpPr/>
+        <p:nvPr/>
+      </p:nvGrpSpPr>
+      <p:grpSpPr>
+        <a:xfrm>
+          <a:off x="0" y="0"/>
+          <a:ext cx="0" cy="0"/>
+          <a:chOff x="0" y="0"/>
+          <a:chExt cx="0" cy="0"/>
+        </a:xfrm>
+      </p:grpSpPr>
+      <p:sp>
+        <p:nvSpPr>
+          <p:cNvPr id="2" name="Slide Image Placeholder 1"/>
+          <p:cNvSpPr>
+            <a:spLocks noGrp="1" noRot="1" noChangeAspect="1"/>
+          </p:cNvSpPr>
+          <p:nvPr>
+            <p:ph type="sldImg"/>
+          </p:nvPr>
+        </p:nvSpPr>
+        <p:spPr/>
+      </p:sp>
+      <p:sp>
+        <p:nvSpPr>
+          <p:cNvPr id="3" name="Notes Placeholder 2"/>
+          <p:cNvSpPr>
+            <a:spLocks noGrp="1"/>
+          </p:cNvSpPr>
+          <p:nvPr>
+            <p:ph type="body" idx="1"/>
+          </p:nvPr>
+        </p:nvSpPr>
+        <p:spPr/>
+        <p:txBody>
+          <a:bodyPr/>
+          <a:lstStyle/>
+          <a:p>
+            <a:r>
+              <a:rPr lang="en-US" dirty="0"/>
+              <a:t>The network settings may not be optimal</a:t>
+            </a:r>
+            <a:r>
+              <a:rPr lang="en-US" baseline="0" dirty="0"/>
+              <a:t> for going into production. They are simplified for this lab.</a:t>
+            </a:r>
+            <a:endParaRPr lang="en-US" dirty="0"/>
+          </a:p>
+        </p:txBody>
+      </p:sp>
+      <p:sp>
+        <p:nvSpPr>
+          <p:cNvPr id="4" name="Slide Number Placeholder 3"/>
+          <p:cNvSpPr>
+            <a:spLocks noGrp="1"/>
+          </p:cNvSpPr>
+          <p:nvPr>
+            <p:ph type="sldNum" sz="quarter" idx="10"/>
+          </p:nvPr>
+        </p:nvSpPr>
+        <p:spPr/>
+        <p:txBody>
+          <a:bodyPr/>
+          <a:lstStyle/>
+          <a:p>
+            <a:fld id="{F39351FC-18D6-4741-8EEB-9FDB1F020AAC}" type="slidenum">
+              <a:rPr lang="en-US" smtClean="0"/>
+              <a:t>7</a:t>
+            </a:fld>
+            <a:endParaRPr lang="en-US"/>
+          </a:p>
+        </p:txBody>
+      </p:sp>
+    </p:spTree>
+    <p:extLst>
+      <p:ext uri="{BB962C8B-B14F-4D97-AF65-F5344CB8AC3E}">
+        <p14:creationId xmlns:p14="http://schemas.microsoft.com/office/powerpoint/2010/main" val="642023318"/>
+      </p:ext>
+    </p:extLst>
+  </p:cSld>
+  <p:clrMapOvr>
+    <a:masterClrMapping/>
+  </p:clrMapOvr>
+</p:notes>
+</file>
+
+<file path=ppt/notesSlides/notesSlide4.xml><?xml version="1.0" encoding="utf-8"?>
+<p:notes xmlns:a="http://schemas.openxmlformats.org/drawingml/2006/main" xmlns:r="http://schemas.openxmlformats.org/officeDocument/2006/relationships" xmlns:p="http://schemas.openxmlformats.org/presentationml/2006/main">
+  <p:cSld>
+    <p:spTree>
+      <p:nvGrpSpPr>
+        <p:cNvPr id="1" name=""/>
+        <p:cNvGrpSpPr/>
+        <p:nvPr/>
+      </p:nvGrpSpPr>
+      <p:grpSpPr>
+        <a:xfrm>
+          <a:off x="0" y="0"/>
+          <a:ext cx="0" cy="0"/>
+          <a:chOff x="0" y="0"/>
+          <a:chExt cx="0" cy="0"/>
+        </a:xfrm>
+      </p:grpSpPr>
+      <p:sp>
+        <p:nvSpPr>
+          <p:cNvPr id="2" name="Slide Image Placeholder 1"/>
+          <p:cNvSpPr>
+            <a:spLocks noGrp="1" noRot="1" noChangeAspect="1"/>
+          </p:cNvSpPr>
+          <p:nvPr>
+            <p:ph type="sldImg"/>
+          </p:nvPr>
+        </p:nvSpPr>
+        <p:spPr/>
+      </p:sp>
+      <p:sp>
+        <p:nvSpPr>
+          <p:cNvPr id="3" name="Notes Placeholder 2"/>
+          <p:cNvSpPr>
+            <a:spLocks noGrp="1"/>
+          </p:cNvSpPr>
+          <p:nvPr>
+            <p:ph type="body" idx="1"/>
+          </p:nvPr>
+        </p:nvSpPr>
+        <p:spPr/>
+        <p:txBody>
+          <a:bodyPr/>
+          <a:lstStyle/>
+          <a:p>
+            <a:r>
+              <a:rPr lang="en-US" dirty="0"/>
+              <a:t>-d run detached so</a:t>
+            </a:r>
+            <a:r>
+              <a:rPr lang="en-US" baseline="0" dirty="0"/>
+              <a:t> we get returned to the command line</a:t>
+            </a:r>
+          </a:p>
+          <a:p>
+            <a:r>
+              <a:rPr lang="en-US" baseline="0" dirty="0"/>
+              <a:t>--name to give it a friendly name of “</a:t>
+            </a:r>
+            <a:r>
+              <a:rPr lang="en-US" baseline="0" dirty="0" err="1"/>
+              <a:t>db</a:t>
+            </a:r>
+            <a:r>
+              <a:rPr lang="en-US" baseline="0" dirty="0"/>
+              <a:t>”</a:t>
+            </a:r>
+          </a:p>
+          <a:p>
+            <a:r>
+              <a:rPr lang="en-US" baseline="0" dirty="0"/>
+              <a:t>-p to specify which ports to publish</a:t>
+            </a:r>
+          </a:p>
+          <a:p>
+            <a:r>
+              <a:rPr lang="en-US" baseline="0" dirty="0"/>
+              <a:t>And finally ‘</a:t>
+            </a:r>
+            <a:r>
+              <a:rPr lang="en-US" baseline="0" dirty="0" err="1"/>
+              <a:t>couchbase</a:t>
+            </a:r>
+            <a:r>
+              <a:rPr lang="en-US" baseline="0" dirty="0"/>
+              <a:t>’ to pull the </a:t>
+            </a:r>
+            <a:r>
+              <a:rPr lang="en-US" baseline="0" dirty="0" err="1"/>
+              <a:t>couchbase</a:t>
+            </a:r>
+            <a:r>
+              <a:rPr lang="en-US" baseline="0" dirty="0"/>
+              <a:t> image from </a:t>
+            </a:r>
+            <a:r>
+              <a:rPr lang="en-US" baseline="0" dirty="0" err="1"/>
+              <a:t>docker</a:t>
+            </a:r>
+            <a:r>
+              <a:rPr lang="en-US" baseline="0" dirty="0"/>
+              <a:t> hub</a:t>
+            </a:r>
+          </a:p>
+          <a:p>
+            <a:endParaRPr lang="en-US" dirty="0"/>
+          </a:p>
+        </p:txBody>
+      </p:sp>
+      <p:sp>
+        <p:nvSpPr>
+          <p:cNvPr id="4" name="Slide Number Placeholder 3"/>
+          <p:cNvSpPr>
+            <a:spLocks noGrp="1"/>
+          </p:cNvSpPr>
+          <p:nvPr>
+            <p:ph type="sldNum" sz="quarter" idx="10"/>
+          </p:nvPr>
+        </p:nvSpPr>
+        <p:spPr/>
+        <p:txBody>
+          <a:bodyPr/>
+          <a:lstStyle/>
+          <a:p>
+            <a:fld id="{F39351FC-18D6-4741-8EEB-9FDB1F020AAC}" type="slidenum">
+              <a:rPr lang="en-US" smtClean="0"/>
+              <a:t>10</a:t>
+            </a:fld>
+            <a:endParaRPr lang="en-US"/>
+          </a:p>
+        </p:txBody>
+      </p:sp>
+    </p:spTree>
+    <p:extLst>
+      <p:ext uri="{BB962C8B-B14F-4D97-AF65-F5344CB8AC3E}">
+        <p14:creationId xmlns:p14="http://schemas.microsoft.com/office/powerpoint/2010/main" val="2203849020"/>
       </p:ext>
     </p:extLst>
   </p:cSld>
@@ -6882,56 +7128,337 @@
           <a:p>
             <a:r>
               <a:rPr lang="en-US" dirty="0"/>
-              <a:t>Configuration</a:t>
-            </a:r>
+              <a:t>Install with Docker</a:t>
+            </a:r>
+          </a:p>
+        </p:txBody>
+      </p:sp>
+      <p:sp>
+        <p:nvSpPr>
+          <p:cNvPr id="3" name="Content Placeholder 2"/>
+          <p:cNvSpPr txBox="1">
+            <a:spLocks/>
+          </p:cNvSpPr>
+          <p:nvPr/>
+        </p:nvSpPr>
+        <p:spPr>
+          <a:xfrm>
+            <a:off x="457200" y="685800"/>
+            <a:ext cx="8007739" cy="3394472"/>
+          </a:xfrm>
+          <a:prstGeom prst="rect">
+            <a:avLst/>
+          </a:prstGeom>
+        </p:spPr>
+        <p:txBody>
+          <a:bodyPr/>
+          <a:lstStyle>
+            <a:lvl1pPr marL="228600" indent="-228600" algn="l" defTabSz="457200" rtl="0" eaLnBrk="1" latinLnBrk="0" hangingPunct="1">
+              <a:spcBef>
+                <a:spcPts val="0"/>
+              </a:spcBef>
+              <a:buClr>
+                <a:schemeClr val="accent1"/>
+              </a:buClr>
+              <a:buFont typeface="Wingdings" charset="2"/>
+              <a:buChar char="§"/>
+              <a:defRPr sz="2400" kern="1200">
+                <a:solidFill>
+                  <a:schemeClr val="tx1"/>
+                </a:solidFill>
+                <a:latin typeface="+mn-lt"/>
+                <a:ea typeface="+mn-ea"/>
+                <a:cs typeface="+mn-cs"/>
+              </a:defRPr>
+            </a:lvl1pPr>
+            <a:lvl2pPr marL="455613" indent="-227013" algn="l" defTabSz="457200" rtl="0" eaLnBrk="1" latinLnBrk="0" hangingPunct="1">
+              <a:spcBef>
+                <a:spcPts val="0"/>
+              </a:spcBef>
+              <a:buClr>
+                <a:srgbClr val="262626"/>
+              </a:buClr>
+              <a:buFont typeface="Wingdings" charset="2"/>
+              <a:buChar char="§"/>
+              <a:defRPr sz="2000" kern="1200">
+                <a:solidFill>
+                  <a:schemeClr val="tx1"/>
+                </a:solidFill>
+                <a:latin typeface="+mn-lt"/>
+                <a:ea typeface="+mn-ea"/>
+                <a:cs typeface="+mn-cs"/>
+              </a:defRPr>
+            </a:lvl2pPr>
+            <a:lvl3pPr marL="455613" indent="-228600" algn="l" defTabSz="457200" rtl="0" eaLnBrk="1" latinLnBrk="0" hangingPunct="1">
+              <a:spcBef>
+                <a:spcPts val="0"/>
+              </a:spcBef>
+              <a:buClr>
+                <a:srgbClr val="262626"/>
+              </a:buClr>
+              <a:buFont typeface="Wingdings" charset="2"/>
+              <a:buChar char="§"/>
+              <a:defRPr sz="2000" kern="1200">
+                <a:solidFill>
+                  <a:schemeClr val="tx1"/>
+                </a:solidFill>
+                <a:latin typeface="+mn-lt"/>
+                <a:ea typeface="+mn-ea"/>
+                <a:cs typeface="+mn-cs"/>
+              </a:defRPr>
+            </a:lvl3pPr>
+            <a:lvl4pPr marL="455613" indent="-228600" algn="l" defTabSz="457200" rtl="0" eaLnBrk="1" latinLnBrk="0" hangingPunct="1">
+              <a:spcBef>
+                <a:spcPts val="0"/>
+              </a:spcBef>
+              <a:buClr>
+                <a:srgbClr val="262626"/>
+              </a:buClr>
+              <a:buFont typeface="Wingdings" charset="2"/>
+              <a:buChar char="§"/>
+              <a:defRPr sz="2000" kern="1200">
+                <a:solidFill>
+                  <a:schemeClr val="tx1"/>
+                </a:solidFill>
+                <a:latin typeface="+mn-lt"/>
+                <a:ea typeface="+mn-ea"/>
+                <a:cs typeface="+mn-cs"/>
+              </a:defRPr>
+            </a:lvl4pPr>
+            <a:lvl5pPr marL="455613" indent="-228600" algn="l" defTabSz="457200" rtl="0" eaLnBrk="1" latinLnBrk="0" hangingPunct="1">
+              <a:spcBef>
+                <a:spcPts val="200"/>
+              </a:spcBef>
+              <a:buClr>
+                <a:srgbClr val="262626"/>
+              </a:buClr>
+              <a:buFont typeface="Wingdings" charset="2"/>
+              <a:buChar char="§"/>
+              <a:defRPr sz="2000" kern="1200">
+                <a:solidFill>
+                  <a:schemeClr val="tx1"/>
+                </a:solidFill>
+                <a:latin typeface="+mn-lt"/>
+                <a:ea typeface="+mn-ea"/>
+                <a:cs typeface="+mn-cs"/>
+              </a:defRPr>
+            </a:lvl5pPr>
+            <a:lvl6pPr marL="2514600" indent="-228600" algn="l" defTabSz="457200" rtl="0" eaLnBrk="1" latinLnBrk="0" hangingPunct="1">
+              <a:spcBef>
+                <a:spcPct val="20000"/>
+              </a:spcBef>
+              <a:buFont typeface="Arial"/>
+              <a:buChar char="•"/>
+              <a:defRPr sz="2000" kern="1200">
+                <a:solidFill>
+                  <a:schemeClr val="tx1"/>
+                </a:solidFill>
+                <a:latin typeface="+mn-lt"/>
+                <a:ea typeface="+mn-ea"/>
+                <a:cs typeface="+mn-cs"/>
+              </a:defRPr>
+            </a:lvl6pPr>
+            <a:lvl7pPr marL="2971800" indent="-228600" algn="l" defTabSz="457200" rtl="0" eaLnBrk="1" latinLnBrk="0" hangingPunct="1">
+              <a:spcBef>
+                <a:spcPct val="20000"/>
+              </a:spcBef>
+              <a:buFont typeface="Arial"/>
+              <a:buChar char="•"/>
+              <a:defRPr sz="2000" kern="1200">
+                <a:solidFill>
+                  <a:schemeClr val="tx1"/>
+                </a:solidFill>
+                <a:latin typeface="+mn-lt"/>
+                <a:ea typeface="+mn-ea"/>
+                <a:cs typeface="+mn-cs"/>
+              </a:defRPr>
+            </a:lvl7pPr>
+            <a:lvl8pPr marL="3429000" indent="-228600" algn="l" defTabSz="457200" rtl="0" eaLnBrk="1" latinLnBrk="0" hangingPunct="1">
+              <a:spcBef>
+                <a:spcPct val="20000"/>
+              </a:spcBef>
+              <a:buFont typeface="Arial"/>
+              <a:buChar char="•"/>
+              <a:defRPr sz="2000" kern="1200">
+                <a:solidFill>
+                  <a:schemeClr val="tx1"/>
+                </a:solidFill>
+                <a:latin typeface="+mn-lt"/>
+                <a:ea typeface="+mn-ea"/>
+                <a:cs typeface="+mn-cs"/>
+              </a:defRPr>
+            </a:lvl8pPr>
+            <a:lvl9pPr marL="3886200" indent="-228600" algn="l" defTabSz="457200" rtl="0" eaLnBrk="1" latinLnBrk="0" hangingPunct="1">
+              <a:spcBef>
+                <a:spcPct val="20000"/>
+              </a:spcBef>
+              <a:buFont typeface="Arial"/>
+              <a:buChar char="•"/>
+              <a:defRPr sz="2000" kern="1200">
+                <a:solidFill>
+                  <a:schemeClr val="tx1"/>
+                </a:solidFill>
+                <a:latin typeface="+mn-lt"/>
+                <a:ea typeface="+mn-ea"/>
+                <a:cs typeface="+mn-cs"/>
+              </a:defRPr>
+            </a:lvl9pPr>
+          </a:lstStyle>
+          <a:p>
+            <a:pPr marL="342900" indent="-342900">
+              <a:buFont typeface="Arial" charset="0"/>
+              <a:buChar char="•"/>
+            </a:pPr>
+            <a:r>
+              <a:rPr lang="en-US" dirty="0">
+                <a:hlinkClick r:id="rId3"/>
+              </a:rPr>
+              <a:t>https://hub.docker.com/_/couchbase/</a:t>
+            </a:r>
+            <a:endParaRPr lang="en-US" dirty="0"/>
+          </a:p>
+          <a:p>
+            <a:pPr marL="342900" indent="-342900">
+              <a:buFont typeface="Arial" charset="0"/>
+              <a:buChar char="•"/>
+            </a:pPr>
+            <a:r>
+              <a:rPr lang="en-US" dirty="0"/>
+              <a:t>enterprise-4.5.0</a:t>
+            </a:r>
+          </a:p>
+          <a:p>
+            <a:pPr marL="342900" indent="-342900">
+              <a:buFont typeface="Arial" charset="0"/>
+              <a:buChar char="•"/>
+            </a:pPr>
+            <a:r>
+              <a:rPr lang="en-US" dirty="0" err="1">
+                <a:latin typeface="Courier New" panose="02070309020205020404" pitchFamily="49" charset="0"/>
+                <a:cs typeface="Courier New" panose="02070309020205020404" pitchFamily="49" charset="0"/>
+              </a:rPr>
+              <a:t>docker</a:t>
+            </a:r>
+            <a:r>
+              <a:rPr lang="en-US" dirty="0">
+                <a:latin typeface="Courier New" panose="02070309020205020404" pitchFamily="49" charset="0"/>
+                <a:cs typeface="Courier New" panose="02070309020205020404" pitchFamily="49" charset="0"/>
+              </a:rPr>
+              <a:t> run -d −−name </a:t>
+            </a:r>
+            <a:r>
+              <a:rPr lang="en-US" dirty="0" err="1">
+                <a:latin typeface="Courier New" panose="02070309020205020404" pitchFamily="49" charset="0"/>
+                <a:cs typeface="Courier New" panose="02070309020205020404" pitchFamily="49" charset="0"/>
+              </a:rPr>
+              <a:t>db</a:t>
+            </a:r>
+            <a:r>
+              <a:rPr lang="en-US" dirty="0">
+                <a:latin typeface="Courier New" panose="02070309020205020404" pitchFamily="49" charset="0"/>
+                <a:cs typeface="Courier New" panose="02070309020205020404" pitchFamily="49" charset="0"/>
+              </a:rPr>
+              <a:t> -p 8091-8094:8091-8094 -p 11207:11207 -p 11210-11211:11210-11211 -p 18091-18093:</a:t>
+            </a:r>
+            <a:br>
+              <a:rPr lang="en-US" dirty="0">
+                <a:latin typeface="Courier New" panose="02070309020205020404" pitchFamily="49" charset="0"/>
+                <a:cs typeface="Courier New" panose="02070309020205020404" pitchFamily="49" charset="0"/>
+              </a:rPr>
+            </a:br>
+            <a:r>
+              <a:rPr lang="en-US" dirty="0">
+                <a:latin typeface="Courier New" panose="02070309020205020404" pitchFamily="49" charset="0"/>
+                <a:cs typeface="Courier New" panose="02070309020205020404" pitchFamily="49" charset="0"/>
+              </a:rPr>
+              <a:t>18091-18093 </a:t>
+            </a:r>
+            <a:r>
+              <a:rPr lang="en-US" dirty="0" err="1">
+                <a:latin typeface="Courier New" panose="02070309020205020404" pitchFamily="49" charset="0"/>
+                <a:cs typeface="Courier New" panose="02070309020205020404" pitchFamily="49" charset="0"/>
+              </a:rPr>
+              <a:t>couchbase</a:t>
+            </a:r>
+            <a:endParaRPr lang="en-US" dirty="0">
+              <a:latin typeface="Courier New" panose="02070309020205020404" pitchFamily="49" charset="0"/>
+              <a:cs typeface="Courier New" panose="02070309020205020404" pitchFamily="49" charset="0"/>
+            </a:endParaRPr>
+          </a:p>
+          <a:p>
+            <a:pPr marL="342900" indent="-342900">
+              <a:buFont typeface="Arial" charset="0"/>
+              <a:buChar char="•"/>
+            </a:pPr>
+            <a:r>
+              <a:rPr lang="en-US" dirty="0" err="1">
+                <a:latin typeface="Courier New" panose="02070309020205020404" pitchFamily="49" charset="0"/>
+                <a:cs typeface="Courier New" panose="02070309020205020404" pitchFamily="49" charset="0"/>
+              </a:rPr>
+              <a:t>docker</a:t>
+            </a:r>
+            <a:r>
+              <a:rPr lang="en-US" dirty="0">
+                <a:latin typeface="Courier New" panose="02070309020205020404" pitchFamily="49" charset="0"/>
+                <a:cs typeface="Courier New" panose="02070309020205020404" pitchFamily="49" charset="0"/>
+              </a:rPr>
+              <a:t> </a:t>
+            </a:r>
+            <a:r>
+              <a:rPr lang="en-US" dirty="0" err="1">
+                <a:latin typeface="Courier New" panose="02070309020205020404" pitchFamily="49" charset="0"/>
+                <a:cs typeface="Courier New" panose="02070309020205020404" pitchFamily="49" charset="0"/>
+              </a:rPr>
+              <a:t>ps</a:t>
+            </a:r>
+            <a:r>
+              <a:rPr lang="en-US" dirty="0">
+                <a:latin typeface="Courier New" panose="02070309020205020404" pitchFamily="49" charset="0"/>
+                <a:cs typeface="Courier New" panose="02070309020205020404" pitchFamily="49" charset="0"/>
+              </a:rPr>
+              <a:t> -a</a:t>
+            </a:r>
+          </a:p>
+          <a:p>
+            <a:pPr marL="342900" indent="-342900">
+              <a:buFont typeface="Arial" charset="0"/>
+              <a:buChar char="•"/>
+            </a:pPr>
+            <a:endParaRPr lang="en-US" dirty="0"/>
+          </a:p>
+          <a:p>
+            <a:endParaRPr lang="en-US" dirty="0"/>
           </a:p>
         </p:txBody>
       </p:sp>
       <p:pic>
         <p:nvPicPr>
-          <p:cNvPr id="4098" name="Picture 2" descr="Couchbase Server Setup Wizard Sample Buckets"/>
+          <p:cNvPr id="4" name="Picture 3"/>
           <p:cNvPicPr>
-            <a:picLocks noChangeAspect="1" noChangeArrowheads="1"/>
+            <a:picLocks noChangeAspect="1"/>
           </p:cNvPicPr>
           <p:nvPr/>
         </p:nvPicPr>
         <p:blipFill>
-          <a:blip r:embed="rId2">
-            <a:extLst>
-              <a:ext uri="{28A0092B-C50C-407E-A947-70E740481C1C}">
-                <a14:useLocalDpi xmlns:a14="http://schemas.microsoft.com/office/drawing/2010/main" val="0"/>
-              </a:ext>
-            </a:extLst>
-          </a:blip>
-          <a:srcRect/>
+          <a:blip r:embed="rId4"/>
           <a:stretch>
             <a:fillRect/>
           </a:stretch>
         </p:blipFill>
-        <p:spPr bwMode="auto">
+        <p:spPr>
           <a:xfrm>
-            <a:off x="1257300" y="1012009"/>
-            <a:ext cx="6819900" cy="3588566"/>
+            <a:off x="198157" y="3423692"/>
+            <a:ext cx="8658225" cy="988025"/>
           </a:xfrm>
           <a:prstGeom prst="rect">
             <a:avLst/>
           </a:prstGeom>
-          <a:noFill/>
-          <a:extLst>
-            <a:ext uri="{909E8E84-426E-40DD-AFC4-6F175D3DCCD1}">
-              <a14:hiddenFill xmlns:a14="http://schemas.microsoft.com/office/drawing/2010/main">
-                <a:solidFill>
-                  <a:srgbClr val="FFFFFF"/>
-                </a:solidFill>
-              </a14:hiddenFill>
-            </a:ext>
-          </a:extLst>
         </p:spPr>
       </p:pic>
     </p:spTree>
     <p:extLst>
       <p:ext uri="{BB962C8B-B14F-4D97-AF65-F5344CB8AC3E}">
-        <p14:creationId xmlns:p14="http://schemas.microsoft.com/office/powerpoint/2010/main" val="3171604176"/>
+        <p14:creationId xmlns:p14="http://schemas.microsoft.com/office/powerpoint/2010/main" val="66688450"/>
       </p:ext>
     </p:extLst>
   </p:cSld>
@@ -6982,7 +7509,7 @@
       </p:sp>
       <p:pic>
         <p:nvPicPr>
-          <p:cNvPr id="5122" name="Picture 2" descr="Couchbase Server Setup Wizard Default Bucket"/>
+          <p:cNvPr id="2050" name="Picture 2" descr="Couchbase Server Console"/>
           <p:cNvPicPr>
             <a:picLocks noChangeAspect="1" noChangeArrowheads="1"/>
           </p:cNvPicPr>
@@ -7003,8 +7530,8 @@
         </p:blipFill>
         <p:spPr bwMode="auto">
           <a:xfrm>
-            <a:off x="998992" y="1000125"/>
-            <a:ext cx="7197760" cy="3586163"/>
+            <a:off x="2390775" y="1019483"/>
+            <a:ext cx="4505325" cy="3923992"/>
           </a:xfrm>
           <a:prstGeom prst="rect">
             <a:avLst/>
@@ -7021,10 +7548,52 @@
           </a:extLst>
         </p:spPr>
       </p:pic>
+      <p:sp>
+        <p:nvSpPr>
+          <p:cNvPr id="3" name="Rectangle 2"/>
+          <p:cNvSpPr/>
+          <p:nvPr/>
+        </p:nvSpPr>
+        <p:spPr>
+          <a:xfrm>
+            <a:off x="275812" y="600030"/>
+            <a:ext cx="2513830" cy="646331"/>
+          </a:xfrm>
+          <a:prstGeom prst="rect">
+            <a:avLst/>
+          </a:prstGeom>
+        </p:spPr>
+        <p:txBody>
+          <a:bodyPr wrap="none">
+            <a:spAutoFit/>
+          </a:bodyPr>
+          <a:lstStyle/>
+          <a:p>
+            <a:pPr marL="342900" indent="-342900">
+              <a:buFont typeface="Arial" charset="0"/>
+              <a:buChar char="•"/>
+            </a:pPr>
+            <a:r>
+              <a:rPr lang="en-US" dirty="0">
+                <a:hlinkClick r:id="rId3"/>
+              </a:rPr>
+              <a:t>http://localhost:8091</a:t>
+            </a:r>
+            <a:endParaRPr lang="en-US" dirty="0"/>
+          </a:p>
+          <a:p>
+            <a:pPr marL="342900" indent="-342900">
+              <a:buFont typeface="Arial" charset="0"/>
+              <a:buChar char="•"/>
+            </a:pPr>
+            <a:endParaRPr lang="en-US" dirty="0"/>
+          </a:p>
+        </p:txBody>
+      </p:sp>
     </p:spTree>
     <p:extLst>
       <p:ext uri="{BB962C8B-B14F-4D97-AF65-F5344CB8AC3E}">
-        <p14:creationId xmlns:p14="http://schemas.microsoft.com/office/powerpoint/2010/main" val="1983472153"/>
+        <p14:creationId xmlns:p14="http://schemas.microsoft.com/office/powerpoint/2010/main" val="4082690878"/>
       </p:ext>
     </p:extLst>
   </p:cSld>
@@ -7058,66 +7627,38 @@
             <a:spLocks noGrp="1"/>
           </p:cNvSpPr>
           <p:nvPr>
-            <p:ph type="title"/>
+            <p:ph type="ctrTitle"/>
           </p:nvPr>
         </p:nvSpPr>
-        <p:spPr/>
+        <p:spPr>
+          <a:xfrm>
+            <a:off x="685800" y="459249"/>
+            <a:ext cx="7772400" cy="2338001"/>
+          </a:xfrm>
+        </p:spPr>
         <p:txBody>
           <a:bodyPr/>
           <a:lstStyle/>
           <a:p>
             <a:r>
-              <a:rPr lang="en-US" dirty="0"/>
-              <a:t>Configuration</a:t>
+              <a:rPr lang="en-US" sz="3600" dirty="0"/>
+              <a:t>Part 2 – Configuring </a:t>
+            </a:r>
+            <a:r>
+              <a:rPr lang="en-US" sz="3600" dirty="0" err="1"/>
+              <a:t>Couchbase</a:t>
+            </a:r>
+            <a:r>
+              <a:rPr lang="en-US" sz="3600" dirty="0"/>
+              <a:t> Server</a:t>
             </a:r>
           </a:p>
         </p:txBody>
       </p:sp>
-      <p:pic>
-        <p:nvPicPr>
-          <p:cNvPr id="6146" name="Picture 2" descr="Couchbase Server Setup Wizard Admin Credentials"/>
-          <p:cNvPicPr>
-            <a:picLocks noChangeAspect="1" noChangeArrowheads="1"/>
-          </p:cNvPicPr>
-          <p:nvPr/>
-        </p:nvPicPr>
-        <p:blipFill>
-          <a:blip r:embed="rId2">
-            <a:extLst>
-              <a:ext uri="{28A0092B-C50C-407E-A947-70E740481C1C}">
-                <a14:useLocalDpi xmlns:a14="http://schemas.microsoft.com/office/drawing/2010/main" val="0"/>
-              </a:ext>
-            </a:extLst>
-          </a:blip>
-          <a:srcRect/>
-          <a:stretch>
-            <a:fillRect/>
-          </a:stretch>
-        </p:blipFill>
-        <p:spPr bwMode="auto">
-          <a:xfrm>
-            <a:off x="852489" y="943485"/>
-            <a:ext cx="7110412" cy="3728528"/>
-          </a:xfrm>
-          <a:prstGeom prst="rect">
-            <a:avLst/>
-          </a:prstGeom>
-          <a:noFill/>
-          <a:extLst>
-            <a:ext uri="{909E8E84-426E-40DD-AFC4-6F175D3DCCD1}">
-              <a14:hiddenFill xmlns:a14="http://schemas.microsoft.com/office/drawing/2010/main">
-                <a:solidFill>
-                  <a:srgbClr val="FFFFFF"/>
-                </a:solidFill>
-              </a14:hiddenFill>
-            </a:ext>
-          </a:extLst>
-        </p:spPr>
-      </p:pic>
     </p:spTree>
     <p:extLst>
       <p:ext uri="{BB962C8B-B14F-4D97-AF65-F5344CB8AC3E}">
-        <p14:creationId xmlns:p14="http://schemas.microsoft.com/office/powerpoint/2010/main" val="4101536371"/>
+        <p14:creationId xmlns:p14="http://schemas.microsoft.com/office/powerpoint/2010/main" val="1353863930"/>
       </p:ext>
     </p:extLst>
   </p:cSld>
@@ -7168,6 +7709,513 @@
       </p:sp>
       <p:pic>
         <p:nvPicPr>
+          <p:cNvPr id="2050" name="Picture 2" descr="Couchbase Server Console"/>
+          <p:cNvPicPr>
+            <a:picLocks noChangeAspect="1" noChangeArrowheads="1"/>
+          </p:cNvPicPr>
+          <p:nvPr/>
+        </p:nvPicPr>
+        <p:blipFill>
+          <a:blip r:embed="rId2">
+            <a:extLst>
+              <a:ext uri="{28A0092B-C50C-407E-A947-70E740481C1C}">
+                <a14:useLocalDpi xmlns:a14="http://schemas.microsoft.com/office/drawing/2010/main" val="0"/>
+              </a:ext>
+            </a:extLst>
+          </a:blip>
+          <a:srcRect/>
+          <a:stretch>
+            <a:fillRect/>
+          </a:stretch>
+        </p:blipFill>
+        <p:spPr bwMode="auto">
+          <a:xfrm>
+            <a:off x="2390775" y="1019483"/>
+            <a:ext cx="4505325" cy="3923992"/>
+          </a:xfrm>
+          <a:prstGeom prst="rect">
+            <a:avLst/>
+          </a:prstGeom>
+          <a:noFill/>
+          <a:extLst>
+            <a:ext uri="{909E8E84-426E-40DD-AFC4-6F175D3DCCD1}">
+              <a14:hiddenFill xmlns:a14="http://schemas.microsoft.com/office/drawing/2010/main">
+                <a:solidFill>
+                  <a:srgbClr val="FFFFFF"/>
+                </a:solidFill>
+              </a14:hiddenFill>
+            </a:ext>
+          </a:extLst>
+        </p:spPr>
+      </p:pic>
+      <p:sp>
+        <p:nvSpPr>
+          <p:cNvPr id="3" name="Rectangle 2"/>
+          <p:cNvSpPr/>
+          <p:nvPr/>
+        </p:nvSpPr>
+        <p:spPr>
+          <a:xfrm>
+            <a:off x="275812" y="600030"/>
+            <a:ext cx="2513830" cy="646331"/>
+          </a:xfrm>
+          <a:prstGeom prst="rect">
+            <a:avLst/>
+          </a:prstGeom>
+        </p:spPr>
+        <p:txBody>
+          <a:bodyPr wrap="none">
+            <a:spAutoFit/>
+          </a:bodyPr>
+          <a:lstStyle/>
+          <a:p>
+            <a:pPr marL="342900" indent="-342900">
+              <a:buFont typeface="Arial" charset="0"/>
+              <a:buChar char="•"/>
+            </a:pPr>
+            <a:r>
+              <a:rPr lang="en-US" dirty="0">
+                <a:hlinkClick r:id="rId3"/>
+              </a:rPr>
+              <a:t>http://localhost:8091</a:t>
+            </a:r>
+            <a:endParaRPr lang="en-US" dirty="0"/>
+          </a:p>
+          <a:p>
+            <a:pPr marL="342900" indent="-342900">
+              <a:buFont typeface="Arial" charset="0"/>
+              <a:buChar char="•"/>
+            </a:pPr>
+            <a:endParaRPr lang="en-US" dirty="0"/>
+          </a:p>
+        </p:txBody>
+      </p:sp>
+    </p:spTree>
+    <p:extLst>
+      <p:ext uri="{BB962C8B-B14F-4D97-AF65-F5344CB8AC3E}">
+        <p14:creationId xmlns:p14="http://schemas.microsoft.com/office/powerpoint/2010/main" val="3488480400"/>
+      </p:ext>
+    </p:extLst>
+  </p:cSld>
+  <p:clrMapOvr>
+    <a:masterClrMapping/>
+  </p:clrMapOvr>
+</p:sld>
+</file>
+
+<file path=ppt/slides/slide14.xml><?xml version="1.0" encoding="utf-8"?>
+<p:sld xmlns:a="http://schemas.openxmlformats.org/drawingml/2006/main" xmlns:r="http://schemas.openxmlformats.org/officeDocument/2006/relationships" xmlns:p="http://schemas.openxmlformats.org/presentationml/2006/main">
+  <p:cSld>
+    <p:spTree>
+      <p:nvGrpSpPr>
+        <p:cNvPr id="1" name=""/>
+        <p:cNvGrpSpPr/>
+        <p:nvPr/>
+      </p:nvGrpSpPr>
+      <p:grpSpPr>
+        <a:xfrm>
+          <a:off x="0" y="0"/>
+          <a:ext cx="0" cy="0"/>
+          <a:chOff x="0" y="0"/>
+          <a:chExt cx="0" cy="0"/>
+        </a:xfrm>
+      </p:grpSpPr>
+      <p:sp>
+        <p:nvSpPr>
+          <p:cNvPr id="2" name="Title 1"/>
+          <p:cNvSpPr>
+            <a:spLocks noGrp="1"/>
+          </p:cNvSpPr>
+          <p:nvPr>
+            <p:ph type="title"/>
+          </p:nvPr>
+        </p:nvSpPr>
+        <p:spPr/>
+        <p:txBody>
+          <a:bodyPr/>
+          <a:lstStyle/>
+          <a:p>
+            <a:r>
+              <a:rPr lang="en-US" dirty="0"/>
+              <a:t>Configuration</a:t>
+            </a:r>
+          </a:p>
+        </p:txBody>
+      </p:sp>
+      <p:pic>
+        <p:nvPicPr>
+          <p:cNvPr id="3074" name="Picture 2" descr="Couchbase Server Setup Wizard"/>
+          <p:cNvPicPr>
+            <a:picLocks noChangeAspect="1" noChangeArrowheads="1"/>
+          </p:cNvPicPr>
+          <p:nvPr/>
+        </p:nvPicPr>
+        <p:blipFill>
+          <a:blip r:embed="rId2">
+            <a:extLst>
+              <a:ext uri="{28A0092B-C50C-407E-A947-70E740481C1C}">
+                <a14:useLocalDpi xmlns:a14="http://schemas.microsoft.com/office/drawing/2010/main" val="0"/>
+              </a:ext>
+            </a:extLst>
+          </a:blip>
+          <a:srcRect/>
+          <a:stretch>
+            <a:fillRect/>
+          </a:stretch>
+        </p:blipFill>
+        <p:spPr bwMode="auto">
+          <a:xfrm>
+            <a:off x="1343025" y="1385888"/>
+            <a:ext cx="6457950" cy="2371725"/>
+          </a:xfrm>
+          <a:prstGeom prst="rect">
+            <a:avLst/>
+          </a:prstGeom>
+          <a:noFill/>
+          <a:extLst>
+            <a:ext uri="{909E8E84-426E-40DD-AFC4-6F175D3DCCD1}">
+              <a14:hiddenFill xmlns:a14="http://schemas.microsoft.com/office/drawing/2010/main">
+                <a:solidFill>
+                  <a:srgbClr val="FFFFFF"/>
+                </a:solidFill>
+              </a14:hiddenFill>
+            </a:ext>
+          </a:extLst>
+        </p:spPr>
+      </p:pic>
+    </p:spTree>
+    <p:extLst>
+      <p:ext uri="{BB962C8B-B14F-4D97-AF65-F5344CB8AC3E}">
+        <p14:creationId xmlns:p14="http://schemas.microsoft.com/office/powerpoint/2010/main" val="2210796310"/>
+      </p:ext>
+    </p:extLst>
+  </p:cSld>
+  <p:clrMapOvr>
+    <a:masterClrMapping/>
+  </p:clrMapOvr>
+</p:sld>
+</file>
+
+<file path=ppt/slides/slide15.xml><?xml version="1.0" encoding="utf-8"?>
+<p:sld xmlns:a="http://schemas.openxmlformats.org/drawingml/2006/main" xmlns:r="http://schemas.openxmlformats.org/officeDocument/2006/relationships" xmlns:p="http://schemas.openxmlformats.org/presentationml/2006/main">
+  <p:cSld>
+    <p:spTree>
+      <p:nvGrpSpPr>
+        <p:cNvPr id="1" name=""/>
+        <p:cNvGrpSpPr/>
+        <p:nvPr/>
+      </p:nvGrpSpPr>
+      <p:grpSpPr>
+        <a:xfrm>
+          <a:off x="0" y="0"/>
+          <a:ext cx="0" cy="0"/>
+          <a:chOff x="0" y="0"/>
+          <a:chExt cx="0" cy="0"/>
+        </a:xfrm>
+      </p:grpSpPr>
+      <p:sp>
+        <p:nvSpPr>
+          <p:cNvPr id="2" name="Title 1"/>
+          <p:cNvSpPr>
+            <a:spLocks noGrp="1"/>
+          </p:cNvSpPr>
+          <p:nvPr>
+            <p:ph type="title"/>
+          </p:nvPr>
+        </p:nvSpPr>
+        <p:spPr/>
+        <p:txBody>
+          <a:bodyPr/>
+          <a:lstStyle/>
+          <a:p>
+            <a:r>
+              <a:rPr lang="en-US" dirty="0"/>
+              <a:t>Configuration</a:t>
+            </a:r>
+          </a:p>
+        </p:txBody>
+      </p:sp>
+      <p:pic>
+        <p:nvPicPr>
+          <p:cNvPr id="4098" name="Picture 2" descr="Couchbase Server Setup Wizard Sample Buckets"/>
+          <p:cNvPicPr>
+            <a:picLocks noChangeAspect="1" noChangeArrowheads="1"/>
+          </p:cNvPicPr>
+          <p:nvPr/>
+        </p:nvPicPr>
+        <p:blipFill>
+          <a:blip r:embed="rId2">
+            <a:extLst>
+              <a:ext uri="{28A0092B-C50C-407E-A947-70E740481C1C}">
+                <a14:useLocalDpi xmlns:a14="http://schemas.microsoft.com/office/drawing/2010/main" val="0"/>
+              </a:ext>
+            </a:extLst>
+          </a:blip>
+          <a:srcRect/>
+          <a:stretch>
+            <a:fillRect/>
+          </a:stretch>
+        </p:blipFill>
+        <p:spPr bwMode="auto">
+          <a:xfrm>
+            <a:off x="1257300" y="1012009"/>
+            <a:ext cx="6819900" cy="3588566"/>
+          </a:xfrm>
+          <a:prstGeom prst="rect">
+            <a:avLst/>
+          </a:prstGeom>
+          <a:noFill/>
+          <a:extLst>
+            <a:ext uri="{909E8E84-426E-40DD-AFC4-6F175D3DCCD1}">
+              <a14:hiddenFill xmlns:a14="http://schemas.microsoft.com/office/drawing/2010/main">
+                <a:solidFill>
+                  <a:srgbClr val="FFFFFF"/>
+                </a:solidFill>
+              </a14:hiddenFill>
+            </a:ext>
+          </a:extLst>
+        </p:spPr>
+      </p:pic>
+    </p:spTree>
+    <p:extLst>
+      <p:ext uri="{BB962C8B-B14F-4D97-AF65-F5344CB8AC3E}">
+        <p14:creationId xmlns:p14="http://schemas.microsoft.com/office/powerpoint/2010/main" val="3171604176"/>
+      </p:ext>
+    </p:extLst>
+  </p:cSld>
+  <p:clrMapOvr>
+    <a:masterClrMapping/>
+  </p:clrMapOvr>
+</p:sld>
+</file>
+
+<file path=ppt/slides/slide16.xml><?xml version="1.0" encoding="utf-8"?>
+<p:sld xmlns:a="http://schemas.openxmlformats.org/drawingml/2006/main" xmlns:r="http://schemas.openxmlformats.org/officeDocument/2006/relationships" xmlns:p="http://schemas.openxmlformats.org/presentationml/2006/main">
+  <p:cSld>
+    <p:spTree>
+      <p:nvGrpSpPr>
+        <p:cNvPr id="1" name=""/>
+        <p:cNvGrpSpPr/>
+        <p:nvPr/>
+      </p:nvGrpSpPr>
+      <p:grpSpPr>
+        <a:xfrm>
+          <a:off x="0" y="0"/>
+          <a:ext cx="0" cy="0"/>
+          <a:chOff x="0" y="0"/>
+          <a:chExt cx="0" cy="0"/>
+        </a:xfrm>
+      </p:grpSpPr>
+      <p:sp>
+        <p:nvSpPr>
+          <p:cNvPr id="2" name="Title 1"/>
+          <p:cNvSpPr>
+            <a:spLocks noGrp="1"/>
+          </p:cNvSpPr>
+          <p:nvPr>
+            <p:ph type="title"/>
+          </p:nvPr>
+        </p:nvSpPr>
+        <p:spPr/>
+        <p:txBody>
+          <a:bodyPr/>
+          <a:lstStyle/>
+          <a:p>
+            <a:r>
+              <a:rPr lang="en-US" dirty="0"/>
+              <a:t>Configuration</a:t>
+            </a:r>
+          </a:p>
+        </p:txBody>
+      </p:sp>
+      <p:pic>
+        <p:nvPicPr>
+          <p:cNvPr id="5122" name="Picture 2" descr="Couchbase Server Setup Wizard Default Bucket"/>
+          <p:cNvPicPr>
+            <a:picLocks noChangeAspect="1" noChangeArrowheads="1"/>
+          </p:cNvPicPr>
+          <p:nvPr/>
+        </p:nvPicPr>
+        <p:blipFill>
+          <a:blip r:embed="rId2">
+            <a:extLst>
+              <a:ext uri="{28A0092B-C50C-407E-A947-70E740481C1C}">
+                <a14:useLocalDpi xmlns:a14="http://schemas.microsoft.com/office/drawing/2010/main" val="0"/>
+              </a:ext>
+            </a:extLst>
+          </a:blip>
+          <a:srcRect/>
+          <a:stretch>
+            <a:fillRect/>
+          </a:stretch>
+        </p:blipFill>
+        <p:spPr bwMode="auto">
+          <a:xfrm>
+            <a:off x="998992" y="1000125"/>
+            <a:ext cx="7197760" cy="3586163"/>
+          </a:xfrm>
+          <a:prstGeom prst="rect">
+            <a:avLst/>
+          </a:prstGeom>
+          <a:noFill/>
+          <a:extLst>
+            <a:ext uri="{909E8E84-426E-40DD-AFC4-6F175D3DCCD1}">
+              <a14:hiddenFill xmlns:a14="http://schemas.microsoft.com/office/drawing/2010/main">
+                <a:solidFill>
+                  <a:srgbClr val="FFFFFF"/>
+                </a:solidFill>
+              </a14:hiddenFill>
+            </a:ext>
+          </a:extLst>
+        </p:spPr>
+      </p:pic>
+    </p:spTree>
+    <p:extLst>
+      <p:ext uri="{BB962C8B-B14F-4D97-AF65-F5344CB8AC3E}">
+        <p14:creationId xmlns:p14="http://schemas.microsoft.com/office/powerpoint/2010/main" val="1983472153"/>
+      </p:ext>
+    </p:extLst>
+  </p:cSld>
+  <p:clrMapOvr>
+    <a:masterClrMapping/>
+  </p:clrMapOvr>
+</p:sld>
+</file>
+
+<file path=ppt/slides/slide17.xml><?xml version="1.0" encoding="utf-8"?>
+<p:sld xmlns:a="http://schemas.openxmlformats.org/drawingml/2006/main" xmlns:r="http://schemas.openxmlformats.org/officeDocument/2006/relationships" xmlns:p="http://schemas.openxmlformats.org/presentationml/2006/main">
+  <p:cSld>
+    <p:spTree>
+      <p:nvGrpSpPr>
+        <p:cNvPr id="1" name=""/>
+        <p:cNvGrpSpPr/>
+        <p:nvPr/>
+      </p:nvGrpSpPr>
+      <p:grpSpPr>
+        <a:xfrm>
+          <a:off x="0" y="0"/>
+          <a:ext cx="0" cy="0"/>
+          <a:chOff x="0" y="0"/>
+          <a:chExt cx="0" cy="0"/>
+        </a:xfrm>
+      </p:grpSpPr>
+      <p:sp>
+        <p:nvSpPr>
+          <p:cNvPr id="2" name="Title 1"/>
+          <p:cNvSpPr>
+            <a:spLocks noGrp="1"/>
+          </p:cNvSpPr>
+          <p:nvPr>
+            <p:ph type="title"/>
+          </p:nvPr>
+        </p:nvSpPr>
+        <p:spPr/>
+        <p:txBody>
+          <a:bodyPr/>
+          <a:lstStyle/>
+          <a:p>
+            <a:r>
+              <a:rPr lang="en-US" dirty="0"/>
+              <a:t>Configuration</a:t>
+            </a:r>
+          </a:p>
+        </p:txBody>
+      </p:sp>
+      <p:pic>
+        <p:nvPicPr>
+          <p:cNvPr id="6146" name="Picture 2" descr="Couchbase Server Setup Wizard Admin Credentials"/>
+          <p:cNvPicPr>
+            <a:picLocks noChangeAspect="1" noChangeArrowheads="1"/>
+          </p:cNvPicPr>
+          <p:nvPr/>
+        </p:nvPicPr>
+        <p:blipFill>
+          <a:blip r:embed="rId2">
+            <a:extLst>
+              <a:ext uri="{28A0092B-C50C-407E-A947-70E740481C1C}">
+                <a14:useLocalDpi xmlns:a14="http://schemas.microsoft.com/office/drawing/2010/main" val="0"/>
+              </a:ext>
+            </a:extLst>
+          </a:blip>
+          <a:srcRect/>
+          <a:stretch>
+            <a:fillRect/>
+          </a:stretch>
+        </p:blipFill>
+        <p:spPr bwMode="auto">
+          <a:xfrm>
+            <a:off x="852489" y="943485"/>
+            <a:ext cx="7110412" cy="3728528"/>
+          </a:xfrm>
+          <a:prstGeom prst="rect">
+            <a:avLst/>
+          </a:prstGeom>
+          <a:noFill/>
+          <a:extLst>
+            <a:ext uri="{909E8E84-426E-40DD-AFC4-6F175D3DCCD1}">
+              <a14:hiddenFill xmlns:a14="http://schemas.microsoft.com/office/drawing/2010/main">
+                <a:solidFill>
+                  <a:srgbClr val="FFFFFF"/>
+                </a:solidFill>
+              </a14:hiddenFill>
+            </a:ext>
+          </a:extLst>
+        </p:spPr>
+      </p:pic>
+    </p:spTree>
+    <p:extLst>
+      <p:ext uri="{BB962C8B-B14F-4D97-AF65-F5344CB8AC3E}">
+        <p14:creationId xmlns:p14="http://schemas.microsoft.com/office/powerpoint/2010/main" val="4101536371"/>
+      </p:ext>
+    </p:extLst>
+  </p:cSld>
+  <p:clrMapOvr>
+    <a:masterClrMapping/>
+  </p:clrMapOvr>
+</p:sld>
+</file>
+
+<file path=ppt/slides/slide18.xml><?xml version="1.0" encoding="utf-8"?>
+<p:sld xmlns:a="http://schemas.openxmlformats.org/drawingml/2006/main" xmlns:r="http://schemas.openxmlformats.org/officeDocument/2006/relationships" xmlns:p="http://schemas.openxmlformats.org/presentationml/2006/main">
+  <p:cSld>
+    <p:spTree>
+      <p:nvGrpSpPr>
+        <p:cNvPr id="1" name=""/>
+        <p:cNvGrpSpPr/>
+        <p:nvPr/>
+      </p:nvGrpSpPr>
+      <p:grpSpPr>
+        <a:xfrm>
+          <a:off x="0" y="0"/>
+          <a:ext cx="0" cy="0"/>
+          <a:chOff x="0" y="0"/>
+          <a:chExt cx="0" cy="0"/>
+        </a:xfrm>
+      </p:grpSpPr>
+      <p:sp>
+        <p:nvSpPr>
+          <p:cNvPr id="2" name="Title 1"/>
+          <p:cNvSpPr>
+            <a:spLocks noGrp="1"/>
+          </p:cNvSpPr>
+          <p:nvPr>
+            <p:ph type="title"/>
+          </p:nvPr>
+        </p:nvSpPr>
+        <p:spPr/>
+        <p:txBody>
+          <a:bodyPr/>
+          <a:lstStyle/>
+          <a:p>
+            <a:r>
+              <a:rPr lang="en-US" dirty="0"/>
+              <a:t>Configuration</a:t>
+            </a:r>
+          </a:p>
+        </p:txBody>
+      </p:sp>
+      <p:pic>
+        <p:nvPicPr>
           <p:cNvPr id="3" name="Picture 2"/>
           <p:cNvPicPr>
             <a:picLocks noChangeAspect="1"/>
@@ -7203,7 +8251,7 @@
 </p:sld>
 </file>
 
-<file path=ppt/slides/slide14.xml><?xml version="1.0" encoding="utf-8"?>
+<file path=ppt/slides/slide19.xml><?xml version="1.0" encoding="utf-8"?>
 <p:sld xmlns:a="http://schemas.openxmlformats.org/drawingml/2006/main" xmlns:r="http://schemas.openxmlformats.org/officeDocument/2006/relationships" xmlns:p="http://schemas.openxmlformats.org/presentationml/2006/main">
   <p:cSld>
     <p:spTree>
@@ -7348,7 +8396,10 @@
               <a:buFont typeface="Arial" charset="0"/>
               <a:buChar char="•"/>
             </a:pPr>
-            <a:endParaRPr lang="en-US" dirty="0"/>
+            <a:r>
+              <a:rPr lang="en-US" dirty="0"/>
+              <a:t>Basic Configuration</a:t>
+            </a:r>
           </a:p>
           <a:p>
             <a:endParaRPr lang="en-US" dirty="0"/>
@@ -7424,6 +8475,71 @@
             <a:spLocks noGrp="1"/>
           </p:cNvSpPr>
           <p:nvPr>
+            <p:ph type="ctrTitle"/>
+          </p:nvPr>
+        </p:nvSpPr>
+        <p:spPr>
+          <a:xfrm>
+            <a:off x="685800" y="459249"/>
+            <a:ext cx="7772400" cy="2338001"/>
+          </a:xfrm>
+        </p:spPr>
+        <p:txBody>
+          <a:bodyPr/>
+          <a:lstStyle/>
+          <a:p>
+            <a:r>
+              <a:rPr lang="en-US" sz="3600" dirty="0"/>
+              <a:t>Part 1 – Installing </a:t>
+            </a:r>
+            <a:r>
+              <a:rPr lang="en-US" sz="3600" dirty="0" err="1"/>
+              <a:t>Couchbase</a:t>
+            </a:r>
+            <a:r>
+              <a:rPr lang="en-US" sz="3600" dirty="0"/>
+              <a:t> Server</a:t>
+            </a:r>
+          </a:p>
+        </p:txBody>
+      </p:sp>
+    </p:spTree>
+    <p:extLst>
+      <p:ext uri="{BB962C8B-B14F-4D97-AF65-F5344CB8AC3E}">
+        <p14:creationId xmlns:p14="http://schemas.microsoft.com/office/powerpoint/2010/main" val="311991916"/>
+      </p:ext>
+    </p:extLst>
+  </p:cSld>
+  <p:clrMapOvr>
+    <a:masterClrMapping/>
+  </p:clrMapOvr>
+</p:sld>
+</file>
+
+<file path=ppt/slides/slide4.xml><?xml version="1.0" encoding="utf-8"?>
+<p:sld xmlns:a="http://schemas.openxmlformats.org/drawingml/2006/main" xmlns:r="http://schemas.openxmlformats.org/officeDocument/2006/relationships" xmlns:p="http://schemas.openxmlformats.org/presentationml/2006/main">
+  <p:cSld>
+    <p:spTree>
+      <p:nvGrpSpPr>
+        <p:cNvPr id="1" name=""/>
+        <p:cNvGrpSpPr/>
+        <p:nvPr/>
+      </p:nvGrpSpPr>
+      <p:grpSpPr>
+        <a:xfrm>
+          <a:off x="0" y="0"/>
+          <a:ext cx="0" cy="0"/>
+          <a:chOff x="0" y="0"/>
+          <a:chExt cx="0" cy="0"/>
+        </a:xfrm>
+      </p:grpSpPr>
+      <p:sp>
+        <p:nvSpPr>
+          <p:cNvPr id="2" name="Title 1"/>
+          <p:cNvSpPr>
+            <a:spLocks noGrp="1"/>
+          </p:cNvSpPr>
+          <p:nvPr>
             <p:ph type="title"/>
           </p:nvPr>
         </p:nvSpPr>
@@ -7690,298 +8806,6 @@
 </p:sld>
 </file>
 
-<file path=ppt/slides/slide4.xml><?xml version="1.0" encoding="utf-8"?>
-<p:sld xmlns:a="http://schemas.openxmlformats.org/drawingml/2006/main" xmlns:r="http://schemas.openxmlformats.org/officeDocument/2006/relationships" xmlns:p="http://schemas.openxmlformats.org/presentationml/2006/main">
-  <p:cSld>
-    <p:spTree>
-      <p:nvGrpSpPr>
-        <p:cNvPr id="1" name=""/>
-        <p:cNvGrpSpPr/>
-        <p:nvPr/>
-      </p:nvGrpSpPr>
-      <p:grpSpPr>
-        <a:xfrm>
-          <a:off x="0" y="0"/>
-          <a:ext cx="0" cy="0"/>
-          <a:chOff x="0" y="0"/>
-          <a:chExt cx="0" cy="0"/>
-        </a:xfrm>
-      </p:grpSpPr>
-      <p:sp>
-        <p:nvSpPr>
-          <p:cNvPr id="2" name="Title 1"/>
-          <p:cNvSpPr>
-            <a:spLocks noGrp="1"/>
-          </p:cNvSpPr>
-          <p:nvPr>
-            <p:ph type="title"/>
-          </p:nvPr>
-        </p:nvSpPr>
-        <p:spPr/>
-        <p:txBody>
-          <a:bodyPr/>
-          <a:lstStyle/>
-          <a:p>
-            <a:r>
-              <a:rPr lang="en-US" dirty="0"/>
-              <a:t>Install on Cloud: Azure</a:t>
-            </a:r>
-          </a:p>
-        </p:txBody>
-      </p:sp>
-      <p:sp>
-        <p:nvSpPr>
-          <p:cNvPr id="4" name="Content Placeholder 2"/>
-          <p:cNvSpPr txBox="1">
-            <a:spLocks/>
-          </p:cNvSpPr>
-          <p:nvPr/>
-        </p:nvSpPr>
-        <p:spPr>
-          <a:xfrm>
-            <a:off x="198158" y="685800"/>
-            <a:ext cx="8307668" cy="1295400"/>
-          </a:xfrm>
-          <a:prstGeom prst="rect">
-            <a:avLst/>
-          </a:prstGeom>
-        </p:spPr>
-        <p:txBody>
-          <a:bodyPr/>
-          <a:lstStyle>
-            <a:lvl1pPr marL="228600" indent="-228600" algn="l" defTabSz="457200" rtl="0" eaLnBrk="1" latinLnBrk="0" hangingPunct="1">
-              <a:spcBef>
-                <a:spcPts val="0"/>
-              </a:spcBef>
-              <a:buClr>
-                <a:schemeClr val="accent1"/>
-              </a:buClr>
-              <a:buFont typeface="Wingdings" charset="2"/>
-              <a:buChar char="§"/>
-              <a:defRPr sz="2400" kern="1200">
-                <a:solidFill>
-                  <a:schemeClr val="tx1"/>
-                </a:solidFill>
-                <a:latin typeface="+mn-lt"/>
-                <a:ea typeface="+mn-ea"/>
-                <a:cs typeface="+mn-cs"/>
-              </a:defRPr>
-            </a:lvl1pPr>
-            <a:lvl2pPr marL="455613" indent="-227013" algn="l" defTabSz="457200" rtl="0" eaLnBrk="1" latinLnBrk="0" hangingPunct="1">
-              <a:spcBef>
-                <a:spcPts val="0"/>
-              </a:spcBef>
-              <a:buClr>
-                <a:srgbClr val="262626"/>
-              </a:buClr>
-              <a:buFont typeface="Wingdings" charset="2"/>
-              <a:buChar char="§"/>
-              <a:defRPr sz="2000" kern="1200">
-                <a:solidFill>
-                  <a:schemeClr val="tx1"/>
-                </a:solidFill>
-                <a:latin typeface="+mn-lt"/>
-                <a:ea typeface="+mn-ea"/>
-                <a:cs typeface="+mn-cs"/>
-              </a:defRPr>
-            </a:lvl2pPr>
-            <a:lvl3pPr marL="455613" indent="-228600" algn="l" defTabSz="457200" rtl="0" eaLnBrk="1" latinLnBrk="0" hangingPunct="1">
-              <a:spcBef>
-                <a:spcPts val="0"/>
-              </a:spcBef>
-              <a:buClr>
-                <a:srgbClr val="262626"/>
-              </a:buClr>
-              <a:buFont typeface="Wingdings" charset="2"/>
-              <a:buChar char="§"/>
-              <a:defRPr sz="2000" kern="1200">
-                <a:solidFill>
-                  <a:schemeClr val="tx1"/>
-                </a:solidFill>
-                <a:latin typeface="+mn-lt"/>
-                <a:ea typeface="+mn-ea"/>
-                <a:cs typeface="+mn-cs"/>
-              </a:defRPr>
-            </a:lvl3pPr>
-            <a:lvl4pPr marL="455613" indent="-228600" algn="l" defTabSz="457200" rtl="0" eaLnBrk="1" latinLnBrk="0" hangingPunct="1">
-              <a:spcBef>
-                <a:spcPts val="0"/>
-              </a:spcBef>
-              <a:buClr>
-                <a:srgbClr val="262626"/>
-              </a:buClr>
-              <a:buFont typeface="Wingdings" charset="2"/>
-              <a:buChar char="§"/>
-              <a:defRPr sz="2000" kern="1200">
-                <a:solidFill>
-                  <a:schemeClr val="tx1"/>
-                </a:solidFill>
-                <a:latin typeface="+mn-lt"/>
-                <a:ea typeface="+mn-ea"/>
-                <a:cs typeface="+mn-cs"/>
-              </a:defRPr>
-            </a:lvl4pPr>
-            <a:lvl5pPr marL="455613" indent="-228600" algn="l" defTabSz="457200" rtl="0" eaLnBrk="1" latinLnBrk="0" hangingPunct="1">
-              <a:spcBef>
-                <a:spcPts val="200"/>
-              </a:spcBef>
-              <a:buClr>
-                <a:srgbClr val="262626"/>
-              </a:buClr>
-              <a:buFont typeface="Wingdings" charset="2"/>
-              <a:buChar char="§"/>
-              <a:defRPr sz="2000" kern="1200">
-                <a:solidFill>
-                  <a:schemeClr val="tx1"/>
-                </a:solidFill>
-                <a:latin typeface="+mn-lt"/>
-                <a:ea typeface="+mn-ea"/>
-                <a:cs typeface="+mn-cs"/>
-              </a:defRPr>
-            </a:lvl5pPr>
-            <a:lvl6pPr marL="2514600" indent="-228600" algn="l" defTabSz="457200" rtl="0" eaLnBrk="1" latinLnBrk="0" hangingPunct="1">
-              <a:spcBef>
-                <a:spcPct val="20000"/>
-              </a:spcBef>
-              <a:buFont typeface="Arial"/>
-              <a:buChar char="•"/>
-              <a:defRPr sz="2000" kern="1200">
-                <a:solidFill>
-                  <a:schemeClr val="tx1"/>
-                </a:solidFill>
-                <a:latin typeface="+mn-lt"/>
-                <a:ea typeface="+mn-ea"/>
-                <a:cs typeface="+mn-cs"/>
-              </a:defRPr>
-            </a:lvl6pPr>
-            <a:lvl7pPr marL="2971800" indent="-228600" algn="l" defTabSz="457200" rtl="0" eaLnBrk="1" latinLnBrk="0" hangingPunct="1">
-              <a:spcBef>
-                <a:spcPct val="20000"/>
-              </a:spcBef>
-              <a:buFont typeface="Arial"/>
-              <a:buChar char="•"/>
-              <a:defRPr sz="2000" kern="1200">
-                <a:solidFill>
-                  <a:schemeClr val="tx1"/>
-                </a:solidFill>
-                <a:latin typeface="+mn-lt"/>
-                <a:ea typeface="+mn-ea"/>
-                <a:cs typeface="+mn-cs"/>
-              </a:defRPr>
-            </a:lvl7pPr>
-            <a:lvl8pPr marL="3429000" indent="-228600" algn="l" defTabSz="457200" rtl="0" eaLnBrk="1" latinLnBrk="0" hangingPunct="1">
-              <a:spcBef>
-                <a:spcPct val="20000"/>
-              </a:spcBef>
-              <a:buFont typeface="Arial"/>
-              <a:buChar char="•"/>
-              <a:defRPr sz="2000" kern="1200">
-                <a:solidFill>
-                  <a:schemeClr val="tx1"/>
-                </a:solidFill>
-                <a:latin typeface="+mn-lt"/>
-                <a:ea typeface="+mn-ea"/>
-                <a:cs typeface="+mn-cs"/>
-              </a:defRPr>
-            </a:lvl8pPr>
-            <a:lvl9pPr marL="3886200" indent="-228600" algn="l" defTabSz="457200" rtl="0" eaLnBrk="1" latinLnBrk="0" hangingPunct="1">
-              <a:spcBef>
-                <a:spcPct val="20000"/>
-              </a:spcBef>
-              <a:buFont typeface="Arial"/>
-              <a:buChar char="•"/>
-              <a:defRPr sz="2000" kern="1200">
-                <a:solidFill>
-                  <a:schemeClr val="tx1"/>
-                </a:solidFill>
-                <a:latin typeface="+mn-lt"/>
-                <a:ea typeface="+mn-ea"/>
-                <a:cs typeface="+mn-cs"/>
-              </a:defRPr>
-            </a:lvl9pPr>
-          </a:lstStyle>
-          <a:p>
-            <a:pPr marL="342900" indent="-342900">
-              <a:buFont typeface="Arial" charset="0"/>
-              <a:buChar char="•"/>
-            </a:pPr>
-            <a:r>
-              <a:rPr lang="en-US" sz="2000" dirty="0">
-                <a:hlinkClick r:id="rId3"/>
-              </a:rPr>
-              <a:t>https://azure.microsoft.com/en-us/marketplace/partners/couchbase/</a:t>
-            </a:r>
-            <a:endParaRPr lang="en-US" sz="2000" dirty="0"/>
-          </a:p>
-          <a:p>
-            <a:pPr marL="342900" indent="-342900">
-              <a:buFont typeface="Arial" charset="0"/>
-              <a:buChar char="•"/>
-            </a:pPr>
-            <a:r>
-              <a:rPr lang="en-US" sz="2000" dirty="0">
-                <a:hlinkClick r:id="rId4"/>
-              </a:rPr>
-              <a:t>https://portal.azure.com</a:t>
-            </a:r>
-            <a:endParaRPr lang="en-US" sz="2000" dirty="0"/>
-          </a:p>
-          <a:p>
-            <a:pPr marL="342900" indent="-342900">
-              <a:buFont typeface="Arial" charset="0"/>
-              <a:buChar char="•"/>
-            </a:pPr>
-            <a:endParaRPr lang="en-US" sz="2000" dirty="0"/>
-          </a:p>
-          <a:p>
-            <a:pPr marL="342900" indent="-342900">
-              <a:buFont typeface="Arial" charset="0"/>
-              <a:buChar char="•"/>
-            </a:pPr>
-            <a:endParaRPr lang="en-US" dirty="0"/>
-          </a:p>
-          <a:p>
-            <a:endParaRPr lang="en-US" dirty="0"/>
-          </a:p>
-        </p:txBody>
-      </p:sp>
-      <p:pic>
-        <p:nvPicPr>
-          <p:cNvPr id="3" name="Picture 2"/>
-          <p:cNvPicPr>
-            <a:picLocks noChangeAspect="1"/>
-          </p:cNvPicPr>
-          <p:nvPr/>
-        </p:nvPicPr>
-        <p:blipFill>
-          <a:blip r:embed="rId5"/>
-          <a:stretch>
-            <a:fillRect/>
-          </a:stretch>
-        </p:blipFill>
-        <p:spPr>
-          <a:xfrm>
-            <a:off x="198158" y="1793001"/>
-            <a:ext cx="8469593" cy="2561566"/>
-          </a:xfrm>
-          <a:prstGeom prst="rect">
-            <a:avLst/>
-          </a:prstGeom>
-        </p:spPr>
-      </p:pic>
-    </p:spTree>
-    <p:extLst>
-      <p:ext uri="{BB962C8B-B14F-4D97-AF65-F5344CB8AC3E}">
-        <p14:creationId xmlns:p14="http://schemas.microsoft.com/office/powerpoint/2010/main" val="1148363434"/>
-      </p:ext>
-    </p:extLst>
-  </p:cSld>
-  <p:clrMapOvr>
-    <a:masterClrMapping/>
-  </p:clrMapOvr>
-</p:sld>
-</file>
-
 <file path=ppt/slides/slide5.xml><?xml version="1.0" encoding="utf-8"?>
 <p:sld xmlns:a="http://schemas.openxmlformats.org/drawingml/2006/main" xmlns:r="http://schemas.openxmlformats.org/officeDocument/2006/relationships" xmlns:p="http://schemas.openxmlformats.org/presentationml/2006/main">
   <p:cSld>
@@ -8016,408 +8840,56 @@
           <a:p>
             <a:r>
               <a:rPr lang="en-US" dirty="0"/>
-              <a:t>Install on Cloud: Amazon</a:t>
+              <a:t>Install</a:t>
             </a:r>
           </a:p>
         </p:txBody>
       </p:sp>
-      <p:sp>
-        <p:nvSpPr>
-          <p:cNvPr id="4" name="Content Placeholder 2"/>
-          <p:cNvSpPr txBox="1">
-            <a:spLocks/>
-          </p:cNvSpPr>
+      <p:pic>
+        <p:nvPicPr>
+          <p:cNvPr id="1026" name="Picture 2" descr="Couchbase Server Install Wizard 1"/>
+          <p:cNvPicPr>
+            <a:picLocks noChangeAspect="1" noChangeArrowheads="1"/>
+          </p:cNvPicPr>
           <p:nvPr/>
-        </p:nvSpPr>
-        <p:spPr>
+        </p:nvPicPr>
+        <p:blipFill>
+          <a:blip r:embed="rId2">
+            <a:extLst>
+              <a:ext uri="{28A0092B-C50C-407E-A947-70E740481C1C}">
+                <a14:useLocalDpi xmlns:a14="http://schemas.microsoft.com/office/drawing/2010/main" val="0"/>
+              </a:ext>
+            </a:extLst>
+          </a:blip>
+          <a:srcRect/>
+          <a:stretch>
+            <a:fillRect/>
+          </a:stretch>
+        </p:blipFill>
+        <p:spPr bwMode="auto">
           <a:xfrm>
-            <a:off x="457200" y="685800"/>
-            <a:ext cx="8007739" cy="3394472"/>
+            <a:off x="2195513" y="762000"/>
+            <a:ext cx="4752975" cy="3619500"/>
           </a:xfrm>
           <a:prstGeom prst="rect">
             <a:avLst/>
           </a:prstGeom>
+          <a:noFill/>
+          <a:extLst>
+            <a:ext uri="{909E8E84-426E-40DD-AFC4-6F175D3DCCD1}">
+              <a14:hiddenFill xmlns:a14="http://schemas.microsoft.com/office/drawing/2010/main">
+                <a:solidFill>
+                  <a:srgbClr val="FFFFFF"/>
+                </a:solidFill>
+              </a14:hiddenFill>
+            </a:ext>
+          </a:extLst>
         </p:spPr>
-        <p:txBody>
-          <a:bodyPr/>
-          <a:lstStyle>
-            <a:lvl1pPr marL="228600" indent="-228600" algn="l" defTabSz="457200" rtl="0" eaLnBrk="1" latinLnBrk="0" hangingPunct="1">
-              <a:spcBef>
-                <a:spcPts val="0"/>
-              </a:spcBef>
-              <a:buClr>
-                <a:schemeClr val="accent1"/>
-              </a:buClr>
-              <a:buFont typeface="Wingdings" charset="2"/>
-              <a:buChar char="§"/>
-              <a:defRPr sz="2400" kern="1200">
-                <a:solidFill>
-                  <a:schemeClr val="tx1"/>
-                </a:solidFill>
-                <a:latin typeface="+mn-lt"/>
-                <a:ea typeface="+mn-ea"/>
-                <a:cs typeface="+mn-cs"/>
-              </a:defRPr>
-            </a:lvl1pPr>
-            <a:lvl2pPr marL="455613" indent="-227013" algn="l" defTabSz="457200" rtl="0" eaLnBrk="1" latinLnBrk="0" hangingPunct="1">
-              <a:spcBef>
-                <a:spcPts val="0"/>
-              </a:spcBef>
-              <a:buClr>
-                <a:srgbClr val="262626"/>
-              </a:buClr>
-              <a:buFont typeface="Wingdings" charset="2"/>
-              <a:buChar char="§"/>
-              <a:defRPr sz="2000" kern="1200">
-                <a:solidFill>
-                  <a:schemeClr val="tx1"/>
-                </a:solidFill>
-                <a:latin typeface="+mn-lt"/>
-                <a:ea typeface="+mn-ea"/>
-                <a:cs typeface="+mn-cs"/>
-              </a:defRPr>
-            </a:lvl2pPr>
-            <a:lvl3pPr marL="455613" indent="-228600" algn="l" defTabSz="457200" rtl="0" eaLnBrk="1" latinLnBrk="0" hangingPunct="1">
-              <a:spcBef>
-                <a:spcPts val="0"/>
-              </a:spcBef>
-              <a:buClr>
-                <a:srgbClr val="262626"/>
-              </a:buClr>
-              <a:buFont typeface="Wingdings" charset="2"/>
-              <a:buChar char="§"/>
-              <a:defRPr sz="2000" kern="1200">
-                <a:solidFill>
-                  <a:schemeClr val="tx1"/>
-                </a:solidFill>
-                <a:latin typeface="+mn-lt"/>
-                <a:ea typeface="+mn-ea"/>
-                <a:cs typeface="+mn-cs"/>
-              </a:defRPr>
-            </a:lvl3pPr>
-            <a:lvl4pPr marL="455613" indent="-228600" algn="l" defTabSz="457200" rtl="0" eaLnBrk="1" latinLnBrk="0" hangingPunct="1">
-              <a:spcBef>
-                <a:spcPts val="0"/>
-              </a:spcBef>
-              <a:buClr>
-                <a:srgbClr val="262626"/>
-              </a:buClr>
-              <a:buFont typeface="Wingdings" charset="2"/>
-              <a:buChar char="§"/>
-              <a:defRPr sz="2000" kern="1200">
-                <a:solidFill>
-                  <a:schemeClr val="tx1"/>
-                </a:solidFill>
-                <a:latin typeface="+mn-lt"/>
-                <a:ea typeface="+mn-ea"/>
-                <a:cs typeface="+mn-cs"/>
-              </a:defRPr>
-            </a:lvl4pPr>
-            <a:lvl5pPr marL="455613" indent="-228600" algn="l" defTabSz="457200" rtl="0" eaLnBrk="1" latinLnBrk="0" hangingPunct="1">
-              <a:spcBef>
-                <a:spcPts val="200"/>
-              </a:spcBef>
-              <a:buClr>
-                <a:srgbClr val="262626"/>
-              </a:buClr>
-              <a:buFont typeface="Wingdings" charset="2"/>
-              <a:buChar char="§"/>
-              <a:defRPr sz="2000" kern="1200">
-                <a:solidFill>
-                  <a:schemeClr val="tx1"/>
-                </a:solidFill>
-                <a:latin typeface="+mn-lt"/>
-                <a:ea typeface="+mn-ea"/>
-                <a:cs typeface="+mn-cs"/>
-              </a:defRPr>
-            </a:lvl5pPr>
-            <a:lvl6pPr marL="2514600" indent="-228600" algn="l" defTabSz="457200" rtl="0" eaLnBrk="1" latinLnBrk="0" hangingPunct="1">
-              <a:spcBef>
-                <a:spcPct val="20000"/>
-              </a:spcBef>
-              <a:buFont typeface="Arial"/>
-              <a:buChar char="•"/>
-              <a:defRPr sz="2000" kern="1200">
-                <a:solidFill>
-                  <a:schemeClr val="tx1"/>
-                </a:solidFill>
-                <a:latin typeface="+mn-lt"/>
-                <a:ea typeface="+mn-ea"/>
-                <a:cs typeface="+mn-cs"/>
-              </a:defRPr>
-            </a:lvl6pPr>
-            <a:lvl7pPr marL="2971800" indent="-228600" algn="l" defTabSz="457200" rtl="0" eaLnBrk="1" latinLnBrk="0" hangingPunct="1">
-              <a:spcBef>
-                <a:spcPct val="20000"/>
-              </a:spcBef>
-              <a:buFont typeface="Arial"/>
-              <a:buChar char="•"/>
-              <a:defRPr sz="2000" kern="1200">
-                <a:solidFill>
-                  <a:schemeClr val="tx1"/>
-                </a:solidFill>
-                <a:latin typeface="+mn-lt"/>
-                <a:ea typeface="+mn-ea"/>
-                <a:cs typeface="+mn-cs"/>
-              </a:defRPr>
-            </a:lvl7pPr>
-            <a:lvl8pPr marL="3429000" indent="-228600" algn="l" defTabSz="457200" rtl="0" eaLnBrk="1" latinLnBrk="0" hangingPunct="1">
-              <a:spcBef>
-                <a:spcPct val="20000"/>
-              </a:spcBef>
-              <a:buFont typeface="Arial"/>
-              <a:buChar char="•"/>
-              <a:defRPr sz="2000" kern="1200">
-                <a:solidFill>
-                  <a:schemeClr val="tx1"/>
-                </a:solidFill>
-                <a:latin typeface="+mn-lt"/>
-                <a:ea typeface="+mn-ea"/>
-                <a:cs typeface="+mn-cs"/>
-              </a:defRPr>
-            </a:lvl8pPr>
-            <a:lvl9pPr marL="3886200" indent="-228600" algn="l" defTabSz="457200" rtl="0" eaLnBrk="1" latinLnBrk="0" hangingPunct="1">
-              <a:spcBef>
-                <a:spcPct val="20000"/>
-              </a:spcBef>
-              <a:buFont typeface="Arial"/>
-              <a:buChar char="•"/>
-              <a:defRPr sz="2000" kern="1200">
-                <a:solidFill>
-                  <a:schemeClr val="tx1"/>
-                </a:solidFill>
-                <a:latin typeface="+mn-lt"/>
-                <a:ea typeface="+mn-ea"/>
-                <a:cs typeface="+mn-cs"/>
-              </a:defRPr>
-            </a:lvl9pPr>
-          </a:lstStyle>
-          <a:p>
-            <a:pPr marL="342900" indent="-342900">
-              <a:buFont typeface="Arial" charset="0"/>
-              <a:buChar char="•"/>
-            </a:pPr>
-            <a:endParaRPr lang="en-US" dirty="0"/>
-          </a:p>
-          <a:p>
-            <a:endParaRPr lang="en-US" dirty="0"/>
-          </a:p>
-        </p:txBody>
-      </p:sp>
-      <p:sp>
-        <p:nvSpPr>
-          <p:cNvPr id="5" name="Content Placeholder 2"/>
-          <p:cNvSpPr txBox="1">
-            <a:spLocks/>
-          </p:cNvSpPr>
-          <p:nvPr/>
-        </p:nvSpPr>
-        <p:spPr>
-          <a:xfrm>
-            <a:off x="198158" y="685800"/>
-            <a:ext cx="8307668" cy="1295400"/>
-          </a:xfrm>
-          <a:prstGeom prst="rect">
-            <a:avLst/>
-          </a:prstGeom>
-        </p:spPr>
-        <p:txBody>
-          <a:bodyPr/>
-          <a:lstStyle>
-            <a:lvl1pPr marL="228600" indent="-228600" algn="l" defTabSz="457200" rtl="0" eaLnBrk="1" latinLnBrk="0" hangingPunct="1">
-              <a:spcBef>
-                <a:spcPts val="0"/>
-              </a:spcBef>
-              <a:buClr>
-                <a:schemeClr val="accent1"/>
-              </a:buClr>
-              <a:buFont typeface="Wingdings" charset="2"/>
-              <a:buChar char="§"/>
-              <a:defRPr sz="2400" kern="1200">
-                <a:solidFill>
-                  <a:schemeClr val="tx1"/>
-                </a:solidFill>
-                <a:latin typeface="+mn-lt"/>
-                <a:ea typeface="+mn-ea"/>
-                <a:cs typeface="+mn-cs"/>
-              </a:defRPr>
-            </a:lvl1pPr>
-            <a:lvl2pPr marL="455613" indent="-227013" algn="l" defTabSz="457200" rtl="0" eaLnBrk="1" latinLnBrk="0" hangingPunct="1">
-              <a:spcBef>
-                <a:spcPts val="0"/>
-              </a:spcBef>
-              <a:buClr>
-                <a:srgbClr val="262626"/>
-              </a:buClr>
-              <a:buFont typeface="Wingdings" charset="2"/>
-              <a:buChar char="§"/>
-              <a:defRPr sz="2000" kern="1200">
-                <a:solidFill>
-                  <a:schemeClr val="tx1"/>
-                </a:solidFill>
-                <a:latin typeface="+mn-lt"/>
-                <a:ea typeface="+mn-ea"/>
-                <a:cs typeface="+mn-cs"/>
-              </a:defRPr>
-            </a:lvl2pPr>
-            <a:lvl3pPr marL="455613" indent="-228600" algn="l" defTabSz="457200" rtl="0" eaLnBrk="1" latinLnBrk="0" hangingPunct="1">
-              <a:spcBef>
-                <a:spcPts val="0"/>
-              </a:spcBef>
-              <a:buClr>
-                <a:srgbClr val="262626"/>
-              </a:buClr>
-              <a:buFont typeface="Wingdings" charset="2"/>
-              <a:buChar char="§"/>
-              <a:defRPr sz="2000" kern="1200">
-                <a:solidFill>
-                  <a:schemeClr val="tx1"/>
-                </a:solidFill>
-                <a:latin typeface="+mn-lt"/>
-                <a:ea typeface="+mn-ea"/>
-                <a:cs typeface="+mn-cs"/>
-              </a:defRPr>
-            </a:lvl3pPr>
-            <a:lvl4pPr marL="455613" indent="-228600" algn="l" defTabSz="457200" rtl="0" eaLnBrk="1" latinLnBrk="0" hangingPunct="1">
-              <a:spcBef>
-                <a:spcPts val="0"/>
-              </a:spcBef>
-              <a:buClr>
-                <a:srgbClr val="262626"/>
-              </a:buClr>
-              <a:buFont typeface="Wingdings" charset="2"/>
-              <a:buChar char="§"/>
-              <a:defRPr sz="2000" kern="1200">
-                <a:solidFill>
-                  <a:schemeClr val="tx1"/>
-                </a:solidFill>
-                <a:latin typeface="+mn-lt"/>
-                <a:ea typeface="+mn-ea"/>
-                <a:cs typeface="+mn-cs"/>
-              </a:defRPr>
-            </a:lvl4pPr>
-            <a:lvl5pPr marL="455613" indent="-228600" algn="l" defTabSz="457200" rtl="0" eaLnBrk="1" latinLnBrk="0" hangingPunct="1">
-              <a:spcBef>
-                <a:spcPts val="200"/>
-              </a:spcBef>
-              <a:buClr>
-                <a:srgbClr val="262626"/>
-              </a:buClr>
-              <a:buFont typeface="Wingdings" charset="2"/>
-              <a:buChar char="§"/>
-              <a:defRPr sz="2000" kern="1200">
-                <a:solidFill>
-                  <a:schemeClr val="tx1"/>
-                </a:solidFill>
-                <a:latin typeface="+mn-lt"/>
-                <a:ea typeface="+mn-ea"/>
-                <a:cs typeface="+mn-cs"/>
-              </a:defRPr>
-            </a:lvl5pPr>
-            <a:lvl6pPr marL="2514600" indent="-228600" algn="l" defTabSz="457200" rtl="0" eaLnBrk="1" latinLnBrk="0" hangingPunct="1">
-              <a:spcBef>
-                <a:spcPct val="20000"/>
-              </a:spcBef>
-              <a:buFont typeface="Arial"/>
-              <a:buChar char="•"/>
-              <a:defRPr sz="2000" kern="1200">
-                <a:solidFill>
-                  <a:schemeClr val="tx1"/>
-                </a:solidFill>
-                <a:latin typeface="+mn-lt"/>
-                <a:ea typeface="+mn-ea"/>
-                <a:cs typeface="+mn-cs"/>
-              </a:defRPr>
-            </a:lvl6pPr>
-            <a:lvl7pPr marL="2971800" indent="-228600" algn="l" defTabSz="457200" rtl="0" eaLnBrk="1" latinLnBrk="0" hangingPunct="1">
-              <a:spcBef>
-                <a:spcPct val="20000"/>
-              </a:spcBef>
-              <a:buFont typeface="Arial"/>
-              <a:buChar char="•"/>
-              <a:defRPr sz="2000" kern="1200">
-                <a:solidFill>
-                  <a:schemeClr val="tx1"/>
-                </a:solidFill>
-                <a:latin typeface="+mn-lt"/>
-                <a:ea typeface="+mn-ea"/>
-                <a:cs typeface="+mn-cs"/>
-              </a:defRPr>
-            </a:lvl7pPr>
-            <a:lvl8pPr marL="3429000" indent="-228600" algn="l" defTabSz="457200" rtl="0" eaLnBrk="1" latinLnBrk="0" hangingPunct="1">
-              <a:spcBef>
-                <a:spcPct val="20000"/>
-              </a:spcBef>
-              <a:buFont typeface="Arial"/>
-              <a:buChar char="•"/>
-              <a:defRPr sz="2000" kern="1200">
-                <a:solidFill>
-                  <a:schemeClr val="tx1"/>
-                </a:solidFill>
-                <a:latin typeface="+mn-lt"/>
-                <a:ea typeface="+mn-ea"/>
-                <a:cs typeface="+mn-cs"/>
-              </a:defRPr>
-            </a:lvl8pPr>
-            <a:lvl9pPr marL="3886200" indent="-228600" algn="l" defTabSz="457200" rtl="0" eaLnBrk="1" latinLnBrk="0" hangingPunct="1">
-              <a:spcBef>
-                <a:spcPct val="20000"/>
-              </a:spcBef>
-              <a:buFont typeface="Arial"/>
-              <a:buChar char="•"/>
-              <a:defRPr sz="2000" kern="1200">
-                <a:solidFill>
-                  <a:schemeClr val="tx1"/>
-                </a:solidFill>
-                <a:latin typeface="+mn-lt"/>
-                <a:ea typeface="+mn-ea"/>
-                <a:cs typeface="+mn-cs"/>
-              </a:defRPr>
-            </a:lvl9pPr>
-          </a:lstStyle>
-          <a:p>
-            <a:pPr marL="342900" indent="-342900">
-              <a:buFont typeface="Arial" charset="0"/>
-              <a:buChar char="•"/>
-            </a:pPr>
-            <a:r>
-              <a:rPr lang="en-US" sz="2000" dirty="0">
-                <a:hlinkClick r:id="rId2"/>
-              </a:rPr>
-              <a:t>https://aws.amazon.com/marketplace</a:t>
-            </a:r>
-            <a:endParaRPr lang="en-US" sz="2000" dirty="0"/>
-          </a:p>
-          <a:p>
-            <a:pPr marL="342900" indent="-342900">
-              <a:buFont typeface="Arial" charset="0"/>
-              <a:buChar char="•"/>
-            </a:pPr>
-            <a:endParaRPr lang="en-US" sz="2000" dirty="0"/>
-          </a:p>
-          <a:p>
-            <a:pPr marL="342900" indent="-342900">
-              <a:buFont typeface="Arial" charset="0"/>
-              <a:buChar char="•"/>
-            </a:pPr>
-            <a:endParaRPr lang="en-US" sz="2000" dirty="0"/>
-          </a:p>
-          <a:p>
-            <a:pPr marL="342900" indent="-342900">
-              <a:buFont typeface="Arial" charset="0"/>
-              <a:buChar char="•"/>
-            </a:pPr>
-            <a:endParaRPr lang="en-US" dirty="0"/>
-          </a:p>
-          <a:p>
-            <a:endParaRPr lang="en-US" dirty="0"/>
-          </a:p>
-        </p:txBody>
-      </p:sp>
+      </p:pic>
     </p:spTree>
     <p:extLst>
       <p:ext uri="{BB962C8B-B14F-4D97-AF65-F5344CB8AC3E}">
-        <p14:creationId xmlns:p14="http://schemas.microsoft.com/office/powerpoint/2010/main" val="84375709"/>
+        <p14:creationId xmlns:p14="http://schemas.microsoft.com/office/powerpoint/2010/main" val="2934162958"/>
       </p:ext>
     </p:extLst>
   </p:cSld>
@@ -8461,14 +8933,14 @@
           <a:p>
             <a:r>
               <a:rPr lang="en-US" dirty="0"/>
-              <a:t>Install with Docker</a:t>
+              <a:t>Install on Cloud: Azure</a:t>
             </a:r>
           </a:p>
         </p:txBody>
       </p:sp>
       <p:sp>
         <p:nvSpPr>
-          <p:cNvPr id="3" name="Content Placeholder 2"/>
+          <p:cNvPr id="4" name="Content Placeholder 2"/>
           <p:cNvSpPr txBox="1">
             <a:spLocks/>
           </p:cNvSpPr>
@@ -8476,8 +8948,8 @@
         </p:nvSpPr>
         <p:spPr>
           <a:xfrm>
-            <a:off x="457200" y="685800"/>
-            <a:ext cx="8007739" cy="3394472"/>
+            <a:off x="198158" y="685800"/>
+            <a:ext cx="8307668" cy="1295400"/>
           </a:xfrm>
           <a:prstGeom prst="rect">
             <a:avLst/>
@@ -8643,12 +9115,12 @@
               <a:buChar char="•"/>
             </a:pPr>
             <a:r>
-              <a:rPr lang="en-US" dirty="0">
-                <a:hlinkClick r:id="rId2"/>
+              <a:rPr lang="en-US" sz="2000" dirty="0">
+                <a:hlinkClick r:id="rId3"/>
               </a:rPr>
-              <a:t>https://hub.docker.com/_/couchbase/</a:t>
-            </a:r>
-            <a:endParaRPr lang="en-US" dirty="0"/>
+              <a:t>https://azure.microsoft.com/en-us/marketplace/partners/couchbase/</a:t>
+            </a:r>
+            <a:endParaRPr lang="en-US" sz="2000" dirty="0"/>
           </a:p>
           <a:p>
             <a:pPr marL="342900" indent="-342900">
@@ -8656,67 +9128,19 @@
               <a:buChar char="•"/>
             </a:pPr>
             <a:r>
-              <a:rPr lang="en-US" dirty="0"/>
-              <a:t>enterprise-4.5.0</a:t>
-            </a:r>
+              <a:rPr lang="en-US" sz="2000" dirty="0">
+                <a:hlinkClick r:id="rId4"/>
+              </a:rPr>
+              <a:t>https://portal.azure.com</a:t>
+            </a:r>
+            <a:endParaRPr lang="en-US" sz="2000" dirty="0"/>
           </a:p>
           <a:p>
             <a:pPr marL="342900" indent="-342900">
               <a:buFont typeface="Arial" charset="0"/>
               <a:buChar char="•"/>
             </a:pPr>
-            <a:r>
-              <a:rPr lang="en-US" dirty="0" err="1">
-                <a:latin typeface="Courier New" panose="02070309020205020404" pitchFamily="49" charset="0"/>
-                <a:cs typeface="Courier New" panose="02070309020205020404" pitchFamily="49" charset="0"/>
-              </a:rPr>
-              <a:t>docker</a:t>
-            </a:r>
-            <a:r>
-              <a:rPr lang="en-US" dirty="0">
-                <a:latin typeface="Courier New" panose="02070309020205020404" pitchFamily="49" charset="0"/>
-                <a:cs typeface="Courier New" panose="02070309020205020404" pitchFamily="49" charset="0"/>
-              </a:rPr>
-              <a:t> run -d −−name </a:t>
-            </a:r>
-            <a:r>
-              <a:rPr lang="en-US" dirty="0" err="1">
-                <a:latin typeface="Courier New" panose="02070309020205020404" pitchFamily="49" charset="0"/>
-                <a:cs typeface="Courier New" panose="02070309020205020404" pitchFamily="49" charset="0"/>
-              </a:rPr>
-              <a:t>db</a:t>
-            </a:r>
-            <a:r>
-              <a:rPr lang="en-US" dirty="0">
-                <a:latin typeface="Courier New" panose="02070309020205020404" pitchFamily="49" charset="0"/>
-                <a:cs typeface="Courier New" panose="02070309020205020404" pitchFamily="49" charset="0"/>
-              </a:rPr>
-              <a:t> -p 8091-8094:8091-8094 -p 11207:11207 -p 11210-11211:11210-11211 -p 18091-18093:</a:t>
-            </a:r>
-            <a:br>
-              <a:rPr lang="en-US" dirty="0">
-                <a:latin typeface="Courier New" panose="02070309020205020404" pitchFamily="49" charset="0"/>
-                <a:cs typeface="Courier New" panose="02070309020205020404" pitchFamily="49" charset="0"/>
-              </a:rPr>
-            </a:br>
-            <a:r>
-              <a:rPr lang="en-US" dirty="0">
-                <a:latin typeface="Courier New" panose="02070309020205020404" pitchFamily="49" charset="0"/>
-                <a:cs typeface="Courier New" panose="02070309020205020404" pitchFamily="49" charset="0"/>
-              </a:rPr>
-              <a:t>18091-18093 </a:t>
-            </a:r>
-            <a:r>
-              <a:rPr lang="en-US" dirty="0" err="1">
-                <a:latin typeface="Courier New" panose="02070309020205020404" pitchFamily="49" charset="0"/>
-                <a:cs typeface="Courier New" panose="02070309020205020404" pitchFamily="49" charset="0"/>
-              </a:rPr>
-              <a:t>couchbase</a:t>
-            </a:r>
-            <a:endParaRPr lang="en-US" dirty="0">
-              <a:latin typeface="Courier New" panose="02070309020205020404" pitchFamily="49" charset="0"/>
-              <a:cs typeface="Courier New" panose="02070309020205020404" pitchFamily="49" charset="0"/>
-            </a:endParaRPr>
+            <a:endParaRPr lang="en-US" sz="2000" dirty="0"/>
           </a:p>
           <a:p>
             <a:pPr marL="342900" indent="-342900">
@@ -8732,22 +9156,22 @@
       </p:sp>
       <p:pic>
         <p:nvPicPr>
-          <p:cNvPr id="4" name="Picture 3"/>
+          <p:cNvPr id="3" name="Picture 2"/>
           <p:cNvPicPr>
             <a:picLocks noChangeAspect="1"/>
           </p:cNvPicPr>
           <p:nvPr/>
         </p:nvPicPr>
         <p:blipFill>
-          <a:blip r:embed="rId3"/>
+          <a:blip r:embed="rId5"/>
           <a:stretch>
             <a:fillRect/>
           </a:stretch>
         </p:blipFill>
         <p:spPr>
           <a:xfrm>
-            <a:off x="198157" y="3423692"/>
-            <a:ext cx="8658225" cy="988025"/>
+            <a:off x="198158" y="1469151"/>
+            <a:ext cx="8469593" cy="2561566"/>
           </a:xfrm>
           <a:prstGeom prst="rect">
             <a:avLst/>
@@ -8757,7 +9181,7 @@
     </p:spTree>
     <p:extLst>
       <p:ext uri="{BB962C8B-B14F-4D97-AF65-F5344CB8AC3E}">
-        <p14:creationId xmlns:p14="http://schemas.microsoft.com/office/powerpoint/2010/main" val="66688450"/>
+        <p14:creationId xmlns:p14="http://schemas.microsoft.com/office/powerpoint/2010/main" val="1148363434"/>
       </p:ext>
     </p:extLst>
   </p:cSld>
@@ -8801,56 +9225,370 @@
           <a:p>
             <a:r>
               <a:rPr lang="en-US" dirty="0"/>
-              <a:t>Install</a:t>
+              <a:t>Install on Cloud: Azure</a:t>
             </a:r>
           </a:p>
         </p:txBody>
       </p:sp>
-      <p:pic>
-        <p:nvPicPr>
-          <p:cNvPr id="1026" name="Picture 2" descr="Couchbase Server Install Wizard 1"/>
-          <p:cNvPicPr>
-            <a:picLocks noChangeAspect="1" noChangeArrowheads="1"/>
-          </p:cNvPicPr>
+      <p:sp>
+        <p:nvSpPr>
+          <p:cNvPr id="3" name="Content Placeholder 2"/>
+          <p:cNvSpPr txBox="1">
+            <a:spLocks/>
+          </p:cNvSpPr>
           <p:nvPr/>
-        </p:nvPicPr>
-        <p:blipFill>
-          <a:blip r:embed="rId2">
-            <a:extLst>
-              <a:ext uri="{28A0092B-C50C-407E-A947-70E740481C1C}">
-                <a14:useLocalDpi xmlns:a14="http://schemas.microsoft.com/office/drawing/2010/main" val="0"/>
-              </a:ext>
-            </a:extLst>
-          </a:blip>
-          <a:srcRect/>
-          <a:stretch>
-            <a:fillRect/>
-          </a:stretch>
-        </p:blipFill>
-        <p:spPr bwMode="auto">
+        </p:nvSpPr>
+        <p:spPr>
           <a:xfrm>
-            <a:off x="2195513" y="762000"/>
-            <a:ext cx="4752975" cy="3619500"/>
+            <a:off x="198158" y="685800"/>
+            <a:ext cx="8307668" cy="1295400"/>
           </a:xfrm>
           <a:prstGeom prst="rect">
             <a:avLst/>
           </a:prstGeom>
-          <a:noFill/>
-          <a:extLst>
-            <a:ext uri="{909E8E84-426E-40DD-AFC4-6F175D3DCCD1}">
-              <a14:hiddenFill xmlns:a14="http://schemas.microsoft.com/office/drawing/2010/main">
-                <a:solidFill>
-                  <a:srgbClr val="FFFFFF"/>
-                </a:solidFill>
-              </a14:hiddenFill>
-            </a:ext>
-          </a:extLst>
         </p:spPr>
-      </p:pic>
+        <p:txBody>
+          <a:bodyPr/>
+          <a:lstStyle>
+            <a:lvl1pPr marL="228600" indent="-228600" algn="l" defTabSz="457200" rtl="0" eaLnBrk="1" latinLnBrk="0" hangingPunct="1">
+              <a:spcBef>
+                <a:spcPts val="0"/>
+              </a:spcBef>
+              <a:buClr>
+                <a:schemeClr val="accent1"/>
+              </a:buClr>
+              <a:buFont typeface="Wingdings" charset="2"/>
+              <a:buChar char="§"/>
+              <a:defRPr sz="2400" kern="1200">
+                <a:solidFill>
+                  <a:schemeClr val="tx1"/>
+                </a:solidFill>
+                <a:latin typeface="+mn-lt"/>
+                <a:ea typeface="+mn-ea"/>
+                <a:cs typeface="+mn-cs"/>
+              </a:defRPr>
+            </a:lvl1pPr>
+            <a:lvl2pPr marL="455613" indent="-227013" algn="l" defTabSz="457200" rtl="0" eaLnBrk="1" latinLnBrk="0" hangingPunct="1">
+              <a:spcBef>
+                <a:spcPts val="0"/>
+              </a:spcBef>
+              <a:buClr>
+                <a:srgbClr val="262626"/>
+              </a:buClr>
+              <a:buFont typeface="Wingdings" charset="2"/>
+              <a:buChar char="§"/>
+              <a:defRPr sz="2000" kern="1200">
+                <a:solidFill>
+                  <a:schemeClr val="tx1"/>
+                </a:solidFill>
+                <a:latin typeface="+mn-lt"/>
+                <a:ea typeface="+mn-ea"/>
+                <a:cs typeface="+mn-cs"/>
+              </a:defRPr>
+            </a:lvl2pPr>
+            <a:lvl3pPr marL="455613" indent="-228600" algn="l" defTabSz="457200" rtl="0" eaLnBrk="1" latinLnBrk="0" hangingPunct="1">
+              <a:spcBef>
+                <a:spcPts val="0"/>
+              </a:spcBef>
+              <a:buClr>
+                <a:srgbClr val="262626"/>
+              </a:buClr>
+              <a:buFont typeface="Wingdings" charset="2"/>
+              <a:buChar char="§"/>
+              <a:defRPr sz="2000" kern="1200">
+                <a:solidFill>
+                  <a:schemeClr val="tx1"/>
+                </a:solidFill>
+                <a:latin typeface="+mn-lt"/>
+                <a:ea typeface="+mn-ea"/>
+                <a:cs typeface="+mn-cs"/>
+              </a:defRPr>
+            </a:lvl3pPr>
+            <a:lvl4pPr marL="455613" indent="-228600" algn="l" defTabSz="457200" rtl="0" eaLnBrk="1" latinLnBrk="0" hangingPunct="1">
+              <a:spcBef>
+                <a:spcPts val="0"/>
+              </a:spcBef>
+              <a:buClr>
+                <a:srgbClr val="262626"/>
+              </a:buClr>
+              <a:buFont typeface="Wingdings" charset="2"/>
+              <a:buChar char="§"/>
+              <a:defRPr sz="2000" kern="1200">
+                <a:solidFill>
+                  <a:schemeClr val="tx1"/>
+                </a:solidFill>
+                <a:latin typeface="+mn-lt"/>
+                <a:ea typeface="+mn-ea"/>
+                <a:cs typeface="+mn-cs"/>
+              </a:defRPr>
+            </a:lvl4pPr>
+            <a:lvl5pPr marL="455613" indent="-228600" algn="l" defTabSz="457200" rtl="0" eaLnBrk="1" latinLnBrk="0" hangingPunct="1">
+              <a:spcBef>
+                <a:spcPts val="200"/>
+              </a:spcBef>
+              <a:buClr>
+                <a:srgbClr val="262626"/>
+              </a:buClr>
+              <a:buFont typeface="Wingdings" charset="2"/>
+              <a:buChar char="§"/>
+              <a:defRPr sz="2000" kern="1200">
+                <a:solidFill>
+                  <a:schemeClr val="tx1"/>
+                </a:solidFill>
+                <a:latin typeface="+mn-lt"/>
+                <a:ea typeface="+mn-ea"/>
+                <a:cs typeface="+mn-cs"/>
+              </a:defRPr>
+            </a:lvl5pPr>
+            <a:lvl6pPr marL="2514600" indent="-228600" algn="l" defTabSz="457200" rtl="0" eaLnBrk="1" latinLnBrk="0" hangingPunct="1">
+              <a:spcBef>
+                <a:spcPct val="20000"/>
+              </a:spcBef>
+              <a:buFont typeface="Arial"/>
+              <a:buChar char="•"/>
+              <a:defRPr sz="2000" kern="1200">
+                <a:solidFill>
+                  <a:schemeClr val="tx1"/>
+                </a:solidFill>
+                <a:latin typeface="+mn-lt"/>
+                <a:ea typeface="+mn-ea"/>
+                <a:cs typeface="+mn-cs"/>
+              </a:defRPr>
+            </a:lvl6pPr>
+            <a:lvl7pPr marL="2971800" indent="-228600" algn="l" defTabSz="457200" rtl="0" eaLnBrk="1" latinLnBrk="0" hangingPunct="1">
+              <a:spcBef>
+                <a:spcPct val="20000"/>
+              </a:spcBef>
+              <a:buFont typeface="Arial"/>
+              <a:buChar char="•"/>
+              <a:defRPr sz="2000" kern="1200">
+                <a:solidFill>
+                  <a:schemeClr val="tx1"/>
+                </a:solidFill>
+                <a:latin typeface="+mn-lt"/>
+                <a:ea typeface="+mn-ea"/>
+                <a:cs typeface="+mn-cs"/>
+              </a:defRPr>
+            </a:lvl7pPr>
+            <a:lvl8pPr marL="3429000" indent="-228600" algn="l" defTabSz="457200" rtl="0" eaLnBrk="1" latinLnBrk="0" hangingPunct="1">
+              <a:spcBef>
+                <a:spcPct val="20000"/>
+              </a:spcBef>
+              <a:buFont typeface="Arial"/>
+              <a:buChar char="•"/>
+              <a:defRPr sz="2000" kern="1200">
+                <a:solidFill>
+                  <a:schemeClr val="tx1"/>
+                </a:solidFill>
+                <a:latin typeface="+mn-lt"/>
+                <a:ea typeface="+mn-ea"/>
+                <a:cs typeface="+mn-cs"/>
+              </a:defRPr>
+            </a:lvl8pPr>
+            <a:lvl9pPr marL="3886200" indent="-228600" algn="l" defTabSz="457200" rtl="0" eaLnBrk="1" latinLnBrk="0" hangingPunct="1">
+              <a:spcBef>
+                <a:spcPct val="20000"/>
+              </a:spcBef>
+              <a:buFont typeface="Arial"/>
+              <a:buChar char="•"/>
+              <a:defRPr sz="2000" kern="1200">
+                <a:solidFill>
+                  <a:schemeClr val="tx1"/>
+                </a:solidFill>
+                <a:latin typeface="+mn-lt"/>
+                <a:ea typeface="+mn-ea"/>
+                <a:cs typeface="+mn-cs"/>
+              </a:defRPr>
+            </a:lvl9pPr>
+          </a:lstStyle>
+          <a:p>
+            <a:pPr marL="342900" indent="-342900">
+              <a:buFont typeface="Arial" charset="0"/>
+              <a:buChar char="•"/>
+            </a:pPr>
+            <a:r>
+              <a:rPr lang="en-US" sz="1800" dirty="0"/>
+              <a:t>Select </a:t>
+            </a:r>
+            <a:r>
+              <a:rPr lang="en-US" sz="1800" dirty="0" err="1"/>
+              <a:t>Couchbase</a:t>
+            </a:r>
+            <a:r>
+              <a:rPr lang="en-US" sz="1800" dirty="0"/>
+              <a:t> Server, click Create</a:t>
+            </a:r>
+          </a:p>
+          <a:p>
+            <a:pPr marL="342900" indent="-342900">
+              <a:buFont typeface="Arial" charset="0"/>
+              <a:buChar char="•"/>
+            </a:pPr>
+            <a:r>
+              <a:rPr lang="en-US" sz="1800" dirty="0"/>
+              <a:t>Step 1 Basics: Name, user name, </a:t>
+            </a:r>
+            <a:r>
+              <a:rPr lang="en-US" sz="1800" dirty="0" err="1"/>
+              <a:t>Auth</a:t>
+            </a:r>
+            <a:r>
+              <a:rPr lang="en-US" sz="1800" dirty="0"/>
+              <a:t> type, Password, Subscription, Resource Group, Location</a:t>
+            </a:r>
+          </a:p>
+          <a:p>
+            <a:pPr marL="342900" indent="-342900">
+              <a:buFont typeface="Arial" charset="0"/>
+              <a:buChar char="•"/>
+            </a:pPr>
+            <a:r>
+              <a:rPr lang="en-US" sz="1800" dirty="0"/>
+              <a:t>Step 2 Size: Pick a size (4 cores, 4gb RAM recommended)</a:t>
+            </a:r>
+          </a:p>
+          <a:p>
+            <a:pPr marL="342900" indent="-342900">
+              <a:buFont typeface="Arial" charset="0"/>
+              <a:buChar char="•"/>
+            </a:pPr>
+            <a:r>
+              <a:rPr lang="en-US" sz="1800" dirty="0"/>
+              <a:t>Step 3 Settings: </a:t>
+            </a:r>
+          </a:p>
+          <a:p>
+            <a:pPr marL="569913" lvl="1" indent="-342900">
+              <a:buFont typeface="Arial" charset="0"/>
+              <a:buChar char="•"/>
+            </a:pPr>
+            <a:r>
+              <a:rPr lang="en-US" sz="1400" dirty="0"/>
+              <a:t>Virtual network -&gt; subnet name</a:t>
+            </a:r>
+          </a:p>
+          <a:p>
+            <a:pPr marL="569913" lvl="1" indent="-342900">
+              <a:buFont typeface="Arial" charset="0"/>
+              <a:buChar char="•"/>
+            </a:pPr>
+            <a:r>
+              <a:rPr lang="en-US" sz="1400" dirty="0"/>
+              <a:t>Network security group -&gt; add inbound rule (TCP, source port *, destination port *)</a:t>
+            </a:r>
+          </a:p>
+          <a:p>
+            <a:pPr marL="569913" lvl="1" indent="-342900">
+              <a:buFont typeface="Arial" charset="0"/>
+              <a:buChar char="•"/>
+            </a:pPr>
+            <a:r>
+              <a:rPr lang="en-US" sz="1400" dirty="0"/>
+              <a:t>Network security group -&gt; add outbound rule (TCP, destination port *, source port *)</a:t>
+            </a:r>
+          </a:p>
+          <a:p>
+            <a:pPr marL="342900" indent="-342900">
+              <a:buFont typeface="Arial" charset="0"/>
+              <a:buChar char="•"/>
+            </a:pPr>
+            <a:r>
+              <a:rPr lang="en-US" sz="1800" dirty="0"/>
+              <a:t>Step 4 Summary</a:t>
+            </a:r>
+          </a:p>
+          <a:p>
+            <a:pPr marL="342900" indent="-342900">
+              <a:buFont typeface="Arial" charset="0"/>
+              <a:buChar char="•"/>
+            </a:pPr>
+            <a:r>
+              <a:rPr lang="en-US" sz="1800" dirty="0"/>
+              <a:t>Step 5 Buy</a:t>
+            </a:r>
+          </a:p>
+          <a:p>
+            <a:pPr marL="342900" indent="-342900">
+              <a:buFont typeface="Arial" charset="0"/>
+              <a:buChar char="•"/>
+            </a:pPr>
+            <a:r>
+              <a:rPr lang="en-US" sz="1800" dirty="0"/>
+              <a:t>Wait for deployment</a:t>
+            </a:r>
+          </a:p>
+          <a:p>
+            <a:pPr marL="342900" indent="-342900">
+              <a:buFont typeface="Arial" charset="0"/>
+              <a:buChar char="•"/>
+            </a:pPr>
+            <a:r>
+              <a:rPr lang="en-US" sz="1800" dirty="0"/>
+              <a:t>Access </a:t>
+            </a:r>
+            <a:r>
+              <a:rPr lang="en-US" sz="1800" dirty="0" err="1"/>
+              <a:t>Couchbase</a:t>
+            </a:r>
+            <a:r>
+              <a:rPr lang="en-US" sz="1800" dirty="0"/>
+              <a:t> Console via the Public IP address, port 8091 (e.g. http://168.1.2.3:8091)</a:t>
+            </a:r>
+          </a:p>
+          <a:p>
+            <a:pPr marL="342900" indent="-342900">
+              <a:buFont typeface="Arial" charset="0"/>
+              <a:buChar char="•"/>
+            </a:pPr>
+            <a:r>
+              <a:rPr lang="en-US" sz="1800" dirty="0"/>
+              <a:t>Video: </a:t>
+            </a:r>
+            <a:r>
+              <a:rPr lang="en-US" sz="1800" dirty="0">
+                <a:hlinkClick r:id="rId3"/>
+              </a:rPr>
+              <a:t>http://blog.couchbase.com/2016/june/couchbase-on-the-microsoft-azure-marketplace-video</a:t>
+            </a:r>
+            <a:endParaRPr lang="en-US" sz="1800" dirty="0"/>
+          </a:p>
+          <a:p>
+            <a:pPr marL="342900" indent="-342900">
+              <a:buFont typeface="Arial" charset="0"/>
+              <a:buChar char="•"/>
+            </a:pPr>
+            <a:endParaRPr lang="en-US" sz="1800" dirty="0"/>
+          </a:p>
+          <a:p>
+            <a:pPr marL="342900" indent="-342900">
+              <a:buFont typeface="Arial" charset="0"/>
+              <a:buChar char="•"/>
+            </a:pPr>
+            <a:endParaRPr lang="en-US" sz="1800" dirty="0"/>
+          </a:p>
+          <a:p>
+            <a:pPr marL="342900" indent="-342900">
+              <a:buFont typeface="Arial" charset="0"/>
+              <a:buChar char="•"/>
+            </a:pPr>
+            <a:endParaRPr lang="en-US" sz="1800" dirty="0"/>
+          </a:p>
+          <a:p>
+            <a:pPr marL="342900" indent="-342900">
+              <a:buFont typeface="Arial" charset="0"/>
+              <a:buChar char="•"/>
+            </a:pPr>
+            <a:endParaRPr lang="en-US" sz="2000" dirty="0"/>
+          </a:p>
+          <a:p>
+            <a:endParaRPr lang="en-US" sz="2000" dirty="0"/>
+          </a:p>
+        </p:txBody>
+      </p:sp>
     </p:spTree>
     <p:extLst>
       <p:ext uri="{BB962C8B-B14F-4D97-AF65-F5344CB8AC3E}">
-        <p14:creationId xmlns:p14="http://schemas.microsoft.com/office/powerpoint/2010/main" val="2934162958"/>
+        <p14:creationId xmlns:p14="http://schemas.microsoft.com/office/powerpoint/2010/main" val="3543248798"/>
       </p:ext>
     </p:extLst>
   </p:cSld>
@@ -8894,85 +9632,182 @@
           <a:p>
             <a:r>
               <a:rPr lang="en-US" dirty="0"/>
-              <a:t>Configuration</a:t>
+              <a:t>Install on Cloud: Amazon</a:t>
             </a:r>
           </a:p>
         </p:txBody>
       </p:sp>
-      <p:pic>
-        <p:nvPicPr>
-          <p:cNvPr id="2050" name="Picture 2" descr="Couchbase Server Console"/>
-          <p:cNvPicPr>
-            <a:picLocks noChangeAspect="1" noChangeArrowheads="1"/>
-          </p:cNvPicPr>
-          <p:nvPr/>
-        </p:nvPicPr>
-        <p:blipFill>
-          <a:blip r:embed="rId2">
-            <a:extLst>
-              <a:ext uri="{28A0092B-C50C-407E-A947-70E740481C1C}">
-                <a14:useLocalDpi xmlns:a14="http://schemas.microsoft.com/office/drawing/2010/main" val="0"/>
-              </a:ext>
-            </a:extLst>
-          </a:blip>
-          <a:srcRect/>
-          <a:stretch>
-            <a:fillRect/>
-          </a:stretch>
-        </p:blipFill>
-        <p:spPr bwMode="auto">
-          <a:xfrm>
-            <a:off x="2390775" y="1019483"/>
-            <a:ext cx="4505325" cy="3923992"/>
-          </a:xfrm>
-          <a:prstGeom prst="rect">
-            <a:avLst/>
-          </a:prstGeom>
-          <a:noFill/>
-          <a:extLst>
-            <a:ext uri="{909E8E84-426E-40DD-AFC4-6F175D3DCCD1}">
-              <a14:hiddenFill xmlns:a14="http://schemas.microsoft.com/office/drawing/2010/main">
-                <a:solidFill>
-                  <a:srgbClr val="FFFFFF"/>
-                </a:solidFill>
-              </a14:hiddenFill>
-            </a:ext>
-          </a:extLst>
-        </p:spPr>
-      </p:pic>
       <p:sp>
         <p:nvSpPr>
-          <p:cNvPr id="3" name="Rectangle 2"/>
-          <p:cNvSpPr/>
+          <p:cNvPr id="4" name="Content Placeholder 2"/>
+          <p:cNvSpPr txBox="1">
+            <a:spLocks/>
+          </p:cNvSpPr>
           <p:nvPr/>
         </p:nvSpPr>
         <p:spPr>
           <a:xfrm>
-            <a:off x="275812" y="600030"/>
-            <a:ext cx="2513830" cy="646331"/>
+            <a:off x="457200" y="685800"/>
+            <a:ext cx="8007739" cy="3394472"/>
           </a:xfrm>
           <a:prstGeom prst="rect">
             <a:avLst/>
           </a:prstGeom>
         </p:spPr>
         <p:txBody>
-          <a:bodyPr wrap="none">
-            <a:spAutoFit/>
-          </a:bodyPr>
-          <a:lstStyle/>
-          <a:p>
-            <a:pPr marL="342900" indent="-342900">
-              <a:buFont typeface="Arial" charset="0"/>
+          <a:bodyPr/>
+          <a:lstStyle>
+            <a:lvl1pPr marL="228600" indent="-228600" algn="l" defTabSz="457200" rtl="0" eaLnBrk="1" latinLnBrk="0" hangingPunct="1">
+              <a:spcBef>
+                <a:spcPts val="0"/>
+              </a:spcBef>
+              <a:buClr>
+                <a:schemeClr val="accent1"/>
+              </a:buClr>
+              <a:buFont typeface="Wingdings" charset="2"/>
+              <a:buChar char="§"/>
+              <a:defRPr sz="2400" kern="1200">
+                <a:solidFill>
+                  <a:schemeClr val="tx1"/>
+                </a:solidFill>
+                <a:latin typeface="+mn-lt"/>
+                <a:ea typeface="+mn-ea"/>
+                <a:cs typeface="+mn-cs"/>
+              </a:defRPr>
+            </a:lvl1pPr>
+            <a:lvl2pPr marL="455613" indent="-227013" algn="l" defTabSz="457200" rtl="0" eaLnBrk="1" latinLnBrk="0" hangingPunct="1">
+              <a:spcBef>
+                <a:spcPts val="0"/>
+              </a:spcBef>
+              <a:buClr>
+                <a:srgbClr val="262626"/>
+              </a:buClr>
+              <a:buFont typeface="Wingdings" charset="2"/>
+              <a:buChar char="§"/>
+              <a:defRPr sz="2000" kern="1200">
+                <a:solidFill>
+                  <a:schemeClr val="tx1"/>
+                </a:solidFill>
+                <a:latin typeface="+mn-lt"/>
+                <a:ea typeface="+mn-ea"/>
+                <a:cs typeface="+mn-cs"/>
+              </a:defRPr>
+            </a:lvl2pPr>
+            <a:lvl3pPr marL="455613" indent="-228600" algn="l" defTabSz="457200" rtl="0" eaLnBrk="1" latinLnBrk="0" hangingPunct="1">
+              <a:spcBef>
+                <a:spcPts val="0"/>
+              </a:spcBef>
+              <a:buClr>
+                <a:srgbClr val="262626"/>
+              </a:buClr>
+              <a:buFont typeface="Wingdings" charset="2"/>
+              <a:buChar char="§"/>
+              <a:defRPr sz="2000" kern="1200">
+                <a:solidFill>
+                  <a:schemeClr val="tx1"/>
+                </a:solidFill>
+                <a:latin typeface="+mn-lt"/>
+                <a:ea typeface="+mn-ea"/>
+                <a:cs typeface="+mn-cs"/>
+              </a:defRPr>
+            </a:lvl3pPr>
+            <a:lvl4pPr marL="455613" indent="-228600" algn="l" defTabSz="457200" rtl="0" eaLnBrk="1" latinLnBrk="0" hangingPunct="1">
+              <a:spcBef>
+                <a:spcPts val="0"/>
+              </a:spcBef>
+              <a:buClr>
+                <a:srgbClr val="262626"/>
+              </a:buClr>
+              <a:buFont typeface="Wingdings" charset="2"/>
+              <a:buChar char="§"/>
+              <a:defRPr sz="2000" kern="1200">
+                <a:solidFill>
+                  <a:schemeClr val="tx1"/>
+                </a:solidFill>
+                <a:latin typeface="+mn-lt"/>
+                <a:ea typeface="+mn-ea"/>
+                <a:cs typeface="+mn-cs"/>
+              </a:defRPr>
+            </a:lvl4pPr>
+            <a:lvl5pPr marL="455613" indent="-228600" algn="l" defTabSz="457200" rtl="0" eaLnBrk="1" latinLnBrk="0" hangingPunct="1">
+              <a:spcBef>
+                <a:spcPts val="200"/>
+              </a:spcBef>
+              <a:buClr>
+                <a:srgbClr val="262626"/>
+              </a:buClr>
+              <a:buFont typeface="Wingdings" charset="2"/>
+              <a:buChar char="§"/>
+              <a:defRPr sz="2000" kern="1200">
+                <a:solidFill>
+                  <a:schemeClr val="tx1"/>
+                </a:solidFill>
+                <a:latin typeface="+mn-lt"/>
+                <a:ea typeface="+mn-ea"/>
+                <a:cs typeface="+mn-cs"/>
+              </a:defRPr>
+            </a:lvl5pPr>
+            <a:lvl6pPr marL="2514600" indent="-228600" algn="l" defTabSz="457200" rtl="0" eaLnBrk="1" latinLnBrk="0" hangingPunct="1">
+              <a:spcBef>
+                <a:spcPct val="20000"/>
+              </a:spcBef>
+              <a:buFont typeface="Arial"/>
               <a:buChar char="•"/>
-            </a:pPr>
-            <a:r>
-              <a:rPr lang="en-US" dirty="0">
-                <a:hlinkClick r:id="rId3"/>
-              </a:rPr>
-              <a:t>http://localhost:8091</a:t>
-            </a:r>
-            <a:endParaRPr lang="en-US" dirty="0"/>
-          </a:p>
+              <a:defRPr sz="2000" kern="1200">
+                <a:solidFill>
+                  <a:schemeClr val="tx1"/>
+                </a:solidFill>
+                <a:latin typeface="+mn-lt"/>
+                <a:ea typeface="+mn-ea"/>
+                <a:cs typeface="+mn-cs"/>
+              </a:defRPr>
+            </a:lvl6pPr>
+            <a:lvl7pPr marL="2971800" indent="-228600" algn="l" defTabSz="457200" rtl="0" eaLnBrk="1" latinLnBrk="0" hangingPunct="1">
+              <a:spcBef>
+                <a:spcPct val="20000"/>
+              </a:spcBef>
+              <a:buFont typeface="Arial"/>
+              <a:buChar char="•"/>
+              <a:defRPr sz="2000" kern="1200">
+                <a:solidFill>
+                  <a:schemeClr val="tx1"/>
+                </a:solidFill>
+                <a:latin typeface="+mn-lt"/>
+                <a:ea typeface="+mn-ea"/>
+                <a:cs typeface="+mn-cs"/>
+              </a:defRPr>
+            </a:lvl7pPr>
+            <a:lvl8pPr marL="3429000" indent="-228600" algn="l" defTabSz="457200" rtl="0" eaLnBrk="1" latinLnBrk="0" hangingPunct="1">
+              <a:spcBef>
+                <a:spcPct val="20000"/>
+              </a:spcBef>
+              <a:buFont typeface="Arial"/>
+              <a:buChar char="•"/>
+              <a:defRPr sz="2000" kern="1200">
+                <a:solidFill>
+                  <a:schemeClr val="tx1"/>
+                </a:solidFill>
+                <a:latin typeface="+mn-lt"/>
+                <a:ea typeface="+mn-ea"/>
+                <a:cs typeface="+mn-cs"/>
+              </a:defRPr>
+            </a:lvl8pPr>
+            <a:lvl9pPr marL="3886200" indent="-228600" algn="l" defTabSz="457200" rtl="0" eaLnBrk="1" latinLnBrk="0" hangingPunct="1">
+              <a:spcBef>
+                <a:spcPct val="20000"/>
+              </a:spcBef>
+              <a:buFont typeface="Arial"/>
+              <a:buChar char="•"/>
+              <a:defRPr sz="2000" kern="1200">
+                <a:solidFill>
+                  <a:schemeClr val="tx1"/>
+                </a:solidFill>
+                <a:latin typeface="+mn-lt"/>
+                <a:ea typeface="+mn-ea"/>
+                <a:cs typeface="+mn-cs"/>
+              </a:defRPr>
+            </a:lvl9pPr>
+          </a:lstStyle>
           <a:p>
             <a:pPr marL="342900" indent="-342900">
               <a:buFont typeface="Arial" charset="0"/>
@@ -8980,12 +9815,269 @@
             </a:pPr>
             <a:endParaRPr lang="en-US" dirty="0"/>
           </a:p>
+          <a:p>
+            <a:endParaRPr lang="en-US" dirty="0"/>
+          </a:p>
         </p:txBody>
       </p:sp>
+      <p:sp>
+        <p:nvSpPr>
+          <p:cNvPr id="5" name="Content Placeholder 2"/>
+          <p:cNvSpPr txBox="1">
+            <a:spLocks/>
+          </p:cNvSpPr>
+          <p:nvPr/>
+        </p:nvSpPr>
+        <p:spPr>
+          <a:xfrm>
+            <a:off x="198158" y="685800"/>
+            <a:ext cx="8307668" cy="1295400"/>
+          </a:xfrm>
+          <a:prstGeom prst="rect">
+            <a:avLst/>
+          </a:prstGeom>
+        </p:spPr>
+        <p:txBody>
+          <a:bodyPr/>
+          <a:lstStyle>
+            <a:lvl1pPr marL="228600" indent="-228600" algn="l" defTabSz="457200" rtl="0" eaLnBrk="1" latinLnBrk="0" hangingPunct="1">
+              <a:spcBef>
+                <a:spcPts val="0"/>
+              </a:spcBef>
+              <a:buClr>
+                <a:schemeClr val="accent1"/>
+              </a:buClr>
+              <a:buFont typeface="Wingdings" charset="2"/>
+              <a:buChar char="§"/>
+              <a:defRPr sz="2400" kern="1200">
+                <a:solidFill>
+                  <a:schemeClr val="tx1"/>
+                </a:solidFill>
+                <a:latin typeface="+mn-lt"/>
+                <a:ea typeface="+mn-ea"/>
+                <a:cs typeface="+mn-cs"/>
+              </a:defRPr>
+            </a:lvl1pPr>
+            <a:lvl2pPr marL="455613" indent="-227013" algn="l" defTabSz="457200" rtl="0" eaLnBrk="1" latinLnBrk="0" hangingPunct="1">
+              <a:spcBef>
+                <a:spcPts val="0"/>
+              </a:spcBef>
+              <a:buClr>
+                <a:srgbClr val="262626"/>
+              </a:buClr>
+              <a:buFont typeface="Wingdings" charset="2"/>
+              <a:buChar char="§"/>
+              <a:defRPr sz="2000" kern="1200">
+                <a:solidFill>
+                  <a:schemeClr val="tx1"/>
+                </a:solidFill>
+                <a:latin typeface="+mn-lt"/>
+                <a:ea typeface="+mn-ea"/>
+                <a:cs typeface="+mn-cs"/>
+              </a:defRPr>
+            </a:lvl2pPr>
+            <a:lvl3pPr marL="455613" indent="-228600" algn="l" defTabSz="457200" rtl="0" eaLnBrk="1" latinLnBrk="0" hangingPunct="1">
+              <a:spcBef>
+                <a:spcPts val="0"/>
+              </a:spcBef>
+              <a:buClr>
+                <a:srgbClr val="262626"/>
+              </a:buClr>
+              <a:buFont typeface="Wingdings" charset="2"/>
+              <a:buChar char="§"/>
+              <a:defRPr sz="2000" kern="1200">
+                <a:solidFill>
+                  <a:schemeClr val="tx1"/>
+                </a:solidFill>
+                <a:latin typeface="+mn-lt"/>
+                <a:ea typeface="+mn-ea"/>
+                <a:cs typeface="+mn-cs"/>
+              </a:defRPr>
+            </a:lvl3pPr>
+            <a:lvl4pPr marL="455613" indent="-228600" algn="l" defTabSz="457200" rtl="0" eaLnBrk="1" latinLnBrk="0" hangingPunct="1">
+              <a:spcBef>
+                <a:spcPts val="0"/>
+              </a:spcBef>
+              <a:buClr>
+                <a:srgbClr val="262626"/>
+              </a:buClr>
+              <a:buFont typeface="Wingdings" charset="2"/>
+              <a:buChar char="§"/>
+              <a:defRPr sz="2000" kern="1200">
+                <a:solidFill>
+                  <a:schemeClr val="tx1"/>
+                </a:solidFill>
+                <a:latin typeface="+mn-lt"/>
+                <a:ea typeface="+mn-ea"/>
+                <a:cs typeface="+mn-cs"/>
+              </a:defRPr>
+            </a:lvl4pPr>
+            <a:lvl5pPr marL="455613" indent="-228600" algn="l" defTabSz="457200" rtl="0" eaLnBrk="1" latinLnBrk="0" hangingPunct="1">
+              <a:spcBef>
+                <a:spcPts val="200"/>
+              </a:spcBef>
+              <a:buClr>
+                <a:srgbClr val="262626"/>
+              </a:buClr>
+              <a:buFont typeface="Wingdings" charset="2"/>
+              <a:buChar char="§"/>
+              <a:defRPr sz="2000" kern="1200">
+                <a:solidFill>
+                  <a:schemeClr val="tx1"/>
+                </a:solidFill>
+                <a:latin typeface="+mn-lt"/>
+                <a:ea typeface="+mn-ea"/>
+                <a:cs typeface="+mn-cs"/>
+              </a:defRPr>
+            </a:lvl5pPr>
+            <a:lvl6pPr marL="2514600" indent="-228600" algn="l" defTabSz="457200" rtl="0" eaLnBrk="1" latinLnBrk="0" hangingPunct="1">
+              <a:spcBef>
+                <a:spcPct val="20000"/>
+              </a:spcBef>
+              <a:buFont typeface="Arial"/>
+              <a:buChar char="•"/>
+              <a:defRPr sz="2000" kern="1200">
+                <a:solidFill>
+                  <a:schemeClr val="tx1"/>
+                </a:solidFill>
+                <a:latin typeface="+mn-lt"/>
+                <a:ea typeface="+mn-ea"/>
+                <a:cs typeface="+mn-cs"/>
+              </a:defRPr>
+            </a:lvl6pPr>
+            <a:lvl7pPr marL="2971800" indent="-228600" algn="l" defTabSz="457200" rtl="0" eaLnBrk="1" latinLnBrk="0" hangingPunct="1">
+              <a:spcBef>
+                <a:spcPct val="20000"/>
+              </a:spcBef>
+              <a:buFont typeface="Arial"/>
+              <a:buChar char="•"/>
+              <a:defRPr sz="2000" kern="1200">
+                <a:solidFill>
+                  <a:schemeClr val="tx1"/>
+                </a:solidFill>
+                <a:latin typeface="+mn-lt"/>
+                <a:ea typeface="+mn-ea"/>
+                <a:cs typeface="+mn-cs"/>
+              </a:defRPr>
+            </a:lvl7pPr>
+            <a:lvl8pPr marL="3429000" indent="-228600" algn="l" defTabSz="457200" rtl="0" eaLnBrk="1" latinLnBrk="0" hangingPunct="1">
+              <a:spcBef>
+                <a:spcPct val="20000"/>
+              </a:spcBef>
+              <a:buFont typeface="Arial"/>
+              <a:buChar char="•"/>
+              <a:defRPr sz="2000" kern="1200">
+                <a:solidFill>
+                  <a:schemeClr val="tx1"/>
+                </a:solidFill>
+                <a:latin typeface="+mn-lt"/>
+                <a:ea typeface="+mn-ea"/>
+                <a:cs typeface="+mn-cs"/>
+              </a:defRPr>
+            </a:lvl8pPr>
+            <a:lvl9pPr marL="3886200" indent="-228600" algn="l" defTabSz="457200" rtl="0" eaLnBrk="1" latinLnBrk="0" hangingPunct="1">
+              <a:spcBef>
+                <a:spcPct val="20000"/>
+              </a:spcBef>
+              <a:buFont typeface="Arial"/>
+              <a:buChar char="•"/>
+              <a:defRPr sz="2000" kern="1200">
+                <a:solidFill>
+                  <a:schemeClr val="tx1"/>
+                </a:solidFill>
+                <a:latin typeface="+mn-lt"/>
+                <a:ea typeface="+mn-ea"/>
+                <a:cs typeface="+mn-cs"/>
+              </a:defRPr>
+            </a:lvl9pPr>
+          </a:lstStyle>
+          <a:p>
+            <a:pPr marL="342900" indent="-342900">
+              <a:buFont typeface="Arial" charset="0"/>
+              <a:buChar char="•"/>
+            </a:pPr>
+            <a:r>
+              <a:rPr lang="en-US" sz="2000" dirty="0">
+                <a:hlinkClick r:id="rId2"/>
+              </a:rPr>
+              <a:t>https://aws.amazon.com/marketplace</a:t>
+            </a:r>
+            <a:endParaRPr lang="en-US" sz="2000" dirty="0"/>
+          </a:p>
+          <a:p>
+            <a:pPr marL="342900" indent="-342900">
+              <a:buFont typeface="Arial" charset="0"/>
+              <a:buChar char="•"/>
+            </a:pPr>
+            <a:r>
+              <a:rPr lang="en-US" sz="2000" dirty="0">
+                <a:hlinkClick r:id="rId3"/>
+              </a:rPr>
+              <a:t>https://aws.amazon.com/marketplace/seller-profile?id=1a064a14-5ac2-4980-9167-15746aabde72</a:t>
+            </a:r>
+            <a:endParaRPr lang="en-US" sz="2000" dirty="0"/>
+          </a:p>
+          <a:p>
+            <a:pPr marL="342900" indent="-342900">
+              <a:buFont typeface="Arial" charset="0"/>
+              <a:buChar char="•"/>
+            </a:pPr>
+            <a:endParaRPr lang="en-US" sz="2000" dirty="0"/>
+          </a:p>
+          <a:p>
+            <a:pPr marL="342900" indent="-342900">
+              <a:buFont typeface="Arial" charset="0"/>
+              <a:buChar char="•"/>
+            </a:pPr>
+            <a:endParaRPr lang="en-US" sz="2000" dirty="0"/>
+          </a:p>
+          <a:p>
+            <a:pPr marL="342900" indent="-342900">
+              <a:buFont typeface="Arial" charset="0"/>
+              <a:buChar char="•"/>
+            </a:pPr>
+            <a:endParaRPr lang="en-US" sz="2000" dirty="0"/>
+          </a:p>
+          <a:p>
+            <a:pPr marL="342900" indent="-342900">
+              <a:buFont typeface="Arial" charset="0"/>
+              <a:buChar char="•"/>
+            </a:pPr>
+            <a:endParaRPr lang="en-US" dirty="0"/>
+          </a:p>
+          <a:p>
+            <a:endParaRPr lang="en-US" dirty="0"/>
+          </a:p>
+        </p:txBody>
+      </p:sp>
+      <p:pic>
+        <p:nvPicPr>
+          <p:cNvPr id="6" name="Picture 5"/>
+          <p:cNvPicPr>
+            <a:picLocks noChangeAspect="1"/>
+          </p:cNvPicPr>
+          <p:nvPr/>
+        </p:nvPicPr>
+        <p:blipFill>
+          <a:blip r:embed="rId4"/>
+          <a:stretch>
+            <a:fillRect/>
+          </a:stretch>
+        </p:blipFill>
+        <p:spPr>
+          <a:xfrm>
+            <a:off x="2277934" y="1738237"/>
+            <a:ext cx="4227641" cy="3300488"/>
+          </a:xfrm>
+          <a:prstGeom prst="rect">
+            <a:avLst/>
+          </a:prstGeom>
+        </p:spPr>
+      </p:pic>
     </p:spTree>
     <p:extLst>
       <p:ext uri="{BB962C8B-B14F-4D97-AF65-F5344CB8AC3E}">
-        <p14:creationId xmlns:p14="http://schemas.microsoft.com/office/powerpoint/2010/main" val="4082690878"/>
+        <p14:creationId xmlns:p14="http://schemas.microsoft.com/office/powerpoint/2010/main" val="84375709"/>
       </p:ext>
     </p:extLst>
   </p:cSld>
@@ -9029,56 +10121,305 @@
           <a:p>
             <a:r>
               <a:rPr lang="en-US" dirty="0"/>
-              <a:t>Configuration</a:t>
+              <a:t>Install on Cloud: Amazon</a:t>
             </a:r>
           </a:p>
         </p:txBody>
       </p:sp>
-      <p:pic>
-        <p:nvPicPr>
-          <p:cNvPr id="3074" name="Picture 2" descr="Couchbase Server Setup Wizard"/>
-          <p:cNvPicPr>
-            <a:picLocks noChangeAspect="1" noChangeArrowheads="1"/>
-          </p:cNvPicPr>
+      <p:sp>
+        <p:nvSpPr>
+          <p:cNvPr id="3" name="Content Placeholder 2"/>
+          <p:cNvSpPr txBox="1">
+            <a:spLocks/>
+          </p:cNvSpPr>
           <p:nvPr/>
-        </p:nvPicPr>
-        <p:blipFill>
-          <a:blip r:embed="rId2">
-            <a:extLst>
-              <a:ext uri="{28A0092B-C50C-407E-A947-70E740481C1C}">
-                <a14:useLocalDpi xmlns:a14="http://schemas.microsoft.com/office/drawing/2010/main" val="0"/>
-              </a:ext>
-            </a:extLst>
-          </a:blip>
-          <a:srcRect/>
-          <a:stretch>
-            <a:fillRect/>
-          </a:stretch>
-        </p:blipFill>
-        <p:spPr bwMode="auto">
+        </p:nvSpPr>
+        <p:spPr>
           <a:xfrm>
-            <a:off x="1343025" y="1385888"/>
-            <a:ext cx="6457950" cy="2371725"/>
+            <a:off x="198158" y="685800"/>
+            <a:ext cx="8307668" cy="1295400"/>
           </a:xfrm>
           <a:prstGeom prst="rect">
             <a:avLst/>
           </a:prstGeom>
-          <a:noFill/>
-          <a:extLst>
-            <a:ext uri="{909E8E84-426E-40DD-AFC4-6F175D3DCCD1}">
-              <a14:hiddenFill xmlns:a14="http://schemas.microsoft.com/office/drawing/2010/main">
-                <a:solidFill>
-                  <a:srgbClr val="FFFFFF"/>
-                </a:solidFill>
-              </a14:hiddenFill>
-            </a:ext>
-          </a:extLst>
         </p:spPr>
-      </p:pic>
+        <p:txBody>
+          <a:bodyPr/>
+          <a:lstStyle>
+            <a:lvl1pPr marL="228600" indent="-228600" algn="l" defTabSz="457200" rtl="0" eaLnBrk="1" latinLnBrk="0" hangingPunct="1">
+              <a:spcBef>
+                <a:spcPts val="0"/>
+              </a:spcBef>
+              <a:buClr>
+                <a:schemeClr val="accent1"/>
+              </a:buClr>
+              <a:buFont typeface="Wingdings" charset="2"/>
+              <a:buChar char="§"/>
+              <a:defRPr sz="2400" kern="1200">
+                <a:solidFill>
+                  <a:schemeClr val="tx1"/>
+                </a:solidFill>
+                <a:latin typeface="+mn-lt"/>
+                <a:ea typeface="+mn-ea"/>
+                <a:cs typeface="+mn-cs"/>
+              </a:defRPr>
+            </a:lvl1pPr>
+            <a:lvl2pPr marL="455613" indent="-227013" algn="l" defTabSz="457200" rtl="0" eaLnBrk="1" latinLnBrk="0" hangingPunct="1">
+              <a:spcBef>
+                <a:spcPts val="0"/>
+              </a:spcBef>
+              <a:buClr>
+                <a:srgbClr val="262626"/>
+              </a:buClr>
+              <a:buFont typeface="Wingdings" charset="2"/>
+              <a:buChar char="§"/>
+              <a:defRPr sz="2000" kern="1200">
+                <a:solidFill>
+                  <a:schemeClr val="tx1"/>
+                </a:solidFill>
+                <a:latin typeface="+mn-lt"/>
+                <a:ea typeface="+mn-ea"/>
+                <a:cs typeface="+mn-cs"/>
+              </a:defRPr>
+            </a:lvl2pPr>
+            <a:lvl3pPr marL="455613" indent="-228600" algn="l" defTabSz="457200" rtl="0" eaLnBrk="1" latinLnBrk="0" hangingPunct="1">
+              <a:spcBef>
+                <a:spcPts val="0"/>
+              </a:spcBef>
+              <a:buClr>
+                <a:srgbClr val="262626"/>
+              </a:buClr>
+              <a:buFont typeface="Wingdings" charset="2"/>
+              <a:buChar char="§"/>
+              <a:defRPr sz="2000" kern="1200">
+                <a:solidFill>
+                  <a:schemeClr val="tx1"/>
+                </a:solidFill>
+                <a:latin typeface="+mn-lt"/>
+                <a:ea typeface="+mn-ea"/>
+                <a:cs typeface="+mn-cs"/>
+              </a:defRPr>
+            </a:lvl3pPr>
+            <a:lvl4pPr marL="455613" indent="-228600" algn="l" defTabSz="457200" rtl="0" eaLnBrk="1" latinLnBrk="0" hangingPunct="1">
+              <a:spcBef>
+                <a:spcPts val="0"/>
+              </a:spcBef>
+              <a:buClr>
+                <a:srgbClr val="262626"/>
+              </a:buClr>
+              <a:buFont typeface="Wingdings" charset="2"/>
+              <a:buChar char="§"/>
+              <a:defRPr sz="2000" kern="1200">
+                <a:solidFill>
+                  <a:schemeClr val="tx1"/>
+                </a:solidFill>
+                <a:latin typeface="+mn-lt"/>
+                <a:ea typeface="+mn-ea"/>
+                <a:cs typeface="+mn-cs"/>
+              </a:defRPr>
+            </a:lvl4pPr>
+            <a:lvl5pPr marL="455613" indent="-228600" algn="l" defTabSz="457200" rtl="0" eaLnBrk="1" latinLnBrk="0" hangingPunct="1">
+              <a:spcBef>
+                <a:spcPts val="200"/>
+              </a:spcBef>
+              <a:buClr>
+                <a:srgbClr val="262626"/>
+              </a:buClr>
+              <a:buFont typeface="Wingdings" charset="2"/>
+              <a:buChar char="§"/>
+              <a:defRPr sz="2000" kern="1200">
+                <a:solidFill>
+                  <a:schemeClr val="tx1"/>
+                </a:solidFill>
+                <a:latin typeface="+mn-lt"/>
+                <a:ea typeface="+mn-ea"/>
+                <a:cs typeface="+mn-cs"/>
+              </a:defRPr>
+            </a:lvl5pPr>
+            <a:lvl6pPr marL="2514600" indent="-228600" algn="l" defTabSz="457200" rtl="0" eaLnBrk="1" latinLnBrk="0" hangingPunct="1">
+              <a:spcBef>
+                <a:spcPct val="20000"/>
+              </a:spcBef>
+              <a:buFont typeface="Arial"/>
+              <a:buChar char="•"/>
+              <a:defRPr sz="2000" kern="1200">
+                <a:solidFill>
+                  <a:schemeClr val="tx1"/>
+                </a:solidFill>
+                <a:latin typeface="+mn-lt"/>
+                <a:ea typeface="+mn-ea"/>
+                <a:cs typeface="+mn-cs"/>
+              </a:defRPr>
+            </a:lvl6pPr>
+            <a:lvl7pPr marL="2971800" indent="-228600" algn="l" defTabSz="457200" rtl="0" eaLnBrk="1" latinLnBrk="0" hangingPunct="1">
+              <a:spcBef>
+                <a:spcPct val="20000"/>
+              </a:spcBef>
+              <a:buFont typeface="Arial"/>
+              <a:buChar char="•"/>
+              <a:defRPr sz="2000" kern="1200">
+                <a:solidFill>
+                  <a:schemeClr val="tx1"/>
+                </a:solidFill>
+                <a:latin typeface="+mn-lt"/>
+                <a:ea typeface="+mn-ea"/>
+                <a:cs typeface="+mn-cs"/>
+              </a:defRPr>
+            </a:lvl7pPr>
+            <a:lvl8pPr marL="3429000" indent="-228600" algn="l" defTabSz="457200" rtl="0" eaLnBrk="1" latinLnBrk="0" hangingPunct="1">
+              <a:spcBef>
+                <a:spcPct val="20000"/>
+              </a:spcBef>
+              <a:buFont typeface="Arial"/>
+              <a:buChar char="•"/>
+              <a:defRPr sz="2000" kern="1200">
+                <a:solidFill>
+                  <a:schemeClr val="tx1"/>
+                </a:solidFill>
+                <a:latin typeface="+mn-lt"/>
+                <a:ea typeface="+mn-ea"/>
+                <a:cs typeface="+mn-cs"/>
+              </a:defRPr>
+            </a:lvl8pPr>
+            <a:lvl9pPr marL="3886200" indent="-228600" algn="l" defTabSz="457200" rtl="0" eaLnBrk="1" latinLnBrk="0" hangingPunct="1">
+              <a:spcBef>
+                <a:spcPct val="20000"/>
+              </a:spcBef>
+              <a:buFont typeface="Arial"/>
+              <a:buChar char="•"/>
+              <a:defRPr sz="2000" kern="1200">
+                <a:solidFill>
+                  <a:schemeClr val="tx1"/>
+                </a:solidFill>
+                <a:latin typeface="+mn-lt"/>
+                <a:ea typeface="+mn-ea"/>
+                <a:cs typeface="+mn-cs"/>
+              </a:defRPr>
+            </a:lvl9pPr>
+          </a:lstStyle>
+          <a:p>
+            <a:pPr marL="342900" indent="-342900">
+              <a:buFont typeface="Arial" charset="0"/>
+              <a:buChar char="•"/>
+            </a:pPr>
+            <a:r>
+              <a:rPr lang="en-US" sz="1800" dirty="0"/>
+              <a:t>Select </a:t>
+            </a:r>
+            <a:r>
+              <a:rPr lang="en-US" sz="1800" dirty="0" err="1"/>
+              <a:t>Couchbase</a:t>
+            </a:r>
+            <a:r>
+              <a:rPr lang="en-US" sz="1800" dirty="0"/>
+              <a:t> Server, click Continue</a:t>
+            </a:r>
+          </a:p>
+          <a:p>
+            <a:pPr marL="342900" indent="-342900">
+              <a:buFont typeface="Arial" charset="0"/>
+              <a:buChar char="•"/>
+            </a:pPr>
+            <a:r>
+              <a:rPr lang="en-US" sz="1800" dirty="0"/>
+              <a:t>Choose pricing (4 cores, 4gb RAM recommended)</a:t>
+            </a:r>
+          </a:p>
+          <a:p>
+            <a:pPr marL="342900" indent="-342900">
+              <a:buFont typeface="Arial" charset="0"/>
+              <a:buChar char="•"/>
+            </a:pPr>
+            <a:r>
+              <a:rPr lang="en-US" sz="1800" dirty="0"/>
+              <a:t>Select VPC (or create new VPC)</a:t>
+            </a:r>
+          </a:p>
+          <a:p>
+            <a:pPr marL="342900" indent="-342900">
+              <a:buFont typeface="Arial" charset="0"/>
+              <a:buChar char="•"/>
+            </a:pPr>
+            <a:r>
+              <a:rPr lang="en-US" sz="1800" dirty="0"/>
+              <a:t>Select Security Group (or create new security group based on seller settings)</a:t>
+            </a:r>
+          </a:p>
+          <a:p>
+            <a:pPr marL="342900" indent="-342900">
+              <a:buFont typeface="Arial" charset="0"/>
+              <a:buChar char="•"/>
+            </a:pPr>
+            <a:r>
+              <a:rPr lang="en-US" sz="1800" dirty="0"/>
+              <a:t>Click “Accept”</a:t>
+            </a:r>
+          </a:p>
+          <a:p>
+            <a:pPr marL="342900" indent="-342900">
+              <a:buFont typeface="Arial" charset="0"/>
+              <a:buChar char="•"/>
+            </a:pPr>
+            <a:r>
+              <a:rPr lang="en-US" sz="1800" dirty="0"/>
+              <a:t>Wait for initialization (EC2 console)</a:t>
+            </a:r>
+          </a:p>
+          <a:p>
+            <a:pPr marL="342900" indent="-342900">
+              <a:buFont typeface="Arial" charset="0"/>
+              <a:buChar char="•"/>
+            </a:pPr>
+            <a:r>
+              <a:rPr lang="en-US" sz="1800" dirty="0"/>
+              <a:t>Access </a:t>
+            </a:r>
+            <a:r>
+              <a:rPr lang="en-US" sz="1800" dirty="0" err="1"/>
+              <a:t>Couchbase</a:t>
+            </a:r>
+            <a:r>
+              <a:rPr lang="en-US" sz="1800" dirty="0"/>
+              <a:t> Console via Public DNS port 8091 (e.g. </a:t>
+            </a:r>
+            <a:r>
+              <a:rPr lang="en-US" sz="1800" dirty="0">
+                <a:hlinkClick r:id="rId2"/>
+              </a:rPr>
+              <a:t>http://ec2-52-1-3-4.compute-1.amazonaws.com:8091</a:t>
+            </a:r>
+            <a:r>
+              <a:rPr lang="en-US" sz="1800" dirty="0"/>
+              <a:t>)</a:t>
+            </a:r>
+          </a:p>
+          <a:p>
+            <a:pPr marL="342900" indent="-342900">
+              <a:buFont typeface="Arial" charset="0"/>
+              <a:buChar char="•"/>
+            </a:pPr>
+            <a:endParaRPr lang="en-US" sz="1800" dirty="0"/>
+          </a:p>
+          <a:p>
+            <a:pPr marL="342900" indent="-342900">
+              <a:buFont typeface="Arial" charset="0"/>
+              <a:buChar char="•"/>
+            </a:pPr>
+            <a:endParaRPr lang="en-US" sz="1800" dirty="0"/>
+          </a:p>
+          <a:p>
+            <a:pPr marL="342900" indent="-342900">
+              <a:buFont typeface="Arial" charset="0"/>
+              <a:buChar char="•"/>
+            </a:pPr>
+            <a:endParaRPr lang="en-US" sz="1800" dirty="0"/>
+          </a:p>
+        </p:txBody>
+      </p:sp>
     </p:spTree>
     <p:extLst>
       <p:ext uri="{BB962C8B-B14F-4D97-AF65-F5344CB8AC3E}">
-        <p14:creationId xmlns:p14="http://schemas.microsoft.com/office/powerpoint/2010/main" val="2210796310"/>
+        <p14:creationId xmlns:p14="http://schemas.microsoft.com/office/powerpoint/2010/main" val="342985838"/>
       </p:ext>
     </p:extLst>
   </p:cSld>

</xml_diff>